<commit_message>
updated presentation .pdf and .pptx
</commit_message>
<xml_diff>
--- a/Documentation/HaclOSsim - Group09.pptx
+++ b/Documentation/HaclOSsim - Group09.pptx
@@ -508,7 +508,7 @@
           <a:p>
             <a:fld id="{1D8BD707-D9CF-40AE-B4C6-C98DA3205C09}" type="datetimeFigureOut">
               <a:rPr lang="en-US"/>
-              <a:t>6/4/2024</a:t>
+              <a:t>6/5/2024</a:t>
             </a:fld>
             <a:endParaRPr lang="en-US"/>
           </a:p>
@@ -992,7 +992,7 @@
           <a:p>
             <a:fld id="{1D8BD707-D9CF-40AE-B4C6-C98DA3205C09}" type="datetimeFigureOut">
               <a:rPr lang="en-US"/>
-              <a:t>6/4/2024</a:t>
+              <a:t>6/5/2024</a:t>
             </a:fld>
             <a:endParaRPr lang="en-US"/>
           </a:p>
@@ -1513,7 +1513,7 @@
           <a:p>
             <a:fld id="{1D8BD707-D9CF-40AE-B4C6-C98DA3205C09}" type="datetimeFigureOut">
               <a:rPr lang="en-US"/>
-              <a:t>6/4/2024</a:t>
+              <a:t>6/5/2024</a:t>
             </a:fld>
             <a:endParaRPr lang="en-US"/>
           </a:p>
@@ -2048,7 +2048,7 @@
           <a:p>
             <a:fld id="{1D8BD707-D9CF-40AE-B4C6-C98DA3205C09}" type="datetimeFigureOut">
               <a:rPr lang="en-US"/>
-              <a:t>6/4/2024</a:t>
+              <a:t>6/5/2024</a:t>
             </a:fld>
             <a:endParaRPr lang="en-US"/>
           </a:p>
@@ -2474,7 +2474,7 @@
           <a:p>
             <a:fld id="{1D8BD707-D9CF-40AE-B4C6-C98DA3205C09}" type="datetimeFigureOut">
               <a:rPr lang="en-US"/>
-              <a:t>6/4/2024</a:t>
+              <a:t>6/5/2024</a:t>
             </a:fld>
             <a:endParaRPr lang="en-US"/>
           </a:p>
@@ -3078,7 +3078,7 @@
           <a:p>
             <a:fld id="{1D8BD707-D9CF-40AE-B4C6-C98DA3205C09}" type="datetimeFigureOut">
               <a:rPr lang="en-US"/>
-              <a:t>6/4/2024</a:t>
+              <a:t>6/5/2024</a:t>
             </a:fld>
             <a:endParaRPr lang="en-US"/>
           </a:p>
@@ -3765,8 +3765,25 @@
                 <a:latin typeface="Century Gothic" panose="020B0502020202020204" pitchFamily="34" charset="0"/>
                 <a:cs typeface="Arial" panose="020B0604020202020204" pitchFamily="34" charset="0"/>
               </a:rPr>
-              <a:t>Giovanni de Maria – s330131</a:t>
-            </a:r>
+              <a:t>Giovanni de Maria </a:t>
+            </a:r>
+            <a:r>
+              <a:rPr lang="it-IT" sz="2000" b="1">
+                <a:solidFill>
+                  <a:schemeClr val="bg1"/>
+                </a:solidFill>
+                <a:latin typeface="Century Gothic" panose="020B0502020202020204" pitchFamily="34" charset="0"/>
+                <a:cs typeface="Arial" panose="020B0604020202020204" pitchFamily="34" charset="0"/>
+              </a:rPr>
+              <a:t>– s331031</a:t>
+            </a:r>
+            <a:endParaRPr lang="it-IT" sz="2000" b="1" dirty="0">
+              <a:solidFill>
+                <a:schemeClr val="bg1"/>
+              </a:solidFill>
+              <a:latin typeface="Century Gothic" panose="020B0502020202020204" pitchFamily="34" charset="0"/>
+              <a:cs typeface="Arial" panose="020B0604020202020204" pitchFamily="34" charset="0"/>
+            </a:endParaRPr>
           </a:p>
           <a:p>
             <a:pPr algn="l" rtl="0"/>

</xml_diff>

<commit_message>
I added the slides related to my two demos
</commit_message>
<xml_diff>
--- a/Documentation/HaclOSsim - Group09.pptx
+++ b/Documentation/HaclOSsim - Group09.pptx
@@ -17,19 +17,20 @@
     <p:sldId id="323" r:id="rId11"/>
     <p:sldId id="335" r:id="rId12"/>
     <p:sldId id="336" r:id="rId13"/>
-    <p:sldId id="337" r:id="rId14"/>
-    <p:sldId id="327" r:id="rId15"/>
-    <p:sldId id="339" r:id="rId16"/>
-    <p:sldId id="338" r:id="rId17"/>
-    <p:sldId id="331" r:id="rId18"/>
-    <p:sldId id="324" r:id="rId19"/>
-    <p:sldId id="325" r:id="rId20"/>
-    <p:sldId id="329" r:id="rId21"/>
-    <p:sldId id="330" r:id="rId22"/>
-    <p:sldId id="341" r:id="rId23"/>
-    <p:sldId id="340" r:id="rId24"/>
-    <p:sldId id="328" r:id="rId25"/>
-    <p:sldId id="321" r:id="rId26"/>
+    <p:sldId id="342" r:id="rId14"/>
+    <p:sldId id="337" r:id="rId15"/>
+    <p:sldId id="327" r:id="rId16"/>
+    <p:sldId id="339" r:id="rId17"/>
+    <p:sldId id="338" r:id="rId18"/>
+    <p:sldId id="331" r:id="rId19"/>
+    <p:sldId id="324" r:id="rId20"/>
+    <p:sldId id="325" r:id="rId21"/>
+    <p:sldId id="329" r:id="rId22"/>
+    <p:sldId id="330" r:id="rId23"/>
+    <p:sldId id="341" r:id="rId24"/>
+    <p:sldId id="340" r:id="rId25"/>
+    <p:sldId id="328" r:id="rId26"/>
+    <p:sldId id="321" r:id="rId27"/>
   </p:sldIdLst>
   <p:sldSz cx="12192000" cy="6858000"/>
   <p:notesSz cx="12192000" cy="6858000"/>
@@ -508,7 +509,7 @@
           <a:p>
             <a:fld id="{1D8BD707-D9CF-40AE-B4C6-C98DA3205C09}" type="datetimeFigureOut">
               <a:rPr lang="en-US"/>
-              <a:t>6/5/2024</a:t>
+              <a:t>6/7/24</a:t>
             </a:fld>
             <a:endParaRPr lang="en-US"/>
           </a:p>
@@ -992,7 +993,7 @@
           <a:p>
             <a:fld id="{1D8BD707-D9CF-40AE-B4C6-C98DA3205C09}" type="datetimeFigureOut">
               <a:rPr lang="en-US"/>
-              <a:t>6/5/2024</a:t>
+              <a:t>6/7/24</a:t>
             </a:fld>
             <a:endParaRPr lang="en-US"/>
           </a:p>
@@ -1513,7 +1514,7 @@
           <a:p>
             <a:fld id="{1D8BD707-D9CF-40AE-B4C6-C98DA3205C09}" type="datetimeFigureOut">
               <a:rPr lang="en-US"/>
-              <a:t>6/5/2024</a:t>
+              <a:t>6/7/24</a:t>
             </a:fld>
             <a:endParaRPr lang="en-US"/>
           </a:p>
@@ -2048,7 +2049,7 @@
           <a:p>
             <a:fld id="{1D8BD707-D9CF-40AE-B4C6-C98DA3205C09}" type="datetimeFigureOut">
               <a:rPr lang="en-US"/>
-              <a:t>6/5/2024</a:t>
+              <a:t>6/7/24</a:t>
             </a:fld>
             <a:endParaRPr lang="en-US"/>
           </a:p>
@@ -2474,7 +2475,7 @@
           <a:p>
             <a:fld id="{1D8BD707-D9CF-40AE-B4C6-C98DA3205C09}" type="datetimeFigureOut">
               <a:rPr lang="en-US"/>
-              <a:t>6/5/2024</a:t>
+              <a:t>6/7/24</a:t>
             </a:fld>
             <a:endParaRPr lang="en-US"/>
           </a:p>
@@ -3078,7 +3079,7 @@
           <a:p>
             <a:fld id="{1D8BD707-D9CF-40AE-B4C6-C98DA3205C09}" type="datetimeFigureOut">
               <a:rPr lang="en-US"/>
-              <a:t>6/5/2024</a:t>
+              <a:t>6/7/24</a:t>
             </a:fld>
             <a:endParaRPr lang="en-US"/>
           </a:p>
@@ -3643,7 +3644,7 @@
         <p:spPr>
           <a:xfrm>
             <a:off x="228600" y="5024819"/>
-            <a:ext cx="4033871" cy="1604581"/>
+            <a:ext cx="4419600" cy="1604581"/>
           </a:xfrm>
           <a:prstGeom prst="rect">
             <a:avLst/>
@@ -3739,7 +3740,7 @@
                 <a:latin typeface="Century Gothic" panose="020B0502020202020204" pitchFamily="34" charset="0"/>
                 <a:cs typeface="Arial" panose="020B0604020202020204" pitchFamily="34" charset="0"/>
               </a:rPr>
-              <a:t>Antonio Capece – s323386</a:t>
+              <a:t>s323386 – Antonio Capece </a:t>
             </a:r>
           </a:p>
           <a:p>
@@ -3752,7 +3753,7 @@
                 <a:latin typeface="Century Gothic" panose="020B0502020202020204" pitchFamily="34" charset="0"/>
                 <a:cs typeface="Arial" panose="020B0604020202020204" pitchFamily="34" charset="0"/>
               </a:rPr>
-              <a:t>Federico Cagnazzo – s328833</a:t>
+              <a:t>s328833 – Federico Cagnazzo</a:t>
             </a:r>
           </a:p>
           <a:p>
@@ -3765,28 +3766,18 @@
                 <a:latin typeface="Century Gothic" panose="020B0502020202020204" pitchFamily="34" charset="0"/>
                 <a:cs typeface="Arial" panose="020B0604020202020204" pitchFamily="34" charset="0"/>
               </a:rPr>
-              <a:t>Giovanni de Maria </a:t>
-            </a:r>
-            <a:r>
-              <a:rPr lang="it-IT" sz="2000" b="1">
+              <a:t>S331031 – Giovanni de Maria s331618 – Andrea </a:t>
+            </a:r>
+            <a:r>
+              <a:rPr lang="it-IT" sz="2000" b="1" dirty="0" err="1">
                 <a:solidFill>
                   <a:schemeClr val="bg1"/>
                 </a:solidFill>
                 <a:latin typeface="Century Gothic" panose="020B0502020202020204" pitchFamily="34" charset="0"/>
                 <a:cs typeface="Arial" panose="020B0604020202020204" pitchFamily="34" charset="0"/>
               </a:rPr>
-              <a:t>– s331031</a:t>
-            </a:r>
-            <a:endParaRPr lang="it-IT" sz="2000" b="1" dirty="0">
-              <a:solidFill>
-                <a:schemeClr val="bg1"/>
-              </a:solidFill>
-              <a:latin typeface="Century Gothic" panose="020B0502020202020204" pitchFamily="34" charset="0"/>
-              <a:cs typeface="Arial" panose="020B0604020202020204" pitchFamily="34" charset="0"/>
-            </a:endParaRPr>
-          </a:p>
-          <a:p>
-            <a:pPr algn="l" rtl="0"/>
+              <a:t>Carcagnì</a:t>
+            </a:r>
             <a:r>
               <a:rPr lang="it-IT" sz="2000" b="1" dirty="0">
                 <a:solidFill>
@@ -3795,7 +3786,7 @@
                 <a:latin typeface="Century Gothic" panose="020B0502020202020204" pitchFamily="34" charset="0"/>
                 <a:cs typeface="Arial" panose="020B0604020202020204" pitchFamily="34" charset="0"/>
               </a:rPr>
-              <a:t>Andrea Carcagnì – s331618</a:t>
+              <a:t> </a:t>
             </a:r>
           </a:p>
         </p:txBody>
@@ -4436,8 +4427,8 @@
         </p:blipFill>
         <p:spPr>
           <a:xfrm>
-            <a:off x="533401" y="4088904"/>
-            <a:ext cx="3581400" cy="2024778"/>
+            <a:off x="415290" y="3962400"/>
+            <a:ext cx="3805159" cy="2151282"/>
           </a:xfrm>
           <a:prstGeom prst="rect">
             <a:avLst/>
@@ -4633,7 +4624,7 @@
           </p:cNvPicPr>
           <p:nvPr/>
         </p:nvPicPr>
-        <p:blipFill>
+        <p:blipFill rotWithShape="1">
           <a:blip r:embed="rId3">
             <a:extLst>
               <a:ext uri="{28A0092B-C50C-407E-A947-70E740481C1C}">
@@ -4641,14 +4632,13 @@
               </a:ext>
             </a:extLst>
           </a:blip>
-          <a:stretch>
-            <a:fillRect/>
-          </a:stretch>
+          <a:srcRect t="7279"/>
+          <a:stretch/>
         </p:blipFill>
         <p:spPr>
           <a:xfrm>
-            <a:off x="5040584" y="1524000"/>
-            <a:ext cx="6770416" cy="4187628"/>
+            <a:off x="5040584" y="1828800"/>
+            <a:ext cx="6770416" cy="3882828"/>
           </a:xfrm>
           <a:prstGeom prst="rect">
             <a:avLst/>
@@ -4842,8 +4832,8 @@
         </p:nvSpPr>
         <p:spPr>
           <a:xfrm>
-            <a:off x="152399" y="1126153"/>
-            <a:ext cx="5410201" cy="4893647"/>
+            <a:off x="152399" y="1351508"/>
+            <a:ext cx="5410201" cy="4154984"/>
           </a:xfrm>
           <a:prstGeom prst="rect">
             <a:avLst/>
@@ -4865,7 +4855,7 @@
                 <a:latin typeface="Century Gothic" panose="020B0502020202020204" pitchFamily="34" charset="0"/>
                 <a:cs typeface="Arial" panose="020B0604020202020204" pitchFamily="34" charset="0"/>
               </a:rPr>
-              <a:t>This program is the first of two examples simulating the </a:t>
+              <a:t>This demo simulates the management of a </a:t>
             </a:r>
             <a:r>
               <a:rPr lang="en-GB" sz="2400" b="1" dirty="0">
@@ -4875,7 +4865,7 @@
                 <a:latin typeface="Century Gothic" panose="020B0502020202020204" pitchFamily="34" charset="0"/>
                 <a:cs typeface="Arial" panose="020B0604020202020204" pitchFamily="34" charset="0"/>
               </a:rPr>
-              <a:t>patient management system </a:t>
+              <a:t>hospital</a:t>
             </a:r>
             <a:r>
               <a:rPr lang="en-GB" sz="2400" dirty="0">
@@ -4885,7 +4875,7 @@
                 <a:latin typeface="Century Gothic" panose="020B0502020202020204" pitchFamily="34" charset="0"/>
                 <a:cs typeface="Arial" panose="020B0604020202020204" pitchFamily="34" charset="0"/>
               </a:rPr>
-              <a:t>of an </a:t>
+              <a:t> system. The hospital has a </a:t>
             </a:r>
             <a:r>
               <a:rPr lang="en-GB" sz="2400" b="1" dirty="0">
@@ -4895,7 +4885,7 @@
                 <a:latin typeface="Century Gothic" panose="020B0502020202020204" pitchFamily="34" charset="0"/>
                 <a:cs typeface="Arial" panose="020B0604020202020204" pitchFamily="34" charset="0"/>
               </a:rPr>
-              <a:t>hospital</a:t>
+              <a:t>limited</a:t>
             </a:r>
             <a:r>
               <a:rPr lang="en-GB" sz="2400" dirty="0">
@@ -4905,11 +4895,18 @@
                 <a:latin typeface="Century Gothic" panose="020B0502020202020204" pitchFamily="34" charset="0"/>
                 <a:cs typeface="Arial" panose="020B0604020202020204" pitchFamily="34" charset="0"/>
               </a:rPr>
-              <a:t>.</a:t>
-            </a:r>
-          </a:p>
-          <a:p>
-            <a:pPr algn="l"/>
+              <a:t> number of operating </a:t>
+            </a:r>
+            <a:r>
+              <a:rPr lang="en-GB" sz="2400" b="1" dirty="0">
+                <a:solidFill>
+                  <a:schemeClr val="tx1"/>
+                </a:solidFill>
+                <a:latin typeface="Century Gothic" panose="020B0502020202020204" pitchFamily="34" charset="0"/>
+                <a:cs typeface="Arial" panose="020B0604020202020204" pitchFamily="34" charset="0"/>
+              </a:rPr>
+              <a:t>rooms</a:t>
+            </a:r>
             <a:r>
               <a:rPr lang="en-GB" sz="2400" dirty="0">
                 <a:solidFill>
@@ -4918,7 +4915,7 @@
                 <a:latin typeface="Century Gothic" panose="020B0502020202020204" pitchFamily="34" charset="0"/>
                 <a:cs typeface="Arial" panose="020B0604020202020204" pitchFamily="34" charset="0"/>
               </a:rPr>
-              <a:t>Patients are </a:t>
+              <a:t>, with only one patient being operated </a:t>
             </a:r>
             <a:r>
               <a:rPr lang="en-GB" sz="2400" b="1" dirty="0">
@@ -4928,7 +4925,7 @@
                 <a:latin typeface="Century Gothic" panose="020B0502020202020204" pitchFamily="34" charset="0"/>
                 <a:cs typeface="Arial" panose="020B0604020202020204" pitchFamily="34" charset="0"/>
               </a:rPr>
-              <a:t>queued</a:t>
+              <a:t>on at a time </a:t>
             </a:r>
             <a:r>
               <a:rPr lang="en-GB" sz="2400" dirty="0">
@@ -4938,7 +4935,17 @@
                 <a:latin typeface="Century Gothic" panose="020B0502020202020204" pitchFamily="34" charset="0"/>
                 <a:cs typeface="Arial" panose="020B0604020202020204" pitchFamily="34" charset="0"/>
               </a:rPr>
-              <a:t> when they arrive at the hospital, based on their </a:t>
+              <a:t>in each room. Patients are operated on based on a priority system determined by </a:t>
+            </a:r>
+            <a:r>
+              <a:rPr lang="en-GB" sz="2400" b="1" dirty="0" err="1">
+                <a:solidFill>
+                  <a:schemeClr val="tx1"/>
+                </a:solidFill>
+                <a:latin typeface="Century Gothic" panose="020B0502020202020204" pitchFamily="34" charset="0"/>
+                <a:cs typeface="Arial" panose="020B0604020202020204" pitchFamily="34" charset="0"/>
+              </a:rPr>
+              <a:t>color</a:t>
             </a:r>
             <a:r>
               <a:rPr lang="en-GB" sz="2400" b="1" dirty="0">
@@ -4948,7 +4955,7 @@
                 <a:latin typeface="Century Gothic" panose="020B0502020202020204" pitchFamily="34" charset="0"/>
                 <a:cs typeface="Arial" panose="020B0604020202020204" pitchFamily="34" charset="0"/>
               </a:rPr>
-              <a:t>priority </a:t>
+              <a:t> codes</a:t>
             </a:r>
             <a:r>
               <a:rPr lang="en-GB" sz="2400" dirty="0">
@@ -4958,152 +4965,7 @@
                 <a:latin typeface="Century Gothic" panose="020B0502020202020204" pitchFamily="34" charset="0"/>
                 <a:cs typeface="Arial" panose="020B0604020202020204" pitchFamily="34" charset="0"/>
               </a:rPr>
-              <a:t>(green or red)</a:t>
-            </a:r>
-            <a:r>
-              <a:rPr kumimoji="0" lang="it-IT" altLang="it-IT" sz="2400" b="0" i="0" u="none" strike="noStrike" cap="none" normalizeH="0" baseline="0" dirty="0">
-                <a:ln>
-                  <a:noFill/>
-                </a:ln>
-                <a:solidFill>
-                  <a:schemeClr val="tx1"/>
-                </a:solidFill>
-                <a:effectLst/>
-                <a:latin typeface="Century Gothic" panose="020B0502020202020204" pitchFamily="34" charset="0"/>
-              </a:rPr>
-              <a:t>, </a:t>
-            </a:r>
-            <a:r>
-              <a:rPr kumimoji="0" lang="en-GB" altLang="it-IT" sz="2400" b="0" i="0" u="none" strike="noStrike" cap="none" normalizeH="0" baseline="0" dirty="0">
-                <a:ln>
-                  <a:noFill/>
-                </a:ln>
-                <a:solidFill>
-                  <a:schemeClr val="tx1"/>
-                </a:solidFill>
-                <a:effectLst/>
-                <a:latin typeface="Century Gothic" panose="020B0502020202020204" pitchFamily="34" charset="0"/>
-              </a:rPr>
-              <a:t>so a patient with a red priority will </a:t>
-            </a:r>
-          </a:p>
-          <a:p>
-            <a:pPr algn="l"/>
-            <a:r>
-              <a:rPr kumimoji="0" lang="en-GB" altLang="it-IT" sz="2400" b="0" i="0" u="none" strike="noStrike" cap="none" normalizeH="0" baseline="0" dirty="0">
-                <a:ln>
-                  <a:noFill/>
-                </a:ln>
-                <a:solidFill>
-                  <a:schemeClr val="tx1"/>
-                </a:solidFill>
-                <a:effectLst/>
-                <a:latin typeface="Century Gothic" panose="020B0502020202020204" pitchFamily="34" charset="0"/>
-              </a:rPr>
-              <a:t>move ahead of patients with the green one. </a:t>
-            </a:r>
-            <a:r>
-              <a:rPr lang="en-GB" sz="2400" dirty="0">
-                <a:solidFill>
-                  <a:schemeClr val="tx1"/>
-                </a:solidFill>
-                <a:latin typeface="Century Gothic" panose="020B0502020202020204" pitchFamily="34" charset="0"/>
-                <a:cs typeface="Arial" panose="020B0604020202020204" pitchFamily="34" charset="0"/>
-              </a:rPr>
-              <a:t>When the </a:t>
-            </a:r>
-            <a:r>
-              <a:rPr lang="en-GB" sz="2400" b="1" dirty="0">
-                <a:solidFill>
-                  <a:schemeClr val="tx1"/>
-                </a:solidFill>
-                <a:latin typeface="Century Gothic" panose="020B0502020202020204" pitchFamily="34" charset="0"/>
-                <a:cs typeface="Arial" panose="020B0604020202020204" pitchFamily="34" charset="0"/>
-              </a:rPr>
-              <a:t>surgery </a:t>
-            </a:r>
-          </a:p>
-          <a:p>
-            <a:pPr algn="l"/>
-            <a:r>
-              <a:rPr lang="en-GB" sz="2400" b="1" dirty="0">
-                <a:solidFill>
-                  <a:schemeClr val="tx1"/>
-                </a:solidFill>
-                <a:latin typeface="Century Gothic" panose="020B0502020202020204" pitchFamily="34" charset="0"/>
-                <a:cs typeface="Arial" panose="020B0604020202020204" pitchFamily="34" charset="0"/>
-              </a:rPr>
-              <a:t>room </a:t>
-            </a:r>
-            <a:r>
-              <a:rPr lang="en-GB" sz="2400" dirty="0">
-                <a:solidFill>
-                  <a:schemeClr val="tx1"/>
-                </a:solidFill>
-                <a:latin typeface="Century Gothic" panose="020B0502020202020204" pitchFamily="34" charset="0"/>
-                <a:cs typeface="Arial" panose="020B0604020202020204" pitchFamily="34" charset="0"/>
-              </a:rPr>
-              <a:t>is </a:t>
-            </a:r>
-            <a:r>
-              <a:rPr lang="en-GB" sz="2400" b="1" dirty="0">
-                <a:solidFill>
-                  <a:schemeClr val="tx1"/>
-                </a:solidFill>
-                <a:latin typeface="Century Gothic" panose="020B0502020202020204" pitchFamily="34" charset="0"/>
-                <a:cs typeface="Arial" panose="020B0604020202020204" pitchFamily="34" charset="0"/>
-              </a:rPr>
-              <a:t>free</a:t>
-            </a:r>
-            <a:r>
-              <a:rPr lang="en-GB" sz="2400" dirty="0">
-                <a:solidFill>
-                  <a:schemeClr val="tx1"/>
-                </a:solidFill>
-                <a:latin typeface="Century Gothic" panose="020B0502020202020204" pitchFamily="34" charset="0"/>
-                <a:cs typeface="Arial" panose="020B0604020202020204" pitchFamily="34" charset="0"/>
-              </a:rPr>
-              <a:t>, a </a:t>
-            </a:r>
-            <a:r>
-              <a:rPr lang="en-GB" sz="2400" b="1" dirty="0">
-                <a:solidFill>
-                  <a:schemeClr val="tx1"/>
-                </a:solidFill>
-                <a:latin typeface="Century Gothic" panose="020B0502020202020204" pitchFamily="34" charset="0"/>
-                <a:cs typeface="Arial" panose="020B0604020202020204" pitchFamily="34" charset="0"/>
-              </a:rPr>
-              <a:t>new patient </a:t>
-            </a:r>
-            <a:r>
-              <a:rPr lang="en-GB" sz="2400" dirty="0">
-                <a:solidFill>
-                  <a:schemeClr val="tx1"/>
-                </a:solidFill>
-                <a:latin typeface="Century Gothic" panose="020B0502020202020204" pitchFamily="34" charset="0"/>
-                <a:cs typeface="Arial" panose="020B0604020202020204" pitchFamily="34" charset="0"/>
-              </a:rPr>
-              <a:t>is </a:t>
-            </a:r>
-            <a:r>
-              <a:rPr lang="en-GB" sz="2400" b="1" dirty="0">
-                <a:solidFill>
-                  <a:schemeClr val="tx1"/>
-                </a:solidFill>
-                <a:latin typeface="Century Gothic" panose="020B0502020202020204" pitchFamily="34" charset="0"/>
-                <a:cs typeface="Arial" panose="020B0604020202020204" pitchFamily="34" charset="0"/>
-              </a:rPr>
-              <a:t>scheduled</a:t>
-            </a:r>
-            <a:r>
-              <a:rPr lang="en-GB" sz="2400" dirty="0">
-                <a:solidFill>
-                  <a:schemeClr val="tx1"/>
-                </a:solidFill>
-                <a:latin typeface="Century Gothic" panose="020B0502020202020204" pitchFamily="34" charset="0"/>
-                <a:cs typeface="Arial" panose="020B0604020202020204" pitchFamily="34" charset="0"/>
-              </a:rPr>
-              <a:t>. It accepts an undefined number of patients.</a:t>
+              <a:t>, which define both the priority and the maximum waiting time before the condition worsens.</a:t>
             </a:r>
           </a:p>
         </p:txBody>
@@ -5176,6 +5038,1248 @@
       </p:grpSpPr>
       <p:sp>
         <p:nvSpPr>
+          <p:cNvPr id="2" name="Titolo 1">
+            <a:extLst>
+              <a:ext uri="{FF2B5EF4-FFF2-40B4-BE49-F238E27FC236}">
+                <a16:creationId xmlns:a16="http://schemas.microsoft.com/office/drawing/2014/main" id="{7494D40F-1E9A-4370-4A2E-76E2147E1405}"/>
+              </a:ext>
+            </a:extLst>
+          </p:cNvPr>
+          <p:cNvSpPr>
+            <a:spLocks noGrp="1"/>
+          </p:cNvSpPr>
+          <p:nvPr>
+            <p:ph type="title"/>
+          </p:nvPr>
+        </p:nvSpPr>
+        <p:spPr>
+          <a:xfrm>
+            <a:off x="253700" y="130555"/>
+            <a:ext cx="11684599" cy="553998"/>
+          </a:xfrm>
+        </p:spPr>
+        <p:txBody>
+          <a:bodyPr/>
+          <a:lstStyle/>
+          <a:p>
+            <a:r>
+              <a:rPr lang="it-IT" sz="3600" spc="-10" dirty="0" err="1"/>
+              <a:t>demoHospital.c</a:t>
+            </a:r>
+            <a:endParaRPr lang="it-IT" dirty="0"/>
+          </a:p>
+        </p:txBody>
+      </p:sp>
+      <p:sp>
+        <p:nvSpPr>
+          <p:cNvPr id="3" name="Segnaposto testo 2">
+            <a:extLst>
+              <a:ext uri="{FF2B5EF4-FFF2-40B4-BE49-F238E27FC236}">
+                <a16:creationId xmlns:a16="http://schemas.microsoft.com/office/drawing/2014/main" id="{ECCC5BB0-A750-47A4-4978-729195C760F2}"/>
+              </a:ext>
+            </a:extLst>
+          </p:cNvPr>
+          <p:cNvSpPr>
+            <a:spLocks noGrp="1"/>
+          </p:cNvSpPr>
+          <p:nvPr>
+            <p:ph type="body" idx="1"/>
+          </p:nvPr>
+        </p:nvSpPr>
+        <p:spPr>
+          <a:xfrm>
+            <a:off x="417795" y="1143000"/>
+            <a:ext cx="11356408" cy="3970318"/>
+          </a:xfrm>
+        </p:spPr>
+        <p:txBody>
+          <a:bodyPr/>
+          <a:lstStyle/>
+          <a:p>
+            <a:endParaRPr lang="it-IT" dirty="0">
+              <a:effectLst/>
+            </a:endParaRPr>
+          </a:p>
+          <a:p>
+            <a:pPr lvl="1"/>
+            <a:r>
+              <a:rPr lang="it-IT" b="1" spc="-10" dirty="0" err="1">
+                <a:solidFill>
+                  <a:srgbClr val="003F77"/>
+                </a:solidFill>
+                <a:latin typeface="Century Gothic"/>
+                <a:ea typeface="+mj-ea"/>
+              </a:rPr>
+              <a:t>Queues</a:t>
+            </a:r>
+            <a:r>
+              <a:rPr lang="it-IT" dirty="0">
+                <a:solidFill>
+                  <a:schemeClr val="tx1"/>
+                </a:solidFill>
+                <a:latin typeface="Century Gothic" panose="020B0502020202020204" pitchFamily="34" charset="0"/>
+                <a:cs typeface="Arial" panose="020B0604020202020204" pitchFamily="34" charset="0"/>
+              </a:rPr>
+              <a:t>: </a:t>
+            </a:r>
+            <a:r>
+              <a:rPr lang="it-IT" dirty="0" err="1">
+                <a:solidFill>
+                  <a:schemeClr val="tx1"/>
+                </a:solidFill>
+                <a:latin typeface="Century Gothic" panose="020B0502020202020204" pitchFamily="34" charset="0"/>
+                <a:cs typeface="Arial" panose="020B0604020202020204" pitchFamily="34" charset="0"/>
+              </a:rPr>
+              <a:t>Used</a:t>
+            </a:r>
+            <a:r>
+              <a:rPr lang="it-IT" dirty="0">
+                <a:solidFill>
+                  <a:schemeClr val="tx1"/>
+                </a:solidFill>
+                <a:latin typeface="Century Gothic" panose="020B0502020202020204" pitchFamily="34" charset="0"/>
+                <a:cs typeface="Arial" panose="020B0604020202020204" pitchFamily="34" charset="0"/>
+              </a:rPr>
+              <a:t> to </a:t>
+            </a:r>
+            <a:r>
+              <a:rPr lang="it-IT" dirty="0" err="1">
+                <a:solidFill>
+                  <a:schemeClr val="tx1"/>
+                </a:solidFill>
+                <a:latin typeface="Century Gothic" panose="020B0502020202020204" pitchFamily="34" charset="0"/>
+                <a:cs typeface="Arial" panose="020B0604020202020204" pitchFamily="34" charset="0"/>
+              </a:rPr>
+              <a:t>maintain</a:t>
+            </a:r>
+            <a:r>
+              <a:rPr lang="it-IT" dirty="0">
+                <a:solidFill>
+                  <a:schemeClr val="tx1"/>
+                </a:solidFill>
+                <a:latin typeface="Century Gothic" panose="020B0502020202020204" pitchFamily="34" charset="0"/>
+                <a:cs typeface="Arial" panose="020B0604020202020204" pitchFamily="34" charset="0"/>
+              </a:rPr>
+              <a:t> the </a:t>
+            </a:r>
+            <a:r>
+              <a:rPr lang="it-IT" b="1" dirty="0">
+                <a:solidFill>
+                  <a:schemeClr val="tx1"/>
+                </a:solidFill>
+                <a:latin typeface="Century Gothic" panose="020B0502020202020204" pitchFamily="34" charset="0"/>
+                <a:cs typeface="Arial" panose="020B0604020202020204" pitchFamily="34" charset="0"/>
+              </a:rPr>
+              <a:t>list of </a:t>
+            </a:r>
+            <a:r>
+              <a:rPr lang="it-IT" b="1" dirty="0" err="1">
+                <a:solidFill>
+                  <a:schemeClr val="tx1"/>
+                </a:solidFill>
+                <a:latin typeface="Century Gothic" panose="020B0502020202020204" pitchFamily="34" charset="0"/>
+                <a:cs typeface="Arial" panose="020B0604020202020204" pitchFamily="34" charset="0"/>
+              </a:rPr>
+              <a:t>patients</a:t>
+            </a:r>
+            <a:r>
+              <a:rPr lang="it-IT" b="1" dirty="0">
+                <a:solidFill>
+                  <a:schemeClr val="tx1"/>
+                </a:solidFill>
+                <a:latin typeface="Century Gothic" panose="020B0502020202020204" pitchFamily="34" charset="0"/>
+                <a:cs typeface="Arial" panose="020B0604020202020204" pitchFamily="34" charset="0"/>
+              </a:rPr>
+              <a:t> </a:t>
+            </a:r>
+            <a:r>
+              <a:rPr lang="it-IT" b="1" dirty="0" err="1">
+                <a:solidFill>
+                  <a:schemeClr val="tx1"/>
+                </a:solidFill>
+                <a:latin typeface="Century Gothic" panose="020B0502020202020204" pitchFamily="34" charset="0"/>
+                <a:cs typeface="Arial" panose="020B0604020202020204" pitchFamily="34" charset="0"/>
+              </a:rPr>
+              <a:t>waiting</a:t>
+            </a:r>
+            <a:r>
+              <a:rPr lang="it-IT" b="1" dirty="0">
+                <a:solidFill>
+                  <a:schemeClr val="tx1"/>
+                </a:solidFill>
+                <a:latin typeface="Century Gothic" panose="020B0502020202020204" pitchFamily="34" charset="0"/>
+                <a:cs typeface="Arial" panose="020B0604020202020204" pitchFamily="34" charset="0"/>
+              </a:rPr>
+              <a:t> </a:t>
+            </a:r>
+            <a:r>
+              <a:rPr lang="it-IT" dirty="0">
+                <a:solidFill>
+                  <a:schemeClr val="tx1"/>
+                </a:solidFill>
+                <a:latin typeface="Century Gothic" panose="020B0502020202020204" pitchFamily="34" charset="0"/>
+                <a:cs typeface="Arial" panose="020B0604020202020204" pitchFamily="34" charset="0"/>
+              </a:rPr>
+              <a:t>for surgery. </a:t>
+            </a:r>
+            <a:r>
+              <a:rPr lang="it-IT" dirty="0" err="1">
+                <a:solidFill>
+                  <a:schemeClr val="tx1"/>
+                </a:solidFill>
+                <a:latin typeface="Century Gothic" panose="020B0502020202020204" pitchFamily="34" charset="0"/>
+                <a:cs typeface="Arial" panose="020B0604020202020204" pitchFamily="34" charset="0"/>
+              </a:rPr>
+              <a:t>There</a:t>
+            </a:r>
+            <a:r>
+              <a:rPr lang="it-IT" dirty="0">
+                <a:solidFill>
+                  <a:schemeClr val="tx1"/>
+                </a:solidFill>
+                <a:latin typeface="Century Gothic" panose="020B0502020202020204" pitchFamily="34" charset="0"/>
+                <a:cs typeface="Arial" panose="020B0604020202020204" pitchFamily="34" charset="0"/>
+              </a:rPr>
+              <a:t> are </a:t>
+            </a:r>
+            <a:r>
+              <a:rPr lang="it-IT" b="1" dirty="0">
+                <a:solidFill>
+                  <a:schemeClr val="tx1"/>
+                </a:solidFill>
+                <a:latin typeface="Century Gothic" panose="020B0502020202020204" pitchFamily="34" charset="0"/>
+                <a:cs typeface="Arial" panose="020B0604020202020204" pitchFamily="34" charset="0"/>
+              </a:rPr>
+              <a:t>separate </a:t>
+            </a:r>
+            <a:r>
+              <a:rPr lang="it-IT" b="1" dirty="0" err="1">
+                <a:solidFill>
+                  <a:schemeClr val="tx1"/>
+                </a:solidFill>
+                <a:latin typeface="Century Gothic" panose="020B0502020202020204" pitchFamily="34" charset="0"/>
+                <a:cs typeface="Arial" panose="020B0604020202020204" pitchFamily="34" charset="0"/>
+              </a:rPr>
+              <a:t>queues</a:t>
+            </a:r>
+            <a:r>
+              <a:rPr lang="it-IT" b="1" dirty="0">
+                <a:solidFill>
+                  <a:schemeClr val="tx1"/>
+                </a:solidFill>
+                <a:latin typeface="Century Gothic" panose="020B0502020202020204" pitchFamily="34" charset="0"/>
+                <a:cs typeface="Arial" panose="020B0604020202020204" pitchFamily="34" charset="0"/>
+              </a:rPr>
+              <a:t> for code</a:t>
+            </a:r>
+            <a:r>
+              <a:rPr lang="it-IT" dirty="0">
+                <a:solidFill>
+                  <a:schemeClr val="tx1"/>
+                </a:solidFill>
+                <a:latin typeface="Century Gothic" panose="020B0502020202020204" pitchFamily="34" charset="0"/>
+                <a:cs typeface="Arial" panose="020B0604020202020204" pitchFamily="34" charset="0"/>
+              </a:rPr>
+              <a:t> red and green </a:t>
+            </a:r>
+            <a:r>
+              <a:rPr lang="it-IT" dirty="0" err="1">
+                <a:solidFill>
+                  <a:schemeClr val="tx1"/>
+                </a:solidFill>
+                <a:latin typeface="Century Gothic" panose="020B0502020202020204" pitchFamily="34" charset="0"/>
+                <a:cs typeface="Arial" panose="020B0604020202020204" pitchFamily="34" charset="0"/>
+              </a:rPr>
+              <a:t>patients</a:t>
+            </a:r>
+            <a:r>
+              <a:rPr lang="it-IT" dirty="0">
+                <a:solidFill>
+                  <a:schemeClr val="tx1"/>
+                </a:solidFill>
+                <a:latin typeface="Century Gothic" panose="020B0502020202020204" pitchFamily="34" charset="0"/>
+                <a:cs typeface="Arial" panose="020B0604020202020204" pitchFamily="34" charset="0"/>
+              </a:rPr>
+              <a:t>. Tasks </a:t>
+            </a:r>
+            <a:r>
+              <a:rPr lang="it-IT" b="1" dirty="0" err="1">
+                <a:solidFill>
+                  <a:schemeClr val="tx1"/>
+                </a:solidFill>
+                <a:latin typeface="Century Gothic" panose="020B0502020202020204" pitchFamily="34" charset="0"/>
+                <a:cs typeface="Arial" panose="020B0604020202020204" pitchFamily="34" charset="0"/>
+              </a:rPr>
+              <a:t>fill</a:t>
+            </a:r>
+            <a:r>
+              <a:rPr lang="it-IT" b="1" dirty="0">
+                <a:solidFill>
+                  <a:schemeClr val="tx1"/>
+                </a:solidFill>
+                <a:latin typeface="Century Gothic" panose="020B0502020202020204" pitchFamily="34" charset="0"/>
+                <a:cs typeface="Arial" panose="020B0604020202020204" pitchFamily="34" charset="0"/>
+              </a:rPr>
+              <a:t> </a:t>
+            </a:r>
+            <a:r>
+              <a:rPr lang="it-IT" b="1" dirty="0" err="1">
+                <a:solidFill>
+                  <a:schemeClr val="tx1"/>
+                </a:solidFill>
+                <a:latin typeface="Century Gothic" panose="020B0502020202020204" pitchFamily="34" charset="0"/>
+                <a:cs typeface="Arial" panose="020B0604020202020204" pitchFamily="34" charset="0"/>
+              </a:rPr>
+              <a:t>these</a:t>
+            </a:r>
+            <a:r>
+              <a:rPr lang="it-IT" b="1" dirty="0">
+                <a:solidFill>
+                  <a:schemeClr val="tx1"/>
+                </a:solidFill>
+                <a:latin typeface="Century Gothic" panose="020B0502020202020204" pitchFamily="34" charset="0"/>
+                <a:cs typeface="Arial" panose="020B0604020202020204" pitchFamily="34" charset="0"/>
+              </a:rPr>
+              <a:t> </a:t>
+            </a:r>
+            <a:r>
+              <a:rPr lang="it-IT" b="1" dirty="0" err="1">
+                <a:solidFill>
+                  <a:schemeClr val="tx1"/>
+                </a:solidFill>
+                <a:latin typeface="Century Gothic" panose="020B0502020202020204" pitchFamily="34" charset="0"/>
+                <a:cs typeface="Arial" panose="020B0604020202020204" pitchFamily="34" charset="0"/>
+              </a:rPr>
+              <a:t>queues</a:t>
+            </a:r>
+            <a:r>
+              <a:rPr lang="it-IT" b="1" dirty="0">
+                <a:solidFill>
+                  <a:schemeClr val="tx1"/>
+                </a:solidFill>
+                <a:latin typeface="Century Gothic" panose="020B0502020202020204" pitchFamily="34" charset="0"/>
+                <a:cs typeface="Arial" panose="020B0604020202020204" pitchFamily="34" charset="0"/>
+              </a:rPr>
+              <a:t> with </a:t>
+            </a:r>
+            <a:r>
+              <a:rPr lang="it-IT" b="1" dirty="0" err="1">
+                <a:solidFill>
+                  <a:schemeClr val="tx1"/>
+                </a:solidFill>
+                <a:latin typeface="Century Gothic" panose="020B0502020202020204" pitchFamily="34" charset="0"/>
+                <a:cs typeface="Arial" panose="020B0604020202020204" pitchFamily="34" charset="0"/>
+              </a:rPr>
+              <a:t>patient</a:t>
+            </a:r>
+            <a:r>
+              <a:rPr lang="it-IT" b="1" dirty="0">
+                <a:solidFill>
+                  <a:schemeClr val="tx1"/>
+                </a:solidFill>
+                <a:latin typeface="Century Gothic" panose="020B0502020202020204" pitchFamily="34" charset="0"/>
+                <a:cs typeface="Arial" panose="020B0604020202020204" pitchFamily="34" charset="0"/>
+              </a:rPr>
+              <a:t> </a:t>
+            </a:r>
+            <a:r>
+              <a:rPr lang="it-IT" b="1" dirty="0" err="1">
+                <a:solidFill>
+                  <a:schemeClr val="tx1"/>
+                </a:solidFill>
+                <a:latin typeface="Century Gothic" panose="020B0502020202020204" pitchFamily="34" charset="0"/>
+                <a:cs typeface="Arial" panose="020B0604020202020204" pitchFamily="34" charset="0"/>
+              </a:rPr>
+              <a:t>arrival</a:t>
+            </a:r>
+            <a:r>
+              <a:rPr lang="it-IT" b="1" dirty="0">
+                <a:solidFill>
+                  <a:schemeClr val="tx1"/>
+                </a:solidFill>
+                <a:latin typeface="Century Gothic" panose="020B0502020202020204" pitchFamily="34" charset="0"/>
+                <a:cs typeface="Arial" panose="020B0604020202020204" pitchFamily="34" charset="0"/>
+              </a:rPr>
+              <a:t> times</a:t>
+            </a:r>
+            <a:r>
+              <a:rPr lang="it-IT" dirty="0">
+                <a:solidFill>
+                  <a:schemeClr val="tx1"/>
+                </a:solidFill>
+                <a:latin typeface="Century Gothic" panose="020B0502020202020204" pitchFamily="34" charset="0"/>
+                <a:cs typeface="Arial" panose="020B0604020202020204" pitchFamily="34" charset="0"/>
+              </a:rPr>
+              <a:t>.</a:t>
+            </a:r>
+          </a:p>
+          <a:p>
+            <a:pPr lvl="1"/>
+            <a:endParaRPr lang="it-IT" dirty="0">
+              <a:solidFill>
+                <a:schemeClr val="tx1"/>
+              </a:solidFill>
+              <a:latin typeface="Century Gothic" panose="020B0502020202020204" pitchFamily="34" charset="0"/>
+              <a:cs typeface="Arial" panose="020B0604020202020204" pitchFamily="34" charset="0"/>
+            </a:endParaRPr>
+          </a:p>
+          <a:p>
+            <a:pPr lvl="1"/>
+            <a:r>
+              <a:rPr lang="it-IT" b="1" spc="-10" dirty="0" err="1">
+                <a:solidFill>
+                  <a:srgbClr val="003F77"/>
+                </a:solidFill>
+                <a:latin typeface="Century Gothic"/>
+                <a:ea typeface="+mj-ea"/>
+              </a:rPr>
+              <a:t>Semaphore</a:t>
+            </a:r>
+            <a:r>
+              <a:rPr lang="it-IT" dirty="0">
+                <a:solidFill>
+                  <a:schemeClr val="tx1"/>
+                </a:solidFill>
+                <a:latin typeface="Century Gothic" panose="020B0502020202020204" pitchFamily="34" charset="0"/>
+                <a:cs typeface="Arial" panose="020B0604020202020204" pitchFamily="34" charset="0"/>
+              </a:rPr>
+              <a:t>: </a:t>
+            </a:r>
+            <a:r>
+              <a:rPr lang="it-IT" dirty="0" err="1">
+                <a:solidFill>
+                  <a:schemeClr val="tx1"/>
+                </a:solidFill>
+                <a:latin typeface="Century Gothic" panose="020B0502020202020204" pitchFamily="34" charset="0"/>
+                <a:cs typeface="Arial" panose="020B0604020202020204" pitchFamily="34" charset="0"/>
+              </a:rPr>
+              <a:t>Managing</a:t>
+            </a:r>
+            <a:r>
+              <a:rPr lang="it-IT" dirty="0">
+                <a:solidFill>
+                  <a:schemeClr val="tx1"/>
+                </a:solidFill>
+                <a:latin typeface="Century Gothic" panose="020B0502020202020204" pitchFamily="34" charset="0"/>
+                <a:cs typeface="Arial" panose="020B0604020202020204" pitchFamily="34" charset="0"/>
+              </a:rPr>
+              <a:t> </a:t>
+            </a:r>
+            <a:r>
+              <a:rPr lang="it-IT" b="1" dirty="0" err="1">
+                <a:solidFill>
+                  <a:schemeClr val="tx1"/>
+                </a:solidFill>
+                <a:latin typeface="Century Gothic" panose="020B0502020202020204" pitchFamily="34" charset="0"/>
+                <a:cs typeface="Arial" panose="020B0604020202020204" pitchFamily="34" charset="0"/>
+              </a:rPr>
+              <a:t>concurrent</a:t>
+            </a:r>
+            <a:r>
+              <a:rPr lang="it-IT" b="1" dirty="0">
+                <a:solidFill>
+                  <a:schemeClr val="tx1"/>
+                </a:solidFill>
+                <a:latin typeface="Century Gothic" panose="020B0502020202020204" pitchFamily="34" charset="0"/>
+                <a:cs typeface="Arial" panose="020B0604020202020204" pitchFamily="34" charset="0"/>
+              </a:rPr>
+              <a:t> access </a:t>
+            </a:r>
+            <a:r>
+              <a:rPr lang="it-IT" dirty="0">
+                <a:solidFill>
+                  <a:schemeClr val="tx1"/>
+                </a:solidFill>
+                <a:latin typeface="Century Gothic" panose="020B0502020202020204" pitchFamily="34" charset="0"/>
+                <a:cs typeface="Arial" panose="020B0604020202020204" pitchFamily="34" charset="0"/>
+              </a:rPr>
+              <a:t>to </a:t>
+            </a:r>
+            <a:r>
+              <a:rPr lang="it-IT" dirty="0" err="1">
+                <a:solidFill>
+                  <a:schemeClr val="tx1"/>
+                </a:solidFill>
+                <a:latin typeface="Century Gothic" panose="020B0502020202020204" pitchFamily="34" charset="0"/>
+                <a:cs typeface="Arial" panose="020B0604020202020204" pitchFamily="34" charset="0"/>
+              </a:rPr>
+              <a:t>operating</a:t>
+            </a:r>
+            <a:r>
+              <a:rPr lang="it-IT" dirty="0">
+                <a:solidFill>
+                  <a:schemeClr val="tx1"/>
+                </a:solidFill>
+                <a:latin typeface="Century Gothic" panose="020B0502020202020204" pitchFamily="34" charset="0"/>
+                <a:cs typeface="Arial" panose="020B0604020202020204" pitchFamily="34" charset="0"/>
+              </a:rPr>
+              <a:t> rooms, </a:t>
+            </a:r>
+            <a:r>
+              <a:rPr lang="it-IT" dirty="0" err="1">
+                <a:solidFill>
+                  <a:schemeClr val="tx1"/>
+                </a:solidFill>
+                <a:latin typeface="Century Gothic" panose="020B0502020202020204" pitchFamily="34" charset="0"/>
+                <a:cs typeface="Arial" panose="020B0604020202020204" pitchFamily="34" charset="0"/>
+              </a:rPr>
+              <a:t>when</a:t>
+            </a:r>
+            <a:r>
+              <a:rPr lang="it-IT" dirty="0">
+                <a:solidFill>
+                  <a:schemeClr val="tx1"/>
+                </a:solidFill>
+                <a:latin typeface="Century Gothic" panose="020B0502020202020204" pitchFamily="34" charset="0"/>
+                <a:cs typeface="Arial" panose="020B0604020202020204" pitchFamily="34" charset="0"/>
+              </a:rPr>
+              <a:t> a room </a:t>
+            </a:r>
+            <a:r>
+              <a:rPr lang="it-IT" dirty="0" err="1">
+                <a:solidFill>
+                  <a:schemeClr val="tx1"/>
+                </a:solidFill>
+                <a:latin typeface="Century Gothic" panose="020B0502020202020204" pitchFamily="34" charset="0"/>
+                <a:cs typeface="Arial" panose="020B0604020202020204" pitchFamily="34" charset="0"/>
+              </a:rPr>
+              <a:t>is</a:t>
+            </a:r>
+            <a:r>
+              <a:rPr lang="it-IT" dirty="0">
+                <a:solidFill>
+                  <a:schemeClr val="tx1"/>
+                </a:solidFill>
+                <a:latin typeface="Century Gothic" panose="020B0502020202020204" pitchFamily="34" charset="0"/>
+                <a:cs typeface="Arial" panose="020B0604020202020204" pitchFamily="34" charset="0"/>
+              </a:rPr>
+              <a:t> </a:t>
+            </a:r>
+            <a:r>
+              <a:rPr lang="it-IT" dirty="0" err="1">
+                <a:solidFill>
+                  <a:schemeClr val="tx1"/>
+                </a:solidFill>
+                <a:latin typeface="Century Gothic" panose="020B0502020202020204" pitchFamily="34" charset="0"/>
+                <a:cs typeface="Arial" panose="020B0604020202020204" pitchFamily="34" charset="0"/>
+              </a:rPr>
+              <a:t>available</a:t>
+            </a:r>
+            <a:r>
+              <a:rPr lang="it-IT" dirty="0">
+                <a:solidFill>
+                  <a:schemeClr val="tx1"/>
+                </a:solidFill>
+                <a:latin typeface="Century Gothic" panose="020B0502020202020204" pitchFamily="34" charset="0"/>
+                <a:cs typeface="Arial" panose="020B0604020202020204" pitchFamily="34" charset="0"/>
+              </a:rPr>
+              <a:t>, the </a:t>
+            </a:r>
+            <a:r>
+              <a:rPr lang="it-IT" dirty="0" err="1">
+                <a:solidFill>
+                  <a:schemeClr val="tx1"/>
+                </a:solidFill>
+                <a:latin typeface="Century Gothic" panose="020B0502020202020204" pitchFamily="34" charset="0"/>
+                <a:cs typeface="Arial" panose="020B0604020202020204" pitchFamily="34" charset="0"/>
+              </a:rPr>
+              <a:t>semaphore</a:t>
+            </a:r>
+            <a:r>
+              <a:rPr lang="it-IT" dirty="0">
+                <a:solidFill>
+                  <a:schemeClr val="tx1"/>
+                </a:solidFill>
+                <a:latin typeface="Century Gothic" panose="020B0502020202020204" pitchFamily="34" charset="0"/>
+                <a:cs typeface="Arial" panose="020B0604020202020204" pitchFamily="34" charset="0"/>
+              </a:rPr>
+              <a:t> </a:t>
+            </a:r>
+            <a:r>
+              <a:rPr lang="it-IT" dirty="0" err="1">
+                <a:solidFill>
+                  <a:schemeClr val="tx1"/>
+                </a:solidFill>
+                <a:latin typeface="Century Gothic" panose="020B0502020202020204" pitchFamily="34" charset="0"/>
+                <a:cs typeface="Arial" panose="020B0604020202020204" pitchFamily="34" charset="0"/>
+              </a:rPr>
+              <a:t>is</a:t>
+            </a:r>
+            <a:r>
+              <a:rPr lang="it-IT" dirty="0">
+                <a:solidFill>
+                  <a:schemeClr val="tx1"/>
+                </a:solidFill>
+                <a:latin typeface="Century Gothic" panose="020B0502020202020204" pitchFamily="34" charset="0"/>
+                <a:cs typeface="Arial" panose="020B0604020202020204" pitchFamily="34" charset="0"/>
+              </a:rPr>
+              <a:t> </a:t>
+            </a:r>
+            <a:r>
+              <a:rPr lang="it-IT" dirty="0" err="1">
+                <a:solidFill>
+                  <a:schemeClr val="tx1"/>
+                </a:solidFill>
+                <a:latin typeface="Century Gothic" panose="020B0502020202020204" pitchFamily="34" charset="0"/>
+                <a:cs typeface="Arial" panose="020B0604020202020204" pitchFamily="34" charset="0"/>
+              </a:rPr>
+              <a:t>taken</a:t>
+            </a:r>
+            <a:r>
+              <a:rPr lang="it-IT" dirty="0">
+                <a:solidFill>
+                  <a:schemeClr val="tx1"/>
+                </a:solidFill>
+                <a:latin typeface="Century Gothic" panose="020B0502020202020204" pitchFamily="34" charset="0"/>
+                <a:cs typeface="Arial" panose="020B0604020202020204" pitchFamily="34" charset="0"/>
+              </a:rPr>
+              <a:t> (</a:t>
+            </a:r>
+            <a:r>
+              <a:rPr lang="it-IT" i="1" dirty="0" err="1">
+                <a:solidFill>
+                  <a:schemeClr val="tx1"/>
+                </a:solidFill>
+                <a:latin typeface="Century Gothic" panose="020B0502020202020204" pitchFamily="34" charset="0"/>
+                <a:cs typeface="Arial" panose="020B0604020202020204" pitchFamily="34" charset="0"/>
+              </a:rPr>
+              <a:t>xSemaphoreTake</a:t>
+            </a:r>
+            <a:r>
+              <a:rPr lang="it-IT" dirty="0">
+                <a:solidFill>
+                  <a:schemeClr val="tx1"/>
+                </a:solidFill>
+                <a:latin typeface="Century Gothic" panose="020B0502020202020204" pitchFamily="34" charset="0"/>
+                <a:cs typeface="Arial" panose="020B0604020202020204" pitchFamily="34" charset="0"/>
+              </a:rPr>
+              <a:t>) and </a:t>
+            </a:r>
+            <a:r>
+              <a:rPr lang="it-IT" dirty="0" err="1">
+                <a:solidFill>
+                  <a:schemeClr val="tx1"/>
+                </a:solidFill>
+                <a:latin typeface="Century Gothic" panose="020B0502020202020204" pitchFamily="34" charset="0"/>
+                <a:cs typeface="Arial" panose="020B0604020202020204" pitchFamily="34" charset="0"/>
+              </a:rPr>
+              <a:t>then</a:t>
+            </a:r>
+            <a:r>
+              <a:rPr lang="it-IT" dirty="0">
+                <a:solidFill>
+                  <a:schemeClr val="tx1"/>
+                </a:solidFill>
+                <a:latin typeface="Century Gothic" panose="020B0502020202020204" pitchFamily="34" charset="0"/>
+                <a:cs typeface="Arial" panose="020B0604020202020204" pitchFamily="34" charset="0"/>
+              </a:rPr>
+              <a:t> </a:t>
+            </a:r>
+            <a:r>
+              <a:rPr lang="it-IT" dirty="0" err="1">
+                <a:solidFill>
+                  <a:schemeClr val="tx1"/>
+                </a:solidFill>
+                <a:latin typeface="Century Gothic" panose="020B0502020202020204" pitchFamily="34" charset="0"/>
+                <a:cs typeface="Arial" panose="020B0604020202020204" pitchFamily="34" charset="0"/>
+              </a:rPr>
+              <a:t>released</a:t>
+            </a:r>
+            <a:r>
+              <a:rPr lang="it-IT" dirty="0">
+                <a:solidFill>
+                  <a:schemeClr val="tx1"/>
+                </a:solidFill>
+                <a:latin typeface="Century Gothic" panose="020B0502020202020204" pitchFamily="34" charset="0"/>
+                <a:cs typeface="Arial" panose="020B0604020202020204" pitchFamily="34" charset="0"/>
+              </a:rPr>
+              <a:t> (</a:t>
+            </a:r>
+            <a:r>
+              <a:rPr lang="it-IT" i="1" dirty="0" err="1">
+                <a:solidFill>
+                  <a:schemeClr val="tx1"/>
+                </a:solidFill>
+                <a:latin typeface="Century Gothic" panose="020B0502020202020204" pitchFamily="34" charset="0"/>
+                <a:cs typeface="Arial" panose="020B0604020202020204" pitchFamily="34" charset="0"/>
+              </a:rPr>
+              <a:t>xSemaphoreGive</a:t>
+            </a:r>
+            <a:r>
+              <a:rPr lang="it-IT" dirty="0">
+                <a:solidFill>
+                  <a:schemeClr val="tx1"/>
+                </a:solidFill>
+                <a:latin typeface="Century Gothic" panose="020B0502020202020204" pitchFamily="34" charset="0"/>
+                <a:cs typeface="Arial" panose="020B0604020202020204" pitchFamily="34" charset="0"/>
+              </a:rPr>
+              <a:t>) </a:t>
+            </a:r>
+            <a:r>
+              <a:rPr lang="it-IT" dirty="0" err="1">
+                <a:solidFill>
+                  <a:schemeClr val="tx1"/>
+                </a:solidFill>
+                <a:latin typeface="Century Gothic" panose="020B0502020202020204" pitchFamily="34" charset="0"/>
+                <a:cs typeface="Arial" panose="020B0604020202020204" pitchFamily="34" charset="0"/>
+              </a:rPr>
+              <a:t>when</a:t>
+            </a:r>
+            <a:r>
+              <a:rPr lang="it-IT" dirty="0">
+                <a:solidFill>
+                  <a:schemeClr val="tx1"/>
+                </a:solidFill>
+                <a:latin typeface="Century Gothic" panose="020B0502020202020204" pitchFamily="34" charset="0"/>
+                <a:cs typeface="Arial" panose="020B0604020202020204" pitchFamily="34" charset="0"/>
+              </a:rPr>
+              <a:t> the </a:t>
+            </a:r>
+            <a:r>
+              <a:rPr lang="it-IT" dirty="0" err="1">
+                <a:solidFill>
+                  <a:schemeClr val="tx1"/>
+                </a:solidFill>
+                <a:latin typeface="Century Gothic" panose="020B0502020202020204" pitchFamily="34" charset="0"/>
+                <a:cs typeface="Arial" panose="020B0604020202020204" pitchFamily="34" charset="0"/>
+              </a:rPr>
+              <a:t>operation</a:t>
+            </a:r>
+            <a:r>
+              <a:rPr lang="it-IT" dirty="0">
+                <a:solidFill>
+                  <a:schemeClr val="tx1"/>
+                </a:solidFill>
+                <a:latin typeface="Century Gothic" panose="020B0502020202020204" pitchFamily="34" charset="0"/>
+                <a:cs typeface="Arial" panose="020B0604020202020204" pitchFamily="34" charset="0"/>
+              </a:rPr>
+              <a:t> </a:t>
+            </a:r>
+            <a:r>
+              <a:rPr lang="it-IT" dirty="0" err="1">
+                <a:solidFill>
+                  <a:schemeClr val="tx1"/>
+                </a:solidFill>
+                <a:latin typeface="Century Gothic" panose="020B0502020202020204" pitchFamily="34" charset="0"/>
+                <a:cs typeface="Arial" panose="020B0604020202020204" pitchFamily="34" charset="0"/>
+              </a:rPr>
+              <a:t>is</a:t>
+            </a:r>
+            <a:r>
+              <a:rPr lang="it-IT" dirty="0">
+                <a:solidFill>
+                  <a:schemeClr val="tx1"/>
+                </a:solidFill>
+                <a:latin typeface="Century Gothic" panose="020B0502020202020204" pitchFamily="34" charset="0"/>
+                <a:cs typeface="Arial" panose="020B0604020202020204" pitchFamily="34" charset="0"/>
+              </a:rPr>
+              <a:t> </a:t>
+            </a:r>
+            <a:r>
+              <a:rPr lang="it-IT" dirty="0" err="1">
+                <a:solidFill>
+                  <a:schemeClr val="tx1"/>
+                </a:solidFill>
+                <a:latin typeface="Century Gothic" panose="020B0502020202020204" pitchFamily="34" charset="0"/>
+                <a:cs typeface="Arial" panose="020B0604020202020204" pitchFamily="34" charset="0"/>
+              </a:rPr>
+              <a:t>completed</a:t>
+            </a:r>
+            <a:r>
+              <a:rPr lang="it-IT" dirty="0">
+                <a:solidFill>
+                  <a:schemeClr val="tx1"/>
+                </a:solidFill>
+                <a:latin typeface="Century Gothic" panose="020B0502020202020204" pitchFamily="34" charset="0"/>
+                <a:cs typeface="Arial" panose="020B0604020202020204" pitchFamily="34" charset="0"/>
+              </a:rPr>
+              <a:t>.</a:t>
+            </a:r>
+          </a:p>
+          <a:p>
+            <a:pPr lvl="1"/>
+            <a:endParaRPr lang="it-IT" dirty="0">
+              <a:solidFill>
+                <a:schemeClr val="tx1"/>
+              </a:solidFill>
+              <a:latin typeface="Century Gothic" panose="020B0502020202020204" pitchFamily="34" charset="0"/>
+              <a:cs typeface="Arial" panose="020B0604020202020204" pitchFamily="34" charset="0"/>
+            </a:endParaRPr>
+          </a:p>
+          <a:p>
+            <a:pPr lvl="1"/>
+            <a:endParaRPr lang="it-IT" dirty="0">
+              <a:solidFill>
+                <a:schemeClr val="tx1"/>
+              </a:solidFill>
+              <a:latin typeface="Century Gothic" panose="020B0502020202020204" pitchFamily="34" charset="0"/>
+              <a:cs typeface="Arial" panose="020B0604020202020204" pitchFamily="34" charset="0"/>
+            </a:endParaRPr>
+          </a:p>
+          <a:p>
+            <a:pPr lvl="1"/>
+            <a:r>
+              <a:rPr lang="it-IT" b="1" spc="-10" dirty="0">
+                <a:solidFill>
+                  <a:srgbClr val="003F77"/>
+                </a:solidFill>
+                <a:latin typeface="Century Gothic"/>
+                <a:ea typeface="+mj-ea"/>
+              </a:rPr>
+              <a:t>Multitasking</a:t>
+            </a:r>
+            <a:r>
+              <a:rPr lang="it-IT" dirty="0">
+                <a:solidFill>
+                  <a:schemeClr val="tx1"/>
+                </a:solidFill>
+                <a:latin typeface="Century Gothic" panose="020B0502020202020204" pitchFamily="34" charset="0"/>
+                <a:cs typeface="Arial" panose="020B0604020202020204" pitchFamily="34" charset="0"/>
+              </a:rPr>
+              <a:t>: </a:t>
+            </a:r>
+            <a:r>
+              <a:rPr lang="it-IT" i="1" dirty="0" err="1">
+                <a:solidFill>
+                  <a:schemeClr val="tx1"/>
+                </a:solidFill>
+                <a:latin typeface="Century Gothic" panose="020B0502020202020204" pitchFamily="34" charset="0"/>
+                <a:cs typeface="Arial" panose="020B0604020202020204" pitchFamily="34" charset="0"/>
+              </a:rPr>
+              <a:t>fillQueue</a:t>
+            </a:r>
+            <a:r>
+              <a:rPr lang="it-IT" dirty="0">
+                <a:solidFill>
+                  <a:schemeClr val="tx1"/>
+                </a:solidFill>
+                <a:latin typeface="Century Gothic" panose="020B0502020202020204" pitchFamily="34" charset="0"/>
+                <a:cs typeface="Arial" panose="020B0604020202020204" pitchFamily="34" charset="0"/>
+              </a:rPr>
+              <a:t> and </a:t>
+            </a:r>
+            <a:r>
+              <a:rPr lang="it-IT" i="1" dirty="0" err="1">
+                <a:solidFill>
+                  <a:schemeClr val="tx1"/>
+                </a:solidFill>
+                <a:latin typeface="Century Gothic" panose="020B0502020202020204" pitchFamily="34" charset="0"/>
+                <a:cs typeface="Arial" panose="020B0604020202020204" pitchFamily="34" charset="0"/>
+              </a:rPr>
+              <a:t>operatingRoomTask</a:t>
+            </a:r>
+            <a:r>
+              <a:rPr lang="it-IT" dirty="0">
+                <a:solidFill>
+                  <a:schemeClr val="tx1"/>
+                </a:solidFill>
+                <a:latin typeface="Century Gothic" panose="020B0502020202020204" pitchFamily="34" charset="0"/>
+                <a:cs typeface="Arial" panose="020B0604020202020204" pitchFamily="34" charset="0"/>
+              </a:rPr>
+              <a:t> </a:t>
+            </a:r>
+            <a:r>
+              <a:rPr lang="it-IT" dirty="0" err="1">
+                <a:solidFill>
+                  <a:schemeClr val="tx1"/>
+                </a:solidFill>
+                <a:latin typeface="Century Gothic" panose="020B0502020202020204" pitchFamily="34" charset="0"/>
+                <a:cs typeface="Arial" panose="020B0604020202020204" pitchFamily="34" charset="0"/>
+              </a:rPr>
+              <a:t>manage</a:t>
+            </a:r>
+            <a:r>
+              <a:rPr lang="it-IT" dirty="0">
+                <a:solidFill>
+                  <a:schemeClr val="tx1"/>
+                </a:solidFill>
+                <a:latin typeface="Century Gothic" panose="020B0502020202020204" pitchFamily="34" charset="0"/>
+                <a:cs typeface="Arial" panose="020B0604020202020204" pitchFamily="34" charset="0"/>
+              </a:rPr>
+              <a:t> </a:t>
+            </a:r>
+            <a:r>
+              <a:rPr lang="it-IT" dirty="0" err="1">
+                <a:solidFill>
+                  <a:schemeClr val="tx1"/>
+                </a:solidFill>
+                <a:latin typeface="Century Gothic" panose="020B0502020202020204" pitchFamily="34" charset="0"/>
+                <a:cs typeface="Arial" panose="020B0604020202020204" pitchFamily="34" charset="0"/>
+              </a:rPr>
+              <a:t>patient</a:t>
+            </a:r>
+            <a:r>
+              <a:rPr lang="it-IT" dirty="0">
+                <a:solidFill>
+                  <a:schemeClr val="tx1"/>
+                </a:solidFill>
+                <a:latin typeface="Century Gothic" panose="020B0502020202020204" pitchFamily="34" charset="0"/>
+                <a:cs typeface="Arial" panose="020B0604020202020204" pitchFamily="34" charset="0"/>
+              </a:rPr>
+              <a:t> </a:t>
+            </a:r>
+            <a:r>
+              <a:rPr lang="it-IT" dirty="0" err="1">
+                <a:solidFill>
+                  <a:schemeClr val="tx1"/>
+                </a:solidFill>
+                <a:latin typeface="Century Gothic" panose="020B0502020202020204" pitchFamily="34" charset="0"/>
+                <a:cs typeface="Arial" panose="020B0604020202020204" pitchFamily="34" charset="0"/>
+              </a:rPr>
+              <a:t>arrival</a:t>
+            </a:r>
+            <a:r>
+              <a:rPr lang="it-IT" dirty="0">
+                <a:solidFill>
+                  <a:schemeClr val="tx1"/>
+                </a:solidFill>
+                <a:latin typeface="Century Gothic" panose="020B0502020202020204" pitchFamily="34" charset="0"/>
+                <a:cs typeface="Arial" panose="020B0604020202020204" pitchFamily="34" charset="0"/>
+              </a:rPr>
+              <a:t> and </a:t>
+            </a:r>
+            <a:r>
+              <a:rPr lang="it-IT" dirty="0" err="1">
+                <a:solidFill>
+                  <a:schemeClr val="tx1"/>
+                </a:solidFill>
+                <a:latin typeface="Century Gothic" panose="020B0502020202020204" pitchFamily="34" charset="0"/>
+                <a:cs typeface="Arial" panose="020B0604020202020204" pitchFamily="34" charset="0"/>
+              </a:rPr>
+              <a:t>operation</a:t>
+            </a:r>
+            <a:r>
+              <a:rPr lang="it-IT" dirty="0">
+                <a:solidFill>
+                  <a:schemeClr val="tx1"/>
+                </a:solidFill>
+                <a:latin typeface="Century Gothic" panose="020B0502020202020204" pitchFamily="34" charset="0"/>
+                <a:cs typeface="Arial" panose="020B0604020202020204" pitchFamily="34" charset="0"/>
+              </a:rPr>
+              <a:t> in </a:t>
+            </a:r>
+            <a:r>
+              <a:rPr lang="it-IT" dirty="0" err="1">
+                <a:solidFill>
+                  <a:schemeClr val="tx1"/>
+                </a:solidFill>
+                <a:latin typeface="Century Gothic" panose="020B0502020202020204" pitchFamily="34" charset="0"/>
+                <a:cs typeface="Arial" panose="020B0604020202020204" pitchFamily="34" charset="0"/>
+              </a:rPr>
+              <a:t>operating</a:t>
+            </a:r>
+            <a:r>
+              <a:rPr lang="it-IT" dirty="0">
+                <a:solidFill>
+                  <a:schemeClr val="tx1"/>
+                </a:solidFill>
+                <a:latin typeface="Century Gothic" panose="020B0502020202020204" pitchFamily="34" charset="0"/>
+                <a:cs typeface="Arial" panose="020B0604020202020204" pitchFamily="34" charset="0"/>
+              </a:rPr>
+              <a:t> rooms, working in </a:t>
+            </a:r>
+            <a:r>
+              <a:rPr lang="it-IT" b="1" dirty="0" err="1">
+                <a:solidFill>
+                  <a:schemeClr val="tx1"/>
+                </a:solidFill>
+                <a:latin typeface="Century Gothic" panose="020B0502020202020204" pitchFamily="34" charset="0"/>
+                <a:cs typeface="Arial" panose="020B0604020202020204" pitchFamily="34" charset="0"/>
+              </a:rPr>
+              <a:t>parallel</a:t>
+            </a:r>
+            <a:r>
+              <a:rPr lang="it-IT" dirty="0">
+                <a:solidFill>
+                  <a:schemeClr val="tx1"/>
+                </a:solidFill>
+                <a:latin typeface="Century Gothic" panose="020B0502020202020204" pitchFamily="34" charset="0"/>
+                <a:cs typeface="Arial" panose="020B0604020202020204" pitchFamily="34" charset="0"/>
+              </a:rPr>
+              <a:t>, </a:t>
+            </a:r>
+            <a:r>
+              <a:rPr lang="it-IT" dirty="0" err="1">
+                <a:solidFill>
+                  <a:schemeClr val="tx1"/>
+                </a:solidFill>
+                <a:latin typeface="Century Gothic" panose="020B0502020202020204" pitchFamily="34" charset="0"/>
+                <a:cs typeface="Arial" panose="020B0604020202020204" pitchFamily="34" charset="0"/>
+              </a:rPr>
+              <a:t>allowing</a:t>
+            </a:r>
+            <a:r>
+              <a:rPr lang="it-IT" dirty="0">
+                <a:solidFill>
+                  <a:schemeClr val="tx1"/>
+                </a:solidFill>
+                <a:latin typeface="Century Gothic" panose="020B0502020202020204" pitchFamily="34" charset="0"/>
+                <a:cs typeface="Arial" panose="020B0604020202020204" pitchFamily="34" charset="0"/>
+              </a:rPr>
+              <a:t> </a:t>
+            </a:r>
+            <a:r>
+              <a:rPr lang="it-IT" b="1" dirty="0" err="1">
+                <a:solidFill>
+                  <a:schemeClr val="tx1"/>
+                </a:solidFill>
+                <a:latin typeface="Century Gothic" panose="020B0502020202020204" pitchFamily="34" charset="0"/>
+                <a:cs typeface="Arial" panose="020B0604020202020204" pitchFamily="34" charset="0"/>
+              </a:rPr>
+              <a:t>realistic</a:t>
+            </a:r>
+            <a:r>
+              <a:rPr lang="it-IT" dirty="0">
+                <a:solidFill>
+                  <a:schemeClr val="tx1"/>
+                </a:solidFill>
+                <a:latin typeface="Century Gothic" panose="020B0502020202020204" pitchFamily="34" charset="0"/>
+                <a:cs typeface="Arial" panose="020B0604020202020204" pitchFamily="34" charset="0"/>
+              </a:rPr>
+              <a:t> </a:t>
+            </a:r>
+            <a:r>
+              <a:rPr lang="it-IT" dirty="0" err="1">
+                <a:solidFill>
+                  <a:schemeClr val="tx1"/>
+                </a:solidFill>
+                <a:latin typeface="Century Gothic" panose="020B0502020202020204" pitchFamily="34" charset="0"/>
+                <a:cs typeface="Arial" panose="020B0604020202020204" pitchFamily="34" charset="0"/>
+              </a:rPr>
+              <a:t>simulation</a:t>
+            </a:r>
+            <a:r>
+              <a:rPr lang="it-IT" dirty="0">
+                <a:solidFill>
+                  <a:schemeClr val="tx1"/>
+                </a:solidFill>
+                <a:latin typeface="Century Gothic" panose="020B0502020202020204" pitchFamily="34" charset="0"/>
+                <a:cs typeface="Arial" panose="020B0604020202020204" pitchFamily="34" charset="0"/>
+              </a:rPr>
+              <a:t> of the hospital </a:t>
+            </a:r>
+            <a:r>
+              <a:rPr lang="it-IT" dirty="0" err="1">
+                <a:solidFill>
+                  <a:schemeClr val="tx1"/>
+                </a:solidFill>
+                <a:latin typeface="Century Gothic" panose="020B0502020202020204" pitchFamily="34" charset="0"/>
+                <a:cs typeface="Arial" panose="020B0604020202020204" pitchFamily="34" charset="0"/>
+              </a:rPr>
+              <a:t>environment</a:t>
+            </a:r>
+            <a:r>
+              <a:rPr lang="it-IT" dirty="0">
+                <a:solidFill>
+                  <a:schemeClr val="tx1"/>
+                </a:solidFill>
+                <a:latin typeface="Century Gothic" panose="020B0502020202020204" pitchFamily="34" charset="0"/>
+                <a:cs typeface="Arial" panose="020B0604020202020204" pitchFamily="34" charset="0"/>
+              </a:rPr>
+              <a:t>.</a:t>
+            </a:r>
+          </a:p>
+          <a:p>
+            <a:pPr lvl="1"/>
+            <a:endParaRPr lang="it-IT" dirty="0">
+              <a:solidFill>
+                <a:schemeClr val="tx1"/>
+              </a:solidFill>
+              <a:latin typeface="Century Gothic" panose="020B0502020202020204" pitchFamily="34" charset="0"/>
+              <a:cs typeface="Arial" panose="020B0604020202020204" pitchFamily="34" charset="0"/>
+            </a:endParaRPr>
+          </a:p>
+          <a:p>
+            <a:pPr lvl="1"/>
+            <a:r>
+              <a:rPr lang="it-IT" b="1" spc="-10" dirty="0">
+                <a:solidFill>
+                  <a:srgbClr val="003F77"/>
+                </a:solidFill>
+                <a:latin typeface="Century Gothic"/>
+                <a:ea typeface="+mj-ea"/>
+              </a:rPr>
+              <a:t>Timer</a:t>
+            </a:r>
+            <a:r>
+              <a:rPr lang="it-IT" dirty="0">
+                <a:solidFill>
+                  <a:schemeClr val="tx1"/>
+                </a:solidFill>
+                <a:latin typeface="Century Gothic" panose="020B0502020202020204" pitchFamily="34" charset="0"/>
+                <a:cs typeface="Arial" panose="020B0604020202020204" pitchFamily="34" charset="0"/>
+              </a:rPr>
+              <a:t>: </a:t>
+            </a:r>
+            <a:r>
+              <a:rPr lang="it-IT" dirty="0" err="1">
+                <a:solidFill>
+                  <a:schemeClr val="tx1"/>
+                </a:solidFill>
+                <a:latin typeface="Century Gothic" panose="020B0502020202020204" pitchFamily="34" charset="0"/>
+                <a:cs typeface="Arial" panose="020B0604020202020204" pitchFamily="34" charset="0"/>
+              </a:rPr>
+              <a:t>They</a:t>
+            </a:r>
+            <a:r>
+              <a:rPr lang="it-IT" dirty="0">
+                <a:solidFill>
+                  <a:schemeClr val="tx1"/>
+                </a:solidFill>
+                <a:latin typeface="Century Gothic" panose="020B0502020202020204" pitchFamily="34" charset="0"/>
+                <a:cs typeface="Arial" panose="020B0604020202020204" pitchFamily="34" charset="0"/>
+              </a:rPr>
+              <a:t> </a:t>
+            </a:r>
+            <a:r>
+              <a:rPr lang="it-IT" dirty="0" err="1">
+                <a:solidFill>
+                  <a:schemeClr val="tx1"/>
+                </a:solidFill>
+                <a:latin typeface="Century Gothic" panose="020B0502020202020204" pitchFamily="34" charset="0"/>
+                <a:cs typeface="Arial" panose="020B0604020202020204" pitchFamily="34" charset="0"/>
+              </a:rPr>
+              <a:t>manage</a:t>
+            </a:r>
+            <a:r>
+              <a:rPr lang="it-IT" dirty="0">
+                <a:solidFill>
+                  <a:schemeClr val="tx1"/>
+                </a:solidFill>
+                <a:latin typeface="Century Gothic" panose="020B0502020202020204" pitchFamily="34" charset="0"/>
+                <a:cs typeface="Arial" panose="020B0604020202020204" pitchFamily="34" charset="0"/>
+              </a:rPr>
+              <a:t> the </a:t>
+            </a:r>
+            <a:r>
+              <a:rPr lang="it-IT" b="1" dirty="0">
+                <a:solidFill>
+                  <a:schemeClr val="tx1"/>
+                </a:solidFill>
+                <a:latin typeface="Century Gothic" panose="020B0502020202020204" pitchFamily="34" charset="0"/>
+                <a:cs typeface="Arial" panose="020B0604020202020204" pitchFamily="34" charset="0"/>
+              </a:rPr>
+              <a:t>duration</a:t>
+            </a:r>
+            <a:r>
+              <a:rPr lang="it-IT" dirty="0">
+                <a:solidFill>
+                  <a:schemeClr val="tx1"/>
+                </a:solidFill>
+                <a:latin typeface="Century Gothic" panose="020B0502020202020204" pitchFamily="34" charset="0"/>
+                <a:cs typeface="Arial" panose="020B0604020202020204" pitchFamily="34" charset="0"/>
+              </a:rPr>
+              <a:t> of </a:t>
+            </a:r>
+            <a:r>
+              <a:rPr lang="it-IT" dirty="0" err="1">
+                <a:solidFill>
+                  <a:schemeClr val="tx1"/>
+                </a:solidFill>
+                <a:latin typeface="Century Gothic" panose="020B0502020202020204" pitchFamily="34" charset="0"/>
+                <a:cs typeface="Arial" panose="020B0604020202020204" pitchFamily="34" charset="0"/>
+              </a:rPr>
+              <a:t>operations</a:t>
+            </a:r>
+            <a:r>
+              <a:rPr lang="it-IT" dirty="0">
+                <a:solidFill>
+                  <a:schemeClr val="tx1"/>
+                </a:solidFill>
+                <a:latin typeface="Century Gothic" panose="020B0502020202020204" pitchFamily="34" charset="0"/>
+                <a:cs typeface="Arial" panose="020B0604020202020204" pitchFamily="34" charset="0"/>
+              </a:rPr>
+              <a:t> in </a:t>
+            </a:r>
+            <a:r>
+              <a:rPr lang="it-IT" dirty="0" err="1">
+                <a:solidFill>
+                  <a:schemeClr val="tx1"/>
+                </a:solidFill>
+                <a:latin typeface="Century Gothic" panose="020B0502020202020204" pitchFamily="34" charset="0"/>
+                <a:cs typeface="Arial" panose="020B0604020202020204" pitchFamily="34" charset="0"/>
+              </a:rPr>
+              <a:t>each</a:t>
+            </a:r>
+            <a:r>
+              <a:rPr lang="it-IT" dirty="0">
+                <a:solidFill>
+                  <a:schemeClr val="tx1"/>
+                </a:solidFill>
+                <a:latin typeface="Century Gothic" panose="020B0502020202020204" pitchFamily="34" charset="0"/>
+                <a:cs typeface="Arial" panose="020B0604020202020204" pitchFamily="34" charset="0"/>
+              </a:rPr>
+              <a:t> </a:t>
+            </a:r>
+            <a:r>
+              <a:rPr lang="it-IT" dirty="0" err="1">
+                <a:solidFill>
+                  <a:schemeClr val="tx1"/>
+                </a:solidFill>
+                <a:latin typeface="Century Gothic" panose="020B0502020202020204" pitchFamily="34" charset="0"/>
+                <a:cs typeface="Arial" panose="020B0604020202020204" pitchFamily="34" charset="0"/>
+              </a:rPr>
+              <a:t>operating</a:t>
+            </a:r>
+            <a:r>
+              <a:rPr lang="it-IT" dirty="0">
+                <a:solidFill>
+                  <a:schemeClr val="tx1"/>
+                </a:solidFill>
+                <a:latin typeface="Century Gothic" panose="020B0502020202020204" pitchFamily="34" charset="0"/>
+                <a:cs typeface="Arial" panose="020B0604020202020204" pitchFamily="34" charset="0"/>
+              </a:rPr>
+              <a:t> room.</a:t>
+            </a:r>
+            <a:endParaRPr lang="it-IT" dirty="0">
+              <a:effectLst/>
+              <a:latin typeface="Times"/>
+            </a:endParaRPr>
+          </a:p>
+          <a:p>
+            <a:pPr lvl="1"/>
+            <a:endParaRPr lang="it-IT" dirty="0">
+              <a:solidFill>
+                <a:schemeClr val="tx1"/>
+              </a:solidFill>
+              <a:latin typeface="Century Gothic" panose="020B0502020202020204" pitchFamily="34" charset="0"/>
+              <a:cs typeface="Arial" panose="020B0604020202020204" pitchFamily="34" charset="0"/>
+            </a:endParaRPr>
+          </a:p>
+        </p:txBody>
+      </p:sp>
+    </p:spTree>
+    <p:extLst>
+      <p:ext uri="{BB962C8B-B14F-4D97-AF65-F5344CB8AC3E}">
+        <p14:creationId xmlns:p14="http://schemas.microsoft.com/office/powerpoint/2010/main" val="234473396"/>
+      </p:ext>
+    </p:extLst>
+  </p:cSld>
+  <p:clrMapOvr>
+    <a:masterClrMapping/>
+  </p:clrMapOvr>
+</p:sld>
+</file>
+
+<file path=ppt/slides/slide14.xml><?xml version="1.0" encoding="utf-8"?>
+<p:sld xmlns:a="http://schemas.openxmlformats.org/drawingml/2006/main" xmlns:r="http://schemas.openxmlformats.org/officeDocument/2006/relationships" xmlns:p="http://schemas.openxmlformats.org/presentationml/2006/main">
+  <p:cSld>
+    <p:spTree>
+      <p:nvGrpSpPr>
+        <p:cNvPr id="1" name=""/>
+        <p:cNvGrpSpPr/>
+        <p:nvPr/>
+      </p:nvGrpSpPr>
+      <p:grpSpPr>
+        <a:xfrm>
+          <a:off x="0" y="0"/>
+          <a:ext cx="0" cy="0"/>
+          <a:chOff x="0" y="0"/>
+          <a:chExt cx="0" cy="0"/>
+        </a:xfrm>
+      </p:grpSpPr>
+      <p:sp>
+        <p:nvSpPr>
           <p:cNvPr id="2" name="object 2"/>
           <p:cNvSpPr txBox="1">
             <a:spLocks noGrp="1"/>
@@ -5312,7 +6416,7 @@
                 <a:latin typeface="Century Gothic"/>
                 <a:cs typeface="Century Gothic"/>
               </a:rPr>
-              <a:t>13</a:t>
+              <a:t>14</a:t>
             </a:fld>
             <a:endParaRPr sz="1100">
               <a:latin typeface="Century Gothic"/>
@@ -5343,13 +6447,13 @@
               </a:ext>
             </a:extLst>
           </a:blip>
-          <a:srcRect b="53333"/>
+          <a:srcRect t="2222" r="172" b="53333"/>
           <a:stretch/>
         </p:blipFill>
         <p:spPr>
           <a:xfrm>
-            <a:off x="381000" y="2590800"/>
-            <a:ext cx="5877520" cy="3200400"/>
+            <a:off x="381000" y="2743200"/>
+            <a:ext cx="5867400" cy="3048000"/>
           </a:xfrm>
           <a:prstGeom prst="rect">
             <a:avLst/>
@@ -5526,7 +6630,7 @@
 </p:sld>
 </file>
 
-<file path=ppt/slides/slide14.xml><?xml version="1.0" encoding="utf-8"?>
+<file path=ppt/slides/slide15.xml><?xml version="1.0" encoding="utf-8"?>
 <p:sld xmlns:a="http://schemas.openxmlformats.org/drawingml/2006/main" xmlns:r="http://schemas.openxmlformats.org/officeDocument/2006/relationships" xmlns:p="http://schemas.openxmlformats.org/presentationml/2006/main">
   <p:cSld>
     <p:spTree>
@@ -5677,7 +6781,7 @@
                 <a:latin typeface="Century Gothic"/>
                 <a:cs typeface="Century Gothic"/>
               </a:rPr>
-              <a:t>14</a:t>
+              <a:t>15</a:t>
             </a:fld>
             <a:endParaRPr sz="1100">
               <a:latin typeface="Century Gothic"/>
@@ -5701,7 +6805,7 @@
         <p:spPr>
           <a:xfrm>
             <a:off x="152399" y="1407616"/>
-            <a:ext cx="5410201" cy="4154984"/>
+            <a:ext cx="5410201" cy="4893647"/>
           </a:xfrm>
           <a:prstGeom prst="rect">
             <a:avLst/>
@@ -5723,7 +6827,7 @@
                 <a:latin typeface="Century Gothic" panose="020B0502020202020204" pitchFamily="34" charset="0"/>
                 <a:cs typeface="Arial" panose="020B0604020202020204" pitchFamily="34" charset="0"/>
               </a:rPr>
-              <a:t>This program simulates a </a:t>
+              <a:t>This demo represents an </a:t>
             </a:r>
             <a:r>
               <a:rPr lang="en-GB" sz="2400" b="1" dirty="0">
@@ -5733,7 +6837,7 @@
                 <a:latin typeface="Century Gothic" panose="020B0502020202020204" pitchFamily="34" charset="0"/>
                 <a:cs typeface="Arial" panose="020B0604020202020204" pitchFamily="34" charset="0"/>
               </a:rPr>
-              <a:t>hospital</a:t>
+              <a:t>improvement</a:t>
             </a:r>
             <a:r>
               <a:rPr lang="en-GB" sz="2400" dirty="0">
@@ -5743,7 +6847,7 @@
                 <a:latin typeface="Century Gothic" panose="020B0502020202020204" pitchFamily="34" charset="0"/>
                 <a:cs typeface="Arial" panose="020B0604020202020204" pitchFamily="34" charset="0"/>
               </a:rPr>
-              <a:t> with </a:t>
+              <a:t> over the previous hospital management system, with new functionalities and </a:t>
             </a:r>
             <a:r>
               <a:rPr lang="en-GB" sz="2400" b="1" dirty="0">
@@ -5753,7 +6857,7 @@
                 <a:latin typeface="Century Gothic" panose="020B0502020202020204" pitchFamily="34" charset="0"/>
                 <a:cs typeface="Arial" panose="020B0604020202020204" pitchFamily="34" charset="0"/>
               </a:rPr>
-              <a:t>three operating rooms </a:t>
+              <a:t>optimizations</a:t>
             </a:r>
             <a:r>
               <a:rPr lang="en-GB" sz="2400" dirty="0">
@@ -5763,11 +6867,18 @@
                 <a:latin typeface="Century Gothic" panose="020B0502020202020204" pitchFamily="34" charset="0"/>
                 <a:cs typeface="Arial" panose="020B0604020202020204" pitchFamily="34" charset="0"/>
               </a:rPr>
-              <a:t>that accept a finite number of patients. </a:t>
-            </a:r>
-          </a:p>
-          <a:p>
-            <a:pPr algn="l"/>
+              <a:t> to better manage patient operations based on priorities. The additional functionalities include managing patient priorities, removing patients from the list in case of death, and enhancing operation management using </a:t>
+            </a:r>
+            <a:r>
+              <a:rPr lang="en-GB" sz="2400" b="1" dirty="0">
+                <a:solidFill>
+                  <a:schemeClr val="tx1"/>
+                </a:solidFill>
+                <a:latin typeface="Century Gothic" panose="020B0502020202020204" pitchFamily="34" charset="0"/>
+                <a:cs typeface="Arial" panose="020B0604020202020204" pitchFamily="34" charset="0"/>
+              </a:rPr>
+              <a:t>task notifications</a:t>
+            </a:r>
             <a:r>
               <a:rPr lang="en-GB" sz="2400" dirty="0">
                 <a:solidFill>
@@ -5776,140 +6887,7 @@
                 <a:latin typeface="Century Gothic" panose="020B0502020202020204" pitchFamily="34" charset="0"/>
                 <a:cs typeface="Arial" panose="020B0604020202020204" pitchFamily="34" charset="0"/>
               </a:rPr>
-              <a:t>Patients are </a:t>
-            </a:r>
-            <a:r>
-              <a:rPr lang="en-GB" sz="2400" b="1" dirty="0">
-                <a:solidFill>
-                  <a:schemeClr val="tx1"/>
-                </a:solidFill>
-                <a:latin typeface="Century Gothic" panose="020B0502020202020204" pitchFamily="34" charset="0"/>
-                <a:cs typeface="Arial" panose="020B0604020202020204" pitchFamily="34" charset="0"/>
-              </a:rPr>
-              <a:t>queued</a:t>
-            </a:r>
-            <a:r>
-              <a:rPr lang="en-GB" sz="2400" dirty="0">
-                <a:solidFill>
-                  <a:schemeClr val="tx1"/>
-                </a:solidFill>
-                <a:latin typeface="Century Gothic" panose="020B0502020202020204" pitchFamily="34" charset="0"/>
-                <a:cs typeface="Arial" panose="020B0604020202020204" pitchFamily="34" charset="0"/>
-              </a:rPr>
-              <a:t> when they arrive at the hospital, based on their </a:t>
-            </a:r>
-            <a:r>
-              <a:rPr lang="en-GB" sz="2400" b="1" dirty="0">
-                <a:solidFill>
-                  <a:schemeClr val="tx1"/>
-                </a:solidFill>
-                <a:latin typeface="Century Gothic" panose="020B0502020202020204" pitchFamily="34" charset="0"/>
-                <a:cs typeface="Arial" panose="020B0604020202020204" pitchFamily="34" charset="0"/>
-              </a:rPr>
-              <a:t>priority</a:t>
-            </a:r>
-            <a:r>
-              <a:rPr lang="it-IT" sz="2400" dirty="0">
-                <a:solidFill>
-                  <a:schemeClr val="tx1"/>
-                </a:solidFill>
-                <a:latin typeface="Century Gothic" panose="020B0502020202020204" pitchFamily="34" charset="0"/>
-                <a:cs typeface="Arial" panose="020B0604020202020204" pitchFamily="34" charset="0"/>
-              </a:rPr>
-              <a:t>, </a:t>
-            </a:r>
-            <a:r>
-              <a:rPr lang="en-GB" sz="2400" dirty="0">
-                <a:solidFill>
-                  <a:schemeClr val="tx1"/>
-                </a:solidFill>
-                <a:latin typeface="Century Gothic" panose="020B0502020202020204" pitchFamily="34" charset="0"/>
-                <a:cs typeface="Arial" panose="020B0604020202020204" pitchFamily="34" charset="0"/>
-              </a:rPr>
-              <a:t>as in the previous example</a:t>
-            </a:r>
-            <a:r>
-              <a:rPr lang="it-IT" sz="2400" dirty="0">
-                <a:solidFill>
-                  <a:schemeClr val="tx1"/>
-                </a:solidFill>
-                <a:latin typeface="Century Gothic" panose="020B0502020202020204" pitchFamily="34" charset="0"/>
-                <a:cs typeface="Arial" panose="020B0604020202020204" pitchFamily="34" charset="0"/>
-              </a:rPr>
-              <a:t> </a:t>
-            </a:r>
-            <a:r>
-              <a:rPr kumimoji="0" lang="en-GB" altLang="it-IT" sz="2400" b="0" i="0" u="none" strike="noStrike" cap="none" normalizeH="0" baseline="0" dirty="0">
-                <a:ln>
-                  <a:noFill/>
-                </a:ln>
-                <a:solidFill>
-                  <a:schemeClr val="tx1"/>
-                </a:solidFill>
-                <a:effectLst/>
-                <a:latin typeface="Century Gothic" panose="020B0502020202020204" pitchFamily="34" charset="0"/>
-              </a:rPr>
-              <a:t>(priority indicates the severity of the patient's illness). </a:t>
-            </a:r>
-            <a:endParaRPr lang="en-GB" sz="2400" dirty="0">
-              <a:solidFill>
-                <a:schemeClr val="tx1"/>
-              </a:solidFill>
-              <a:latin typeface="Century Gothic" panose="020B0502020202020204" pitchFamily="34" charset="0"/>
-              <a:cs typeface="Arial" panose="020B0604020202020204" pitchFamily="34" charset="0"/>
-            </a:endParaRPr>
-          </a:p>
-          <a:p>
-            <a:pPr algn="l"/>
-            <a:r>
-              <a:rPr lang="en-GB" sz="2400" dirty="0">
-                <a:solidFill>
-                  <a:schemeClr val="tx1"/>
-                </a:solidFill>
-                <a:latin typeface="Century Gothic" panose="020B0502020202020204" pitchFamily="34" charset="0"/>
-                <a:cs typeface="Arial" panose="020B0604020202020204" pitchFamily="34" charset="0"/>
-              </a:rPr>
-              <a:t>As soon as an operating </a:t>
-            </a:r>
-            <a:r>
-              <a:rPr lang="en-GB" sz="2400" b="1" dirty="0">
-                <a:solidFill>
-                  <a:schemeClr val="tx1"/>
-                </a:solidFill>
-                <a:latin typeface="Century Gothic" panose="020B0502020202020204" pitchFamily="34" charset="0"/>
-                <a:cs typeface="Arial" panose="020B0604020202020204" pitchFamily="34" charset="0"/>
-              </a:rPr>
-              <a:t>rooms is free</a:t>
-            </a:r>
-            <a:r>
-              <a:rPr lang="en-GB" sz="2400" dirty="0">
-                <a:solidFill>
-                  <a:schemeClr val="tx1"/>
-                </a:solidFill>
-                <a:latin typeface="Century Gothic" panose="020B0502020202020204" pitchFamily="34" charset="0"/>
-                <a:cs typeface="Arial" panose="020B0604020202020204" pitchFamily="34" charset="0"/>
-              </a:rPr>
-              <a:t>, a new </a:t>
-            </a:r>
-            <a:r>
-              <a:rPr lang="en-GB" sz="2400" b="1" dirty="0">
-                <a:solidFill>
-                  <a:schemeClr val="tx1"/>
-                </a:solidFill>
-                <a:latin typeface="Century Gothic" panose="020B0502020202020204" pitchFamily="34" charset="0"/>
-                <a:cs typeface="Arial" panose="020B0604020202020204" pitchFamily="34" charset="0"/>
-              </a:rPr>
-              <a:t>patient is chosen</a:t>
-            </a:r>
-            <a:r>
-              <a:rPr lang="en-GB" sz="2400" dirty="0">
-                <a:solidFill>
-                  <a:schemeClr val="tx1"/>
-                </a:solidFill>
-                <a:latin typeface="Century Gothic" panose="020B0502020202020204" pitchFamily="34" charset="0"/>
-                <a:cs typeface="Arial" panose="020B0604020202020204" pitchFamily="34" charset="0"/>
-              </a:rPr>
-              <a:t>, based on his priority.</a:t>
+              <a:t>.</a:t>
             </a:r>
           </a:p>
         </p:txBody>
@@ -5987,7 +6965,7 @@
 </p:sld>
 </file>
 
-<file path=ppt/slides/slide15.xml><?xml version="1.0" encoding="utf-8"?>
+<file path=ppt/slides/slide16.xml><?xml version="1.0" encoding="utf-8"?>
 <p:sld xmlns:a="http://schemas.openxmlformats.org/drawingml/2006/main" xmlns:r="http://schemas.openxmlformats.org/officeDocument/2006/relationships" xmlns:p="http://schemas.openxmlformats.org/presentationml/2006/main">
   <p:cSld>
     <p:spTree>
@@ -6168,7 +7146,7 @@
                 <a:latin typeface="Century Gothic"/>
                 <a:cs typeface="Century Gothic"/>
               </a:rPr>
-              <a:t>15</a:t>
+              <a:t>16</a:t>
             </a:fld>
             <a:endParaRPr sz="1100">
               <a:latin typeface="Century Gothic"/>
@@ -6191,8 +7169,8 @@
         </p:nvSpPr>
         <p:spPr>
           <a:xfrm>
-            <a:off x="252580" y="1828800"/>
-            <a:ext cx="2947820" cy="3046988"/>
+            <a:off x="133924" y="1102365"/>
+            <a:ext cx="3709820" cy="5047536"/>
           </a:xfrm>
           <a:prstGeom prst="rect">
             <a:avLst/>
@@ -6207,7 +7185,7 @@
           <a:p>
             <a:pPr algn="l"/>
             <a:r>
-              <a:rPr lang="en-GB" sz="2400" dirty="0">
+              <a:rPr lang="en-GB" sz="2300" dirty="0">
                 <a:solidFill>
                   <a:schemeClr val="tx1"/>
                 </a:solidFill>
@@ -6217,7 +7195,7 @@
               <a:t>This is how the </a:t>
             </a:r>
             <a:r>
-              <a:rPr lang="en-GB" sz="2400" b="1" dirty="0">
+              <a:rPr lang="en-GB" sz="2300" b="1" dirty="0">
                 <a:solidFill>
                   <a:schemeClr val="tx1"/>
                 </a:solidFill>
@@ -6227,7 +7205,80 @@
               <a:t>patient arrival</a:t>
             </a:r>
             <a:r>
-              <a:rPr lang="en-GB" sz="2400" dirty="0">
+              <a:rPr lang="en-GB" sz="2300" dirty="0">
+                <a:solidFill>
+                  <a:schemeClr val="tx1"/>
+                </a:solidFill>
+                <a:latin typeface="Century Gothic" panose="020B0502020202020204" pitchFamily="34" charset="0"/>
+                <a:cs typeface="Arial" panose="020B0604020202020204" pitchFamily="34" charset="0"/>
+              </a:rPr>
+              <a:t>, the patient </a:t>
+            </a:r>
+            <a:r>
+              <a:rPr lang="en-GB" sz="2300" b="1" dirty="0">
+                <a:solidFill>
+                  <a:schemeClr val="tx1"/>
+                </a:solidFill>
+                <a:latin typeface="Century Gothic" panose="020B0502020202020204" pitchFamily="34" charset="0"/>
+                <a:cs typeface="Arial" panose="020B0604020202020204" pitchFamily="34" charset="0"/>
+              </a:rPr>
+              <a:t>enqueueing</a:t>
+            </a:r>
+            <a:r>
+              <a:rPr lang="en-GB" sz="2300" dirty="0">
+                <a:solidFill>
+                  <a:schemeClr val="tx1"/>
+                </a:solidFill>
+                <a:latin typeface="Century Gothic" panose="020B0502020202020204" pitchFamily="34" charset="0"/>
+                <a:cs typeface="Arial" panose="020B0604020202020204" pitchFamily="34" charset="0"/>
+              </a:rPr>
+              <a:t> and surgery operations </a:t>
+            </a:r>
+            <a:r>
+              <a:rPr lang="en-GB" sz="2300" b="1" dirty="0">
+                <a:solidFill>
+                  <a:schemeClr val="tx1"/>
+                </a:solidFill>
+                <a:latin typeface="Century Gothic" panose="020B0502020202020204" pitchFamily="34" charset="0"/>
+                <a:cs typeface="Arial" panose="020B0604020202020204" pitchFamily="34" charset="0"/>
+              </a:rPr>
+              <a:t>starting </a:t>
+            </a:r>
+            <a:r>
+              <a:rPr lang="en-GB" sz="2300" dirty="0">
+                <a:solidFill>
+                  <a:schemeClr val="tx1"/>
+                </a:solidFill>
+                <a:latin typeface="Century Gothic" panose="020B0502020202020204" pitchFamily="34" charset="0"/>
+                <a:cs typeface="Arial" panose="020B0604020202020204" pitchFamily="34" charset="0"/>
+              </a:rPr>
+              <a:t>is managed by </a:t>
+            </a:r>
+          </a:p>
+          <a:p>
+            <a:pPr algn="l"/>
+            <a:r>
+              <a:rPr lang="en-GB" sz="2300" dirty="0">
+                <a:solidFill>
+                  <a:schemeClr val="tx1"/>
+                </a:solidFill>
+                <a:latin typeface="Century Gothic" panose="020B0502020202020204" pitchFamily="34" charset="0"/>
+                <a:cs typeface="Arial" panose="020B0604020202020204" pitchFamily="34" charset="0"/>
+              </a:rPr>
+              <a:t>the hospital. The task scheduler calculates priorities based on </a:t>
+            </a:r>
+            <a:r>
+              <a:rPr lang="en-GB" sz="2300" b="1" dirty="0">
+                <a:solidFill>
+                  <a:schemeClr val="tx1"/>
+                </a:solidFill>
+                <a:latin typeface="Century Gothic" panose="020B0502020202020204" pitchFamily="34" charset="0"/>
+                <a:cs typeface="Arial" panose="020B0604020202020204" pitchFamily="34" charset="0"/>
+              </a:rPr>
+              <a:t>critical time</a:t>
+            </a:r>
+            <a:r>
+              <a:rPr lang="en-GB" sz="2300" dirty="0">
                 <a:solidFill>
                   <a:schemeClr val="tx1"/>
                 </a:solidFill>
@@ -6236,91 +7287,65 @@
               </a:rPr>
               <a:t>, </a:t>
             </a:r>
-          </a:p>
-          <a:p>
-            <a:pPr algn="l"/>
-            <a:r>
-              <a:rPr lang="en-GB" sz="2400" dirty="0">
-                <a:solidFill>
-                  <a:schemeClr val="tx1"/>
-                </a:solidFill>
-                <a:latin typeface="Century Gothic" panose="020B0502020202020204" pitchFamily="34" charset="0"/>
-                <a:cs typeface="Arial" panose="020B0604020202020204" pitchFamily="34" charset="0"/>
-              </a:rPr>
-              <a:t>the patient </a:t>
-            </a:r>
-            <a:r>
-              <a:rPr lang="en-GB" sz="2400" b="1" dirty="0">
-                <a:solidFill>
-                  <a:schemeClr val="tx1"/>
-                </a:solidFill>
-                <a:latin typeface="Century Gothic" panose="020B0502020202020204" pitchFamily="34" charset="0"/>
-                <a:cs typeface="Arial" panose="020B0604020202020204" pitchFamily="34" charset="0"/>
-              </a:rPr>
-              <a:t>enqueueing</a:t>
-            </a:r>
-            <a:r>
-              <a:rPr lang="en-GB" sz="2400" dirty="0">
-                <a:solidFill>
-                  <a:schemeClr val="tx1"/>
-                </a:solidFill>
-                <a:latin typeface="Century Gothic" panose="020B0502020202020204" pitchFamily="34" charset="0"/>
-                <a:cs typeface="Arial" panose="020B0604020202020204" pitchFamily="34" charset="0"/>
-              </a:rPr>
-              <a:t> and </a:t>
-            </a:r>
-            <a:r>
-              <a:rPr lang="en-GB" sz="2400" b="1" dirty="0">
-                <a:solidFill>
-                  <a:schemeClr val="tx1"/>
-                </a:solidFill>
-                <a:latin typeface="Century Gothic" panose="020B0502020202020204" pitchFamily="34" charset="0"/>
-                <a:cs typeface="Arial" panose="020B0604020202020204" pitchFamily="34" charset="0"/>
-              </a:rPr>
-              <a:t>surgery operations starting </a:t>
-            </a:r>
-            <a:r>
-              <a:rPr lang="en-GB" sz="2400" dirty="0">
-                <a:solidFill>
-                  <a:schemeClr val="tx1"/>
-                </a:solidFill>
-                <a:latin typeface="Century Gothic" panose="020B0502020202020204" pitchFamily="34" charset="0"/>
-                <a:cs typeface="Arial" panose="020B0604020202020204" pitchFamily="34" charset="0"/>
-              </a:rPr>
-              <a:t>is </a:t>
-            </a:r>
-            <a:r>
-              <a:rPr lang="en-GB" sz="2400" b="1" dirty="0">
-                <a:solidFill>
-                  <a:schemeClr val="tx1"/>
-                </a:solidFill>
-                <a:latin typeface="Century Gothic" panose="020B0502020202020204" pitchFamily="34" charset="0"/>
-                <a:cs typeface="Arial" panose="020B0604020202020204" pitchFamily="34" charset="0"/>
-              </a:rPr>
-              <a:t>managed</a:t>
-            </a:r>
-            <a:r>
-              <a:rPr lang="en-GB" sz="2400" dirty="0">
-                <a:solidFill>
-                  <a:schemeClr val="tx1"/>
-                </a:solidFill>
-                <a:latin typeface="Century Gothic" panose="020B0502020202020204" pitchFamily="34" charset="0"/>
-                <a:cs typeface="Arial" panose="020B0604020202020204" pitchFamily="34" charset="0"/>
-              </a:rPr>
-              <a:t> by </a:t>
-            </a:r>
-          </a:p>
-          <a:p>
-            <a:pPr algn="l"/>
-            <a:r>
-              <a:rPr lang="en-GB" sz="2400" dirty="0">
-                <a:solidFill>
-                  <a:schemeClr val="tx1"/>
-                </a:solidFill>
-                <a:latin typeface="Century Gothic" panose="020B0502020202020204" pitchFamily="34" charset="0"/>
-                <a:cs typeface="Arial" panose="020B0604020202020204" pitchFamily="34" charset="0"/>
-              </a:rPr>
-              <a:t>the hospital.</a:t>
+            <a:r>
+              <a:rPr lang="en-GB" sz="2300" b="1" dirty="0">
+                <a:solidFill>
+                  <a:schemeClr val="tx1"/>
+                </a:solidFill>
+                <a:latin typeface="Century Gothic" panose="020B0502020202020204" pitchFamily="34" charset="0"/>
+                <a:cs typeface="Arial" panose="020B0604020202020204" pitchFamily="34" charset="0"/>
+              </a:rPr>
+              <a:t>operation duration</a:t>
+            </a:r>
+            <a:r>
+              <a:rPr lang="en-GB" sz="2300" dirty="0">
+                <a:solidFill>
+                  <a:schemeClr val="tx1"/>
+                </a:solidFill>
+                <a:latin typeface="Century Gothic" panose="020B0502020202020204" pitchFamily="34" charset="0"/>
+                <a:cs typeface="Arial" panose="020B0604020202020204" pitchFamily="34" charset="0"/>
+              </a:rPr>
+              <a:t>, and </a:t>
+            </a:r>
+            <a:r>
+              <a:rPr lang="en-GB" sz="2300" b="1" dirty="0">
+                <a:solidFill>
+                  <a:schemeClr val="tx1"/>
+                </a:solidFill>
+                <a:latin typeface="Century Gothic" panose="020B0502020202020204" pitchFamily="34" charset="0"/>
+                <a:cs typeface="Arial" panose="020B0604020202020204" pitchFamily="34" charset="0"/>
+              </a:rPr>
+              <a:t>arrival</a:t>
+            </a:r>
+            <a:r>
+              <a:rPr lang="en-GB" sz="2300" dirty="0">
+                <a:solidFill>
+                  <a:schemeClr val="tx1"/>
+                </a:solidFill>
+                <a:latin typeface="Century Gothic" panose="020B0502020202020204" pitchFamily="34" charset="0"/>
+                <a:cs typeface="Arial" panose="020B0604020202020204" pitchFamily="34" charset="0"/>
+              </a:rPr>
+              <a:t> time, allowing for a more efficient and </a:t>
+            </a:r>
+            <a:r>
+              <a:rPr lang="en-GB" sz="2300" b="1" dirty="0">
+                <a:solidFill>
+                  <a:schemeClr val="tx1"/>
+                </a:solidFill>
+                <a:latin typeface="Century Gothic" panose="020B0502020202020204" pitchFamily="34" charset="0"/>
+                <a:cs typeface="Arial" panose="020B0604020202020204" pitchFamily="34" charset="0"/>
+              </a:rPr>
+              <a:t>realistic</a:t>
+            </a:r>
+            <a:r>
+              <a:rPr lang="en-GB" sz="2300" dirty="0">
+                <a:solidFill>
+                  <a:schemeClr val="tx1"/>
+                </a:solidFill>
+                <a:latin typeface="Century Gothic" panose="020B0502020202020204" pitchFamily="34" charset="0"/>
+                <a:cs typeface="Arial" panose="020B0604020202020204" pitchFamily="34" charset="0"/>
+              </a:rPr>
+              <a:t> management of operations.</a:t>
             </a:r>
           </a:p>
         </p:txBody>
@@ -6368,7 +7393,7 @@
 </p:sld>
 </file>
 
-<file path=ppt/slides/slide16.xml><?xml version="1.0" encoding="utf-8"?>
+<file path=ppt/slides/slide17.xml><?xml version="1.0" encoding="utf-8"?>
 <p:sld xmlns:a="http://schemas.openxmlformats.org/drawingml/2006/main" xmlns:r="http://schemas.openxmlformats.org/officeDocument/2006/relationships" xmlns:p="http://schemas.openxmlformats.org/presentationml/2006/main">
   <p:cSld>
     <p:spTree>
@@ -6519,7 +7544,7 @@
                 <a:latin typeface="Century Gothic"/>
                 <a:cs typeface="Century Gothic"/>
               </a:rPr>
-              <a:t>16</a:t>
+              <a:t>17</a:t>
             </a:fld>
             <a:endParaRPr sz="1100">
               <a:latin typeface="Century Gothic"/>
@@ -6542,7 +7567,7 @@
           </p:cNvPicPr>
           <p:nvPr/>
         </p:nvPicPr>
-        <p:blipFill>
+        <p:blipFill rotWithShape="1">
           <a:blip r:embed="rId2">
             <a:extLst>
               <a:ext uri="{28A0092B-C50C-407E-A947-70E740481C1C}">
@@ -6550,14 +7575,13 @@
               </a:ext>
             </a:extLst>
           </a:blip>
-          <a:stretch>
-            <a:fillRect/>
-          </a:stretch>
+          <a:srcRect t="6064"/>
+          <a:stretch/>
         </p:blipFill>
         <p:spPr>
           <a:xfrm>
-            <a:off x="3200400" y="1496814"/>
-            <a:ext cx="8656724" cy="4218186"/>
+            <a:off x="3224784" y="1752600"/>
+            <a:ext cx="8656724" cy="3962400"/>
           </a:xfrm>
           <a:prstGeom prst="rect">
             <a:avLst/>
@@ -6732,7 +7756,7 @@
 </p:sld>
 </file>
 
-<file path=ppt/slides/slide17.xml><?xml version="1.0" encoding="utf-8"?>
+<file path=ppt/slides/slide18.xml><?xml version="1.0" encoding="utf-8"?>
 <p:sld xmlns:a="http://schemas.openxmlformats.org/drawingml/2006/main" xmlns:r="http://schemas.openxmlformats.org/officeDocument/2006/relationships" xmlns:p="http://schemas.openxmlformats.org/presentationml/2006/main">
   <p:cSld>
     <p:spTree>
@@ -6842,7 +7866,7 @@
                 <a:latin typeface="Century Gothic"/>
                 <a:cs typeface="Century Gothic"/>
               </a:rPr>
-              <a:t>17</a:t>
+              <a:t>18</a:t>
             </a:fld>
             <a:endParaRPr sz="1100">
               <a:latin typeface="Century Gothic"/>
@@ -6924,7 +7948,7 @@
 </p:sld>
 </file>
 
-<file path=ppt/slides/slide18.xml><?xml version="1.0" encoding="utf-8"?>
+<file path=ppt/slides/slide19.xml><?xml version="1.0" encoding="utf-8"?>
 <p:sld xmlns:a="http://schemas.openxmlformats.org/drawingml/2006/main" xmlns:r="http://schemas.openxmlformats.org/officeDocument/2006/relationships" xmlns:p="http://schemas.openxmlformats.org/presentationml/2006/main">
   <p:cSld>
     <p:spTree>
@@ -7075,7 +8099,7 @@
                 <a:latin typeface="Century Gothic"/>
                 <a:cs typeface="Century Gothic"/>
               </a:rPr>
-              <a:t>18</a:t>
+              <a:t>19</a:t>
             </a:fld>
             <a:endParaRPr sz="1100" dirty="0">
               <a:latin typeface="Century Gothic"/>
@@ -7409,464 +8433,6 @@
     <p:extLst>
       <p:ext uri="{BB962C8B-B14F-4D97-AF65-F5344CB8AC3E}">
         <p14:creationId xmlns:p14="http://schemas.microsoft.com/office/powerpoint/2010/main" val="4176023567"/>
-      </p:ext>
-    </p:extLst>
-  </p:cSld>
-  <p:clrMapOvr>
-    <a:masterClrMapping/>
-  </p:clrMapOvr>
-</p:sld>
-</file>
-
-<file path=ppt/slides/slide19.xml><?xml version="1.0" encoding="utf-8"?>
-<p:sld xmlns:a="http://schemas.openxmlformats.org/drawingml/2006/main" xmlns:r="http://schemas.openxmlformats.org/officeDocument/2006/relationships" xmlns:p="http://schemas.openxmlformats.org/presentationml/2006/main">
-  <p:cSld>
-    <p:spTree>
-      <p:nvGrpSpPr>
-        <p:cNvPr id="1" name=""/>
-        <p:cNvGrpSpPr/>
-        <p:nvPr/>
-      </p:nvGrpSpPr>
-      <p:grpSpPr>
-        <a:xfrm>
-          <a:off x="0" y="0"/>
-          <a:ext cx="0" cy="0"/>
-          <a:chOff x="0" y="0"/>
-          <a:chExt cx="0" cy="0"/>
-        </a:xfrm>
-      </p:grpSpPr>
-      <p:sp>
-        <p:nvSpPr>
-          <p:cNvPr id="33" name="object 33"/>
-          <p:cNvSpPr txBox="1">
-            <a:spLocks noGrp="1"/>
-          </p:cNvSpPr>
-          <p:nvPr>
-            <p:ph type="ftr" sz="quarter" idx="5"/>
-          </p:nvPr>
-        </p:nvSpPr>
-        <p:spPr>
-          <a:xfrm>
-            <a:off x="7562619" y="6374466"/>
-            <a:ext cx="3771779" cy="436658"/>
-          </a:xfrm>
-          <a:prstGeom prst="rect">
-            <a:avLst/>
-          </a:prstGeom>
-        </p:spPr>
-        <p:txBody>
-          <a:bodyPr vert="horz" wrap="square" lIns="0" tIns="13335" rIns="0" bIns="0" rtlCol="0">
-            <a:spAutoFit/>
-          </a:bodyPr>
-          <a:lstStyle/>
-          <a:p>
-            <a:pPr marL="2442210">
-              <a:lnSpc>
-                <a:spcPct val="100000"/>
-              </a:lnSpc>
-              <a:spcBef>
-                <a:spcPts val="105"/>
-              </a:spcBef>
-            </a:pPr>
-            <a:r>
-              <a:rPr lang="it-IT" spc="-20" dirty="0"/>
-              <a:t>          Group No. 09</a:t>
-            </a:r>
-            <a:endParaRPr spc="-20" dirty="0"/>
-          </a:p>
-          <a:p>
-            <a:pPr marL="12700">
-              <a:lnSpc>
-                <a:spcPct val="100000"/>
-              </a:lnSpc>
-              <a:spcBef>
-                <a:spcPts val="894"/>
-              </a:spcBef>
-            </a:pPr>
-            <a:r>
-              <a:rPr lang="it-IT" sz="900" spc="180" dirty="0"/>
-              <a:t>Computer Architectures and Operating Systems</a:t>
-            </a:r>
-            <a:endParaRPr sz="900" dirty="0"/>
-          </a:p>
-        </p:txBody>
-      </p:sp>
-      <p:sp>
-        <p:nvSpPr>
-          <p:cNvPr id="34" name="object 34"/>
-          <p:cNvSpPr txBox="1"/>
-          <p:nvPr/>
-        </p:nvSpPr>
-        <p:spPr>
-          <a:xfrm>
-            <a:off x="11571016" y="6399980"/>
-            <a:ext cx="316184" cy="182742"/>
-          </a:xfrm>
-          <a:prstGeom prst="rect">
-            <a:avLst/>
-          </a:prstGeom>
-        </p:spPr>
-        <p:txBody>
-          <a:bodyPr vert="horz" wrap="square" lIns="0" tIns="13335" rIns="0" bIns="0" rtlCol="0">
-            <a:spAutoFit/>
-          </a:bodyPr>
-          <a:lstStyle/>
-          <a:p>
-            <a:pPr marL="38100">
-              <a:lnSpc>
-                <a:spcPct val="100000"/>
-              </a:lnSpc>
-              <a:spcBef>
-                <a:spcPts val="105"/>
-              </a:spcBef>
-            </a:pPr>
-            <a:fld id="{81D60167-4931-47E6-BA6A-407CBD079E47}" type="slidenum">
-              <a:rPr sz="1100" dirty="0">
-                <a:solidFill>
-                  <a:srgbClr val="FFFFFF"/>
-                </a:solidFill>
-                <a:latin typeface="Century Gothic"/>
-                <a:cs typeface="Century Gothic"/>
-              </a:rPr>
-              <a:t>19</a:t>
-            </a:fld>
-            <a:endParaRPr sz="1100" dirty="0">
-              <a:latin typeface="Century Gothic"/>
-              <a:cs typeface="Century Gothic"/>
-            </a:endParaRPr>
-          </a:p>
-        </p:txBody>
-      </p:sp>
-      <p:sp>
-        <p:nvSpPr>
-          <p:cNvPr id="8" name="CasellaDiTesto 7">
-            <a:extLst>
-              <a:ext uri="{FF2B5EF4-FFF2-40B4-BE49-F238E27FC236}">
-                <a16:creationId xmlns:a16="http://schemas.microsoft.com/office/drawing/2014/main" id="{F962E597-8242-FE7A-CBCE-5DC331789E61}"/>
-              </a:ext>
-            </a:extLst>
-          </p:cNvPr>
-          <p:cNvSpPr txBox="1"/>
-          <p:nvPr/>
-        </p:nvSpPr>
-        <p:spPr>
-          <a:xfrm>
-            <a:off x="1295400" y="1097340"/>
-            <a:ext cx="9448800" cy="1569660"/>
-          </a:xfrm>
-          <a:prstGeom prst="rect">
-            <a:avLst/>
-          </a:prstGeom>
-          <a:noFill/>
-        </p:spPr>
-        <p:txBody>
-          <a:bodyPr wrap="square">
-            <a:spAutoFit/>
-          </a:bodyPr>
-          <a:lstStyle/>
-          <a:p>
-            <a:pPr algn="l"/>
-            <a:r>
-              <a:rPr lang="en-GB" sz="2400" dirty="0">
-                <a:solidFill>
-                  <a:schemeClr val="tx1"/>
-                </a:solidFill>
-                <a:latin typeface="Century Gothic" panose="020B0502020202020204" pitchFamily="34" charset="0"/>
-                <a:cs typeface="Arial" panose="020B0604020202020204" pitchFamily="34" charset="0"/>
-              </a:rPr>
-              <a:t>Each </a:t>
-            </a:r>
-            <a:r>
-              <a:rPr lang="en-GB" sz="2400" b="1" dirty="0">
-                <a:solidFill>
-                  <a:schemeClr val="tx1"/>
-                </a:solidFill>
-                <a:latin typeface="Century Gothic" panose="020B0502020202020204" pitchFamily="34" charset="0"/>
-                <a:cs typeface="Arial" panose="020B0604020202020204" pitchFamily="34" charset="0"/>
-              </a:rPr>
-              <a:t>aperiodic task </a:t>
-            </a:r>
-            <a:r>
-              <a:rPr lang="en-GB" sz="2400" dirty="0">
-                <a:solidFill>
-                  <a:schemeClr val="tx1"/>
-                </a:solidFill>
-                <a:latin typeface="Century Gothic" panose="020B0502020202020204" pitchFamily="34" charset="0"/>
-                <a:cs typeface="Arial" panose="020B0604020202020204" pitchFamily="34" charset="0"/>
-              </a:rPr>
-              <a:t>(patient) which </a:t>
-            </a:r>
-            <a:r>
-              <a:rPr lang="en-GB" sz="2400" b="1" dirty="0">
-                <a:solidFill>
-                  <a:schemeClr val="tx1"/>
-                </a:solidFill>
-                <a:latin typeface="Century Gothic" panose="020B0502020202020204" pitchFamily="34" charset="0"/>
-                <a:cs typeface="Arial" panose="020B0604020202020204" pitchFamily="34" charset="0"/>
-              </a:rPr>
-              <a:t>arrive</a:t>
-            </a:r>
-            <a:r>
-              <a:rPr lang="en-GB" sz="2400" dirty="0">
-                <a:solidFill>
-                  <a:schemeClr val="tx1"/>
-                </a:solidFill>
-                <a:latin typeface="Century Gothic" panose="020B0502020202020204" pitchFamily="34" charset="0"/>
-                <a:cs typeface="Arial" panose="020B0604020202020204" pitchFamily="34" charset="0"/>
-              </a:rPr>
-              <a:t> at a time and based on its </a:t>
-            </a:r>
-            <a:r>
-              <a:rPr lang="en-GB" sz="2400" b="1" dirty="0">
-                <a:solidFill>
-                  <a:schemeClr val="tx1"/>
-                </a:solidFill>
-                <a:latin typeface="Century Gothic" panose="020B0502020202020204" pitchFamily="34" charset="0"/>
-                <a:cs typeface="Arial" panose="020B0604020202020204" pitchFamily="34" charset="0"/>
-              </a:rPr>
-              <a:t>critical time</a:t>
-            </a:r>
-            <a:r>
-              <a:rPr lang="en-GB" sz="2400" dirty="0">
-                <a:solidFill>
-                  <a:schemeClr val="tx1"/>
-                </a:solidFill>
-                <a:latin typeface="Century Gothic" panose="020B0502020202020204" pitchFamily="34" charset="0"/>
-                <a:cs typeface="Arial" panose="020B0604020202020204" pitchFamily="34" charset="0"/>
-              </a:rPr>
-              <a:t>, the patient can </a:t>
-            </a:r>
-            <a:r>
-              <a:rPr lang="en-GB" sz="2400" b="1" dirty="0">
-                <a:solidFill>
-                  <a:schemeClr val="tx1"/>
-                </a:solidFill>
-                <a:latin typeface="Century Gothic" panose="020B0502020202020204" pitchFamily="34" charset="0"/>
-                <a:cs typeface="Arial" panose="020B0604020202020204" pitchFamily="34" charset="0"/>
-              </a:rPr>
-              <a:t>die</a:t>
-            </a:r>
-            <a:r>
-              <a:rPr lang="en-GB" sz="2400" dirty="0">
-                <a:solidFill>
-                  <a:schemeClr val="tx1"/>
-                </a:solidFill>
-                <a:latin typeface="Century Gothic" panose="020B0502020202020204" pitchFamily="34" charset="0"/>
-                <a:cs typeface="Arial" panose="020B0604020202020204" pitchFamily="34" charset="0"/>
-              </a:rPr>
-              <a:t> or </a:t>
-            </a:r>
-            <a:r>
-              <a:rPr lang="en-GB" sz="2400" b="1" dirty="0">
-                <a:solidFill>
-                  <a:schemeClr val="tx1"/>
-                </a:solidFill>
-                <a:latin typeface="Century Gothic" panose="020B0502020202020204" pitchFamily="34" charset="0"/>
-                <a:cs typeface="Arial" panose="020B0604020202020204" pitchFamily="34" charset="0"/>
-              </a:rPr>
-              <a:t>start </a:t>
-            </a:r>
-            <a:r>
-              <a:rPr lang="en-GB" sz="2400" dirty="0">
-                <a:solidFill>
-                  <a:schemeClr val="tx1"/>
-                </a:solidFill>
-                <a:latin typeface="Century Gothic" panose="020B0502020202020204" pitchFamily="34" charset="0"/>
-                <a:cs typeface="Arial" panose="020B0604020202020204" pitchFamily="34" charset="0"/>
-              </a:rPr>
-              <a:t>the </a:t>
-            </a:r>
-            <a:r>
-              <a:rPr lang="en-GB" sz="2400" b="1" dirty="0">
-                <a:solidFill>
-                  <a:schemeClr val="tx1"/>
-                </a:solidFill>
-                <a:latin typeface="Century Gothic" panose="020B0502020202020204" pitchFamily="34" charset="0"/>
-                <a:cs typeface="Arial" panose="020B0604020202020204" pitchFamily="34" charset="0"/>
-              </a:rPr>
-              <a:t>surgery</a:t>
-            </a:r>
-            <a:r>
-              <a:rPr lang="en-GB" sz="2400" dirty="0">
-                <a:solidFill>
-                  <a:schemeClr val="tx1"/>
-                </a:solidFill>
-                <a:latin typeface="Century Gothic" panose="020B0502020202020204" pitchFamily="34" charset="0"/>
-                <a:cs typeface="Arial" panose="020B0604020202020204" pitchFamily="34" charset="0"/>
-              </a:rPr>
-              <a:t> </a:t>
-            </a:r>
-            <a:r>
-              <a:rPr lang="en-GB" sz="2400" b="1" dirty="0">
-                <a:solidFill>
-                  <a:schemeClr val="tx1"/>
-                </a:solidFill>
-                <a:latin typeface="Century Gothic" panose="020B0502020202020204" pitchFamily="34" charset="0"/>
-                <a:cs typeface="Arial" panose="020B0604020202020204" pitchFamily="34" charset="0"/>
-              </a:rPr>
-              <a:t>operation</a:t>
-            </a:r>
-            <a:r>
-              <a:rPr lang="en-GB" sz="2400" dirty="0">
-                <a:solidFill>
-                  <a:schemeClr val="tx1"/>
-                </a:solidFill>
-                <a:latin typeface="Century Gothic" panose="020B0502020202020204" pitchFamily="34" charset="0"/>
-                <a:cs typeface="Arial" panose="020B0604020202020204" pitchFamily="34" charset="0"/>
-              </a:rPr>
-              <a:t> and occupies the surgery room. </a:t>
-            </a:r>
-          </a:p>
-          <a:p>
-            <a:pPr algn="l"/>
-            <a:r>
-              <a:rPr lang="en-GB" sz="2400" dirty="0">
-                <a:solidFill>
-                  <a:schemeClr val="tx1"/>
-                </a:solidFill>
-                <a:latin typeface="Century Gothic" panose="020B0502020202020204" pitchFamily="34" charset="0"/>
-                <a:cs typeface="Arial" panose="020B0604020202020204" pitchFamily="34" charset="0"/>
-              </a:rPr>
-              <a:t>When the </a:t>
-            </a:r>
-            <a:r>
-              <a:rPr lang="en-GB" sz="2400" b="1" dirty="0">
-                <a:solidFill>
-                  <a:schemeClr val="tx1"/>
-                </a:solidFill>
-                <a:latin typeface="Century Gothic" panose="020B0502020202020204" pitchFamily="34" charset="0"/>
-                <a:cs typeface="Arial" panose="020B0604020202020204" pitchFamily="34" charset="0"/>
-              </a:rPr>
-              <a:t>operation ends</a:t>
-            </a:r>
-            <a:r>
-              <a:rPr lang="en-GB" sz="2400" dirty="0">
-                <a:solidFill>
-                  <a:schemeClr val="tx1"/>
-                </a:solidFill>
-                <a:latin typeface="Century Gothic" panose="020B0502020202020204" pitchFamily="34" charset="0"/>
-                <a:cs typeface="Arial" panose="020B0604020202020204" pitchFamily="34" charset="0"/>
-              </a:rPr>
-              <a:t>, the patient </a:t>
-            </a:r>
-            <a:r>
-              <a:rPr lang="en-GB" sz="2400" b="1" dirty="0">
-                <a:solidFill>
-                  <a:schemeClr val="tx1"/>
-                </a:solidFill>
-                <a:latin typeface="Century Gothic" panose="020B0502020202020204" pitchFamily="34" charset="0"/>
-                <a:cs typeface="Arial" panose="020B0604020202020204" pitchFamily="34" charset="0"/>
-              </a:rPr>
-              <a:t>leave the room</a:t>
-            </a:r>
-            <a:r>
-              <a:rPr lang="en-GB" sz="2400" dirty="0">
-                <a:solidFill>
-                  <a:schemeClr val="tx1"/>
-                </a:solidFill>
-                <a:latin typeface="Century Gothic" panose="020B0502020202020204" pitchFamily="34" charset="0"/>
-                <a:cs typeface="Arial" panose="020B0604020202020204" pitchFamily="34" charset="0"/>
-              </a:rPr>
-              <a:t>.</a:t>
-            </a:r>
-          </a:p>
-        </p:txBody>
-      </p:sp>
-      <p:sp>
-        <p:nvSpPr>
-          <p:cNvPr id="10" name="object 2">
-            <a:extLst>
-              <a:ext uri="{FF2B5EF4-FFF2-40B4-BE49-F238E27FC236}">
-                <a16:creationId xmlns:a16="http://schemas.microsoft.com/office/drawing/2014/main" id="{36CECDE0-6CAC-54CB-5262-5BF1BE67A6B5}"/>
-              </a:ext>
-            </a:extLst>
-          </p:cNvPr>
-          <p:cNvSpPr txBox="1">
-            <a:spLocks/>
-          </p:cNvSpPr>
-          <p:nvPr/>
-        </p:nvSpPr>
-        <p:spPr>
-          <a:xfrm>
-            <a:off x="304800" y="335395"/>
-            <a:ext cx="5034915" cy="601703"/>
-          </a:xfrm>
-          <a:prstGeom prst="rect">
-            <a:avLst/>
-          </a:prstGeom>
-        </p:spPr>
-        <p:txBody>
-          <a:bodyPr vert="horz" wrap="square" lIns="0" tIns="65405" rIns="0" bIns="0" rtlCol="0">
-            <a:spAutoFit/>
-          </a:bodyPr>
-          <a:lstStyle>
-            <a:lvl1pPr>
-              <a:defRPr sz="3600" b="1" i="0">
-                <a:solidFill>
-                  <a:srgbClr val="003F77"/>
-                </a:solidFill>
-                <a:latin typeface="Century Gothic"/>
-                <a:ea typeface="+mj-ea"/>
-                <a:cs typeface="Century Gothic"/>
-              </a:defRPr>
-            </a:lvl1pPr>
-          </a:lstStyle>
-          <a:p>
-            <a:pPr marL="12700" marR="5080">
-              <a:lnSpc>
-                <a:spcPts val="3979"/>
-              </a:lnSpc>
-              <a:spcBef>
-                <a:spcPts val="515"/>
-              </a:spcBef>
-            </a:pPr>
-            <a:r>
-              <a:rPr lang="it-IT" sz="5400" spc="-10" dirty="0"/>
-              <a:t>Scheduler</a:t>
-            </a:r>
-          </a:p>
-        </p:txBody>
-      </p:sp>
-      <p:pic>
-        <p:nvPicPr>
-          <p:cNvPr id="14" name="Immagine 13" descr="Immagine che contiene testo, schermata, software&#10;&#10;Descrizione generata automaticamente">
-            <a:extLst>
-              <a:ext uri="{FF2B5EF4-FFF2-40B4-BE49-F238E27FC236}">
-                <a16:creationId xmlns:a16="http://schemas.microsoft.com/office/drawing/2014/main" id="{F9AB41D0-EA6D-F53E-7716-7F95D0605735}"/>
-              </a:ext>
-            </a:extLst>
-          </p:cNvPr>
-          <p:cNvPicPr>
-            <a:picLocks noChangeAspect="1"/>
-          </p:cNvPicPr>
-          <p:nvPr/>
-        </p:nvPicPr>
-        <p:blipFill>
-          <a:blip r:embed="rId2">
-            <a:extLst>
-              <a:ext uri="{28A0092B-C50C-407E-A947-70E740481C1C}">
-                <a14:useLocalDpi xmlns:a14="http://schemas.microsoft.com/office/drawing/2010/main" val="0"/>
-              </a:ext>
-            </a:extLst>
-          </a:blip>
-          <a:stretch>
-            <a:fillRect/>
-          </a:stretch>
-        </p:blipFill>
-        <p:spPr>
-          <a:xfrm>
-            <a:off x="1371599" y="2946160"/>
-            <a:ext cx="9448800" cy="3101609"/>
-          </a:xfrm>
-          <a:prstGeom prst="rect">
-            <a:avLst/>
-          </a:prstGeom>
-        </p:spPr>
-      </p:pic>
-    </p:spTree>
-    <p:extLst>
-      <p:ext uri="{BB962C8B-B14F-4D97-AF65-F5344CB8AC3E}">
-        <p14:creationId xmlns:p14="http://schemas.microsoft.com/office/powerpoint/2010/main" val="1990693591"/>
       </p:ext>
     </p:extLst>
   </p:cSld>
@@ -8920,6 +9486,464 @@
       </p:sp>
       <p:sp>
         <p:nvSpPr>
+          <p:cNvPr id="8" name="CasellaDiTesto 7">
+            <a:extLst>
+              <a:ext uri="{FF2B5EF4-FFF2-40B4-BE49-F238E27FC236}">
+                <a16:creationId xmlns:a16="http://schemas.microsoft.com/office/drawing/2014/main" id="{F962E597-8242-FE7A-CBCE-5DC331789E61}"/>
+              </a:ext>
+            </a:extLst>
+          </p:cNvPr>
+          <p:cNvSpPr txBox="1"/>
+          <p:nvPr/>
+        </p:nvSpPr>
+        <p:spPr>
+          <a:xfrm>
+            <a:off x="1295400" y="1097340"/>
+            <a:ext cx="9448800" cy="1569660"/>
+          </a:xfrm>
+          <a:prstGeom prst="rect">
+            <a:avLst/>
+          </a:prstGeom>
+          <a:noFill/>
+        </p:spPr>
+        <p:txBody>
+          <a:bodyPr wrap="square">
+            <a:spAutoFit/>
+          </a:bodyPr>
+          <a:lstStyle/>
+          <a:p>
+            <a:pPr algn="l"/>
+            <a:r>
+              <a:rPr lang="en-GB" sz="2400" dirty="0">
+                <a:solidFill>
+                  <a:schemeClr val="tx1"/>
+                </a:solidFill>
+                <a:latin typeface="Century Gothic" panose="020B0502020202020204" pitchFamily="34" charset="0"/>
+                <a:cs typeface="Arial" panose="020B0604020202020204" pitchFamily="34" charset="0"/>
+              </a:rPr>
+              <a:t>Each </a:t>
+            </a:r>
+            <a:r>
+              <a:rPr lang="en-GB" sz="2400" b="1" dirty="0">
+                <a:solidFill>
+                  <a:schemeClr val="tx1"/>
+                </a:solidFill>
+                <a:latin typeface="Century Gothic" panose="020B0502020202020204" pitchFamily="34" charset="0"/>
+                <a:cs typeface="Arial" panose="020B0604020202020204" pitchFamily="34" charset="0"/>
+              </a:rPr>
+              <a:t>aperiodic task </a:t>
+            </a:r>
+            <a:r>
+              <a:rPr lang="en-GB" sz="2400" dirty="0">
+                <a:solidFill>
+                  <a:schemeClr val="tx1"/>
+                </a:solidFill>
+                <a:latin typeface="Century Gothic" panose="020B0502020202020204" pitchFamily="34" charset="0"/>
+                <a:cs typeface="Arial" panose="020B0604020202020204" pitchFamily="34" charset="0"/>
+              </a:rPr>
+              <a:t>(patient) which </a:t>
+            </a:r>
+            <a:r>
+              <a:rPr lang="en-GB" sz="2400" b="1" dirty="0">
+                <a:solidFill>
+                  <a:schemeClr val="tx1"/>
+                </a:solidFill>
+                <a:latin typeface="Century Gothic" panose="020B0502020202020204" pitchFamily="34" charset="0"/>
+                <a:cs typeface="Arial" panose="020B0604020202020204" pitchFamily="34" charset="0"/>
+              </a:rPr>
+              <a:t>arrive</a:t>
+            </a:r>
+            <a:r>
+              <a:rPr lang="en-GB" sz="2400" dirty="0">
+                <a:solidFill>
+                  <a:schemeClr val="tx1"/>
+                </a:solidFill>
+                <a:latin typeface="Century Gothic" panose="020B0502020202020204" pitchFamily="34" charset="0"/>
+                <a:cs typeface="Arial" panose="020B0604020202020204" pitchFamily="34" charset="0"/>
+              </a:rPr>
+              <a:t> at a time and based on its </a:t>
+            </a:r>
+            <a:r>
+              <a:rPr lang="en-GB" sz="2400" b="1" dirty="0">
+                <a:solidFill>
+                  <a:schemeClr val="tx1"/>
+                </a:solidFill>
+                <a:latin typeface="Century Gothic" panose="020B0502020202020204" pitchFamily="34" charset="0"/>
+                <a:cs typeface="Arial" panose="020B0604020202020204" pitchFamily="34" charset="0"/>
+              </a:rPr>
+              <a:t>critical time</a:t>
+            </a:r>
+            <a:r>
+              <a:rPr lang="en-GB" sz="2400" dirty="0">
+                <a:solidFill>
+                  <a:schemeClr val="tx1"/>
+                </a:solidFill>
+                <a:latin typeface="Century Gothic" panose="020B0502020202020204" pitchFamily="34" charset="0"/>
+                <a:cs typeface="Arial" panose="020B0604020202020204" pitchFamily="34" charset="0"/>
+              </a:rPr>
+              <a:t>, the patient can </a:t>
+            </a:r>
+            <a:r>
+              <a:rPr lang="en-GB" sz="2400" b="1" dirty="0">
+                <a:solidFill>
+                  <a:schemeClr val="tx1"/>
+                </a:solidFill>
+                <a:latin typeface="Century Gothic" panose="020B0502020202020204" pitchFamily="34" charset="0"/>
+                <a:cs typeface="Arial" panose="020B0604020202020204" pitchFamily="34" charset="0"/>
+              </a:rPr>
+              <a:t>die</a:t>
+            </a:r>
+            <a:r>
+              <a:rPr lang="en-GB" sz="2400" dirty="0">
+                <a:solidFill>
+                  <a:schemeClr val="tx1"/>
+                </a:solidFill>
+                <a:latin typeface="Century Gothic" panose="020B0502020202020204" pitchFamily="34" charset="0"/>
+                <a:cs typeface="Arial" panose="020B0604020202020204" pitchFamily="34" charset="0"/>
+              </a:rPr>
+              <a:t> or </a:t>
+            </a:r>
+            <a:r>
+              <a:rPr lang="en-GB" sz="2400" b="1" dirty="0">
+                <a:solidFill>
+                  <a:schemeClr val="tx1"/>
+                </a:solidFill>
+                <a:latin typeface="Century Gothic" panose="020B0502020202020204" pitchFamily="34" charset="0"/>
+                <a:cs typeface="Arial" panose="020B0604020202020204" pitchFamily="34" charset="0"/>
+              </a:rPr>
+              <a:t>start </a:t>
+            </a:r>
+            <a:r>
+              <a:rPr lang="en-GB" sz="2400" dirty="0">
+                <a:solidFill>
+                  <a:schemeClr val="tx1"/>
+                </a:solidFill>
+                <a:latin typeface="Century Gothic" panose="020B0502020202020204" pitchFamily="34" charset="0"/>
+                <a:cs typeface="Arial" panose="020B0604020202020204" pitchFamily="34" charset="0"/>
+              </a:rPr>
+              <a:t>the </a:t>
+            </a:r>
+            <a:r>
+              <a:rPr lang="en-GB" sz="2400" b="1" dirty="0">
+                <a:solidFill>
+                  <a:schemeClr val="tx1"/>
+                </a:solidFill>
+                <a:latin typeface="Century Gothic" panose="020B0502020202020204" pitchFamily="34" charset="0"/>
+                <a:cs typeface="Arial" panose="020B0604020202020204" pitchFamily="34" charset="0"/>
+              </a:rPr>
+              <a:t>surgery</a:t>
+            </a:r>
+            <a:r>
+              <a:rPr lang="en-GB" sz="2400" dirty="0">
+                <a:solidFill>
+                  <a:schemeClr val="tx1"/>
+                </a:solidFill>
+                <a:latin typeface="Century Gothic" panose="020B0502020202020204" pitchFamily="34" charset="0"/>
+                <a:cs typeface="Arial" panose="020B0604020202020204" pitchFamily="34" charset="0"/>
+              </a:rPr>
+              <a:t> </a:t>
+            </a:r>
+            <a:r>
+              <a:rPr lang="en-GB" sz="2400" b="1" dirty="0">
+                <a:solidFill>
+                  <a:schemeClr val="tx1"/>
+                </a:solidFill>
+                <a:latin typeface="Century Gothic" panose="020B0502020202020204" pitchFamily="34" charset="0"/>
+                <a:cs typeface="Arial" panose="020B0604020202020204" pitchFamily="34" charset="0"/>
+              </a:rPr>
+              <a:t>operation</a:t>
+            </a:r>
+            <a:r>
+              <a:rPr lang="en-GB" sz="2400" dirty="0">
+                <a:solidFill>
+                  <a:schemeClr val="tx1"/>
+                </a:solidFill>
+                <a:latin typeface="Century Gothic" panose="020B0502020202020204" pitchFamily="34" charset="0"/>
+                <a:cs typeface="Arial" panose="020B0604020202020204" pitchFamily="34" charset="0"/>
+              </a:rPr>
+              <a:t> and occupies the surgery room. </a:t>
+            </a:r>
+          </a:p>
+          <a:p>
+            <a:pPr algn="l"/>
+            <a:r>
+              <a:rPr lang="en-GB" sz="2400" dirty="0">
+                <a:solidFill>
+                  <a:schemeClr val="tx1"/>
+                </a:solidFill>
+                <a:latin typeface="Century Gothic" panose="020B0502020202020204" pitchFamily="34" charset="0"/>
+                <a:cs typeface="Arial" panose="020B0604020202020204" pitchFamily="34" charset="0"/>
+              </a:rPr>
+              <a:t>When the </a:t>
+            </a:r>
+            <a:r>
+              <a:rPr lang="en-GB" sz="2400" b="1" dirty="0">
+                <a:solidFill>
+                  <a:schemeClr val="tx1"/>
+                </a:solidFill>
+                <a:latin typeface="Century Gothic" panose="020B0502020202020204" pitchFamily="34" charset="0"/>
+                <a:cs typeface="Arial" panose="020B0604020202020204" pitchFamily="34" charset="0"/>
+              </a:rPr>
+              <a:t>operation ends</a:t>
+            </a:r>
+            <a:r>
+              <a:rPr lang="en-GB" sz="2400" dirty="0">
+                <a:solidFill>
+                  <a:schemeClr val="tx1"/>
+                </a:solidFill>
+                <a:latin typeface="Century Gothic" panose="020B0502020202020204" pitchFamily="34" charset="0"/>
+                <a:cs typeface="Arial" panose="020B0604020202020204" pitchFamily="34" charset="0"/>
+              </a:rPr>
+              <a:t>, the patient </a:t>
+            </a:r>
+            <a:r>
+              <a:rPr lang="en-GB" sz="2400" b="1" dirty="0">
+                <a:solidFill>
+                  <a:schemeClr val="tx1"/>
+                </a:solidFill>
+                <a:latin typeface="Century Gothic" panose="020B0502020202020204" pitchFamily="34" charset="0"/>
+                <a:cs typeface="Arial" panose="020B0604020202020204" pitchFamily="34" charset="0"/>
+              </a:rPr>
+              <a:t>leave the room</a:t>
+            </a:r>
+            <a:r>
+              <a:rPr lang="en-GB" sz="2400" dirty="0">
+                <a:solidFill>
+                  <a:schemeClr val="tx1"/>
+                </a:solidFill>
+                <a:latin typeface="Century Gothic" panose="020B0502020202020204" pitchFamily="34" charset="0"/>
+                <a:cs typeface="Arial" panose="020B0604020202020204" pitchFamily="34" charset="0"/>
+              </a:rPr>
+              <a:t>.</a:t>
+            </a:r>
+          </a:p>
+        </p:txBody>
+      </p:sp>
+      <p:sp>
+        <p:nvSpPr>
+          <p:cNvPr id="10" name="object 2">
+            <a:extLst>
+              <a:ext uri="{FF2B5EF4-FFF2-40B4-BE49-F238E27FC236}">
+                <a16:creationId xmlns:a16="http://schemas.microsoft.com/office/drawing/2014/main" id="{36CECDE0-6CAC-54CB-5262-5BF1BE67A6B5}"/>
+              </a:ext>
+            </a:extLst>
+          </p:cNvPr>
+          <p:cNvSpPr txBox="1">
+            <a:spLocks/>
+          </p:cNvSpPr>
+          <p:nvPr/>
+        </p:nvSpPr>
+        <p:spPr>
+          <a:xfrm>
+            <a:off x="304800" y="335395"/>
+            <a:ext cx="5034915" cy="601703"/>
+          </a:xfrm>
+          <a:prstGeom prst="rect">
+            <a:avLst/>
+          </a:prstGeom>
+        </p:spPr>
+        <p:txBody>
+          <a:bodyPr vert="horz" wrap="square" lIns="0" tIns="65405" rIns="0" bIns="0" rtlCol="0">
+            <a:spAutoFit/>
+          </a:bodyPr>
+          <a:lstStyle>
+            <a:lvl1pPr>
+              <a:defRPr sz="3600" b="1" i="0">
+                <a:solidFill>
+                  <a:srgbClr val="003F77"/>
+                </a:solidFill>
+                <a:latin typeface="Century Gothic"/>
+                <a:ea typeface="+mj-ea"/>
+                <a:cs typeface="Century Gothic"/>
+              </a:defRPr>
+            </a:lvl1pPr>
+          </a:lstStyle>
+          <a:p>
+            <a:pPr marL="12700" marR="5080">
+              <a:lnSpc>
+                <a:spcPts val="3979"/>
+              </a:lnSpc>
+              <a:spcBef>
+                <a:spcPts val="515"/>
+              </a:spcBef>
+            </a:pPr>
+            <a:r>
+              <a:rPr lang="it-IT" sz="5400" spc="-10" dirty="0"/>
+              <a:t>Scheduler</a:t>
+            </a:r>
+          </a:p>
+        </p:txBody>
+      </p:sp>
+      <p:pic>
+        <p:nvPicPr>
+          <p:cNvPr id="14" name="Immagine 13" descr="Immagine che contiene testo, schermata, software&#10;&#10;Descrizione generata automaticamente">
+            <a:extLst>
+              <a:ext uri="{FF2B5EF4-FFF2-40B4-BE49-F238E27FC236}">
+                <a16:creationId xmlns:a16="http://schemas.microsoft.com/office/drawing/2014/main" id="{F9AB41D0-EA6D-F53E-7716-7F95D0605735}"/>
+              </a:ext>
+            </a:extLst>
+          </p:cNvPr>
+          <p:cNvPicPr>
+            <a:picLocks noChangeAspect="1"/>
+          </p:cNvPicPr>
+          <p:nvPr/>
+        </p:nvPicPr>
+        <p:blipFill>
+          <a:blip r:embed="rId2">
+            <a:extLst>
+              <a:ext uri="{28A0092B-C50C-407E-A947-70E740481C1C}">
+                <a14:useLocalDpi xmlns:a14="http://schemas.microsoft.com/office/drawing/2010/main" val="0"/>
+              </a:ext>
+            </a:extLst>
+          </a:blip>
+          <a:stretch>
+            <a:fillRect/>
+          </a:stretch>
+        </p:blipFill>
+        <p:spPr>
+          <a:xfrm>
+            <a:off x="1371599" y="2946160"/>
+            <a:ext cx="9448800" cy="3101609"/>
+          </a:xfrm>
+          <a:prstGeom prst="rect">
+            <a:avLst/>
+          </a:prstGeom>
+        </p:spPr>
+      </p:pic>
+    </p:spTree>
+    <p:extLst>
+      <p:ext uri="{BB962C8B-B14F-4D97-AF65-F5344CB8AC3E}">
+        <p14:creationId xmlns:p14="http://schemas.microsoft.com/office/powerpoint/2010/main" val="1990693591"/>
+      </p:ext>
+    </p:extLst>
+  </p:cSld>
+  <p:clrMapOvr>
+    <a:masterClrMapping/>
+  </p:clrMapOvr>
+</p:sld>
+</file>
+
+<file path=ppt/slides/slide21.xml><?xml version="1.0" encoding="utf-8"?>
+<p:sld xmlns:a="http://schemas.openxmlformats.org/drawingml/2006/main" xmlns:r="http://schemas.openxmlformats.org/officeDocument/2006/relationships" xmlns:p="http://schemas.openxmlformats.org/presentationml/2006/main">
+  <p:cSld>
+    <p:spTree>
+      <p:nvGrpSpPr>
+        <p:cNvPr id="1" name=""/>
+        <p:cNvGrpSpPr/>
+        <p:nvPr/>
+      </p:nvGrpSpPr>
+      <p:grpSpPr>
+        <a:xfrm>
+          <a:off x="0" y="0"/>
+          <a:ext cx="0" cy="0"/>
+          <a:chOff x="0" y="0"/>
+          <a:chExt cx="0" cy="0"/>
+        </a:xfrm>
+      </p:grpSpPr>
+      <p:sp>
+        <p:nvSpPr>
+          <p:cNvPr id="33" name="object 33"/>
+          <p:cNvSpPr txBox="1">
+            <a:spLocks noGrp="1"/>
+          </p:cNvSpPr>
+          <p:nvPr>
+            <p:ph type="ftr" sz="quarter" idx="5"/>
+          </p:nvPr>
+        </p:nvSpPr>
+        <p:spPr>
+          <a:xfrm>
+            <a:off x="7562619" y="6374466"/>
+            <a:ext cx="3771779" cy="436658"/>
+          </a:xfrm>
+          <a:prstGeom prst="rect">
+            <a:avLst/>
+          </a:prstGeom>
+        </p:spPr>
+        <p:txBody>
+          <a:bodyPr vert="horz" wrap="square" lIns="0" tIns="13335" rIns="0" bIns="0" rtlCol="0">
+            <a:spAutoFit/>
+          </a:bodyPr>
+          <a:lstStyle/>
+          <a:p>
+            <a:pPr marL="2442210">
+              <a:lnSpc>
+                <a:spcPct val="100000"/>
+              </a:lnSpc>
+              <a:spcBef>
+                <a:spcPts val="105"/>
+              </a:spcBef>
+            </a:pPr>
+            <a:r>
+              <a:rPr lang="it-IT" spc="-20" dirty="0"/>
+              <a:t>          Group No. 09</a:t>
+            </a:r>
+            <a:endParaRPr spc="-20" dirty="0"/>
+          </a:p>
+          <a:p>
+            <a:pPr marL="12700">
+              <a:lnSpc>
+                <a:spcPct val="100000"/>
+              </a:lnSpc>
+              <a:spcBef>
+                <a:spcPts val="894"/>
+              </a:spcBef>
+            </a:pPr>
+            <a:r>
+              <a:rPr lang="it-IT" sz="900" spc="180" dirty="0"/>
+              <a:t>Computer Architectures and Operating Systems</a:t>
+            </a:r>
+            <a:endParaRPr sz="900" dirty="0"/>
+          </a:p>
+        </p:txBody>
+      </p:sp>
+      <p:sp>
+        <p:nvSpPr>
+          <p:cNvPr id="34" name="object 34"/>
+          <p:cNvSpPr txBox="1"/>
+          <p:nvPr/>
+        </p:nvSpPr>
+        <p:spPr>
+          <a:xfrm>
+            <a:off x="11571016" y="6399980"/>
+            <a:ext cx="316184" cy="182742"/>
+          </a:xfrm>
+          <a:prstGeom prst="rect">
+            <a:avLst/>
+          </a:prstGeom>
+        </p:spPr>
+        <p:txBody>
+          <a:bodyPr vert="horz" wrap="square" lIns="0" tIns="13335" rIns="0" bIns="0" rtlCol="0">
+            <a:spAutoFit/>
+          </a:bodyPr>
+          <a:lstStyle/>
+          <a:p>
+            <a:pPr marL="38100">
+              <a:lnSpc>
+                <a:spcPct val="100000"/>
+              </a:lnSpc>
+              <a:spcBef>
+                <a:spcPts val="105"/>
+              </a:spcBef>
+            </a:pPr>
+            <a:fld id="{81D60167-4931-47E6-BA6A-407CBD079E47}" type="slidenum">
+              <a:rPr sz="1100" dirty="0">
+                <a:solidFill>
+                  <a:srgbClr val="FFFFFF"/>
+                </a:solidFill>
+                <a:latin typeface="Century Gothic"/>
+                <a:cs typeface="Century Gothic"/>
+              </a:rPr>
+              <a:t>21</a:t>
+            </a:fld>
+            <a:endParaRPr sz="1100" dirty="0">
+              <a:latin typeface="Century Gothic"/>
+              <a:cs typeface="Century Gothic"/>
+            </a:endParaRPr>
+          </a:p>
+        </p:txBody>
+      </p:sp>
+      <p:sp>
+        <p:nvSpPr>
           <p:cNvPr id="6" name="CasellaDiTesto 5">
             <a:extLst>
               <a:ext uri="{FF2B5EF4-FFF2-40B4-BE49-F238E27FC236}">
@@ -9190,7 +10214,7 @@
 </p:sld>
 </file>
 
-<file path=ppt/slides/slide21.xml><?xml version="1.0" encoding="utf-8"?>
+<file path=ppt/slides/slide22.xml><?xml version="1.0" encoding="utf-8"?>
 <p:sld xmlns:a="http://schemas.openxmlformats.org/drawingml/2006/main" xmlns:r="http://schemas.openxmlformats.org/officeDocument/2006/relationships" xmlns:p="http://schemas.openxmlformats.org/presentationml/2006/main">
   <p:cSld>
     <p:spTree>
@@ -9300,7 +10324,7 @@
                 <a:latin typeface="Century Gothic"/>
                 <a:cs typeface="Century Gothic"/>
               </a:rPr>
-              <a:t>21</a:t>
+              <a:t>22</a:t>
             </a:fld>
             <a:endParaRPr sz="1100" dirty="0">
               <a:latin typeface="Century Gothic"/>
@@ -9687,365 +10711,6 @@
 </p:sld>
 </file>
 
-<file path=ppt/slides/slide22.xml><?xml version="1.0" encoding="utf-8"?>
-<p:sld xmlns:a="http://schemas.openxmlformats.org/drawingml/2006/main" xmlns:r="http://schemas.openxmlformats.org/officeDocument/2006/relationships" xmlns:p="http://schemas.openxmlformats.org/presentationml/2006/main">
-  <p:cSld>
-    <p:spTree>
-      <p:nvGrpSpPr>
-        <p:cNvPr id="1" name=""/>
-        <p:cNvGrpSpPr/>
-        <p:nvPr/>
-      </p:nvGrpSpPr>
-      <p:grpSpPr>
-        <a:xfrm>
-          <a:off x="0" y="0"/>
-          <a:ext cx="0" cy="0"/>
-          <a:chOff x="0" y="0"/>
-          <a:chExt cx="0" cy="0"/>
-        </a:xfrm>
-      </p:grpSpPr>
-      <p:sp>
-        <p:nvSpPr>
-          <p:cNvPr id="33" name="object 33"/>
-          <p:cNvSpPr txBox="1">
-            <a:spLocks noGrp="1"/>
-          </p:cNvSpPr>
-          <p:nvPr>
-            <p:ph type="ftr" sz="quarter" idx="5"/>
-          </p:nvPr>
-        </p:nvSpPr>
-        <p:spPr>
-          <a:xfrm>
-            <a:off x="7562619" y="6374466"/>
-            <a:ext cx="3771779" cy="436658"/>
-          </a:xfrm>
-          <a:prstGeom prst="rect">
-            <a:avLst/>
-          </a:prstGeom>
-        </p:spPr>
-        <p:txBody>
-          <a:bodyPr vert="horz" wrap="square" lIns="0" tIns="13335" rIns="0" bIns="0" rtlCol="0">
-            <a:spAutoFit/>
-          </a:bodyPr>
-          <a:lstStyle/>
-          <a:p>
-            <a:pPr marL="2442210">
-              <a:lnSpc>
-                <a:spcPct val="100000"/>
-              </a:lnSpc>
-              <a:spcBef>
-                <a:spcPts val="105"/>
-              </a:spcBef>
-            </a:pPr>
-            <a:r>
-              <a:rPr lang="it-IT" spc="-20" dirty="0"/>
-              <a:t>          Group No. 09</a:t>
-            </a:r>
-            <a:endParaRPr spc="-20" dirty="0"/>
-          </a:p>
-          <a:p>
-            <a:pPr marL="12700">
-              <a:lnSpc>
-                <a:spcPct val="100000"/>
-              </a:lnSpc>
-              <a:spcBef>
-                <a:spcPts val="894"/>
-              </a:spcBef>
-            </a:pPr>
-            <a:r>
-              <a:rPr lang="it-IT" sz="900" spc="180" dirty="0"/>
-              <a:t>Computer Architectures and Operating Systems</a:t>
-            </a:r>
-            <a:endParaRPr sz="900" dirty="0"/>
-          </a:p>
-        </p:txBody>
-      </p:sp>
-      <p:sp>
-        <p:nvSpPr>
-          <p:cNvPr id="34" name="object 34"/>
-          <p:cNvSpPr txBox="1"/>
-          <p:nvPr/>
-        </p:nvSpPr>
-        <p:spPr>
-          <a:xfrm>
-            <a:off x="11571016" y="6399980"/>
-            <a:ext cx="316184" cy="182742"/>
-          </a:xfrm>
-          <a:prstGeom prst="rect">
-            <a:avLst/>
-          </a:prstGeom>
-        </p:spPr>
-        <p:txBody>
-          <a:bodyPr vert="horz" wrap="square" lIns="0" tIns="13335" rIns="0" bIns="0" rtlCol="0">
-            <a:spAutoFit/>
-          </a:bodyPr>
-          <a:lstStyle/>
-          <a:p>
-            <a:pPr marL="38100">
-              <a:lnSpc>
-                <a:spcPct val="100000"/>
-              </a:lnSpc>
-              <a:spcBef>
-                <a:spcPts val="105"/>
-              </a:spcBef>
-            </a:pPr>
-            <a:fld id="{81D60167-4931-47E6-BA6A-407CBD079E47}" type="slidenum">
-              <a:rPr sz="1100" dirty="0">
-                <a:solidFill>
-                  <a:srgbClr val="FFFFFF"/>
-                </a:solidFill>
-                <a:latin typeface="Century Gothic"/>
-                <a:cs typeface="Century Gothic"/>
-              </a:rPr>
-              <a:t>22</a:t>
-            </a:fld>
-            <a:endParaRPr sz="1100" dirty="0">
-              <a:latin typeface="Century Gothic"/>
-              <a:cs typeface="Century Gothic"/>
-            </a:endParaRPr>
-          </a:p>
-        </p:txBody>
-      </p:sp>
-      <p:sp>
-        <p:nvSpPr>
-          <p:cNvPr id="10" name="object 2">
-            <a:extLst>
-              <a:ext uri="{FF2B5EF4-FFF2-40B4-BE49-F238E27FC236}">
-                <a16:creationId xmlns:a16="http://schemas.microsoft.com/office/drawing/2014/main" id="{B572DE95-7AC1-34A4-D289-2458DF658275}"/>
-              </a:ext>
-            </a:extLst>
-          </p:cNvPr>
-          <p:cNvSpPr txBox="1">
-            <a:spLocks/>
-          </p:cNvSpPr>
-          <p:nvPr/>
-        </p:nvSpPr>
-        <p:spPr>
-          <a:xfrm>
-            <a:off x="304800" y="335395"/>
-            <a:ext cx="8229600" cy="601703"/>
-          </a:xfrm>
-          <a:prstGeom prst="rect">
-            <a:avLst/>
-          </a:prstGeom>
-        </p:spPr>
-        <p:txBody>
-          <a:bodyPr vert="horz" wrap="square" lIns="0" tIns="65405" rIns="0" bIns="0" rtlCol="0">
-            <a:spAutoFit/>
-          </a:bodyPr>
-          <a:lstStyle>
-            <a:lvl1pPr>
-              <a:defRPr sz="3600" b="1" i="0">
-                <a:solidFill>
-                  <a:srgbClr val="003F77"/>
-                </a:solidFill>
-                <a:latin typeface="Century Gothic"/>
-                <a:ea typeface="+mj-ea"/>
-                <a:cs typeface="Century Gothic"/>
-              </a:defRPr>
-            </a:lvl1pPr>
-          </a:lstStyle>
-          <a:p>
-            <a:pPr marL="12700" marR="5080">
-              <a:lnSpc>
-                <a:spcPts val="3979"/>
-              </a:lnSpc>
-              <a:spcBef>
-                <a:spcPts val="515"/>
-              </a:spcBef>
-            </a:pPr>
-            <a:r>
-              <a:rPr lang="it-IT" sz="5400" spc="-10" dirty="0" err="1"/>
-              <a:t>Scheduler</a:t>
-            </a:r>
-            <a:r>
-              <a:rPr lang="it-IT" sz="5400" spc="-10" dirty="0"/>
-              <a:t> - Output</a:t>
-            </a:r>
-          </a:p>
-        </p:txBody>
-      </p:sp>
-      <p:sp>
-        <p:nvSpPr>
-          <p:cNvPr id="2" name="CasellaDiTesto 1">
-            <a:extLst>
-              <a:ext uri="{FF2B5EF4-FFF2-40B4-BE49-F238E27FC236}">
-                <a16:creationId xmlns:a16="http://schemas.microsoft.com/office/drawing/2014/main" id="{3427DE7B-1B1F-FD7D-FC43-A2FD966C36C7}"/>
-              </a:ext>
-            </a:extLst>
-          </p:cNvPr>
-          <p:cNvSpPr txBox="1"/>
-          <p:nvPr/>
-        </p:nvSpPr>
-        <p:spPr>
-          <a:xfrm>
-            <a:off x="304800" y="1295400"/>
-            <a:ext cx="11582400" cy="830997"/>
-          </a:xfrm>
-          <a:prstGeom prst="rect">
-            <a:avLst/>
-          </a:prstGeom>
-          <a:noFill/>
-        </p:spPr>
-        <p:txBody>
-          <a:bodyPr wrap="square">
-            <a:spAutoFit/>
-          </a:bodyPr>
-          <a:lstStyle/>
-          <a:p>
-            <a:pPr algn="l"/>
-            <a:r>
-              <a:rPr lang="en-GB" sz="2400" dirty="0">
-                <a:solidFill>
-                  <a:schemeClr val="tx1"/>
-                </a:solidFill>
-                <a:latin typeface="Century Gothic" panose="020B0502020202020204" pitchFamily="34" charset="0"/>
-                <a:cs typeface="Arial" panose="020B0604020202020204" pitchFamily="34" charset="0"/>
-              </a:rPr>
-              <a:t>The following </a:t>
-            </a:r>
-            <a:r>
-              <a:rPr lang="en-GB" sz="2400" b="1" dirty="0">
-                <a:solidFill>
-                  <a:schemeClr val="tx1"/>
-                </a:solidFill>
-                <a:latin typeface="Century Gothic" panose="020B0502020202020204" pitchFamily="34" charset="0"/>
-                <a:cs typeface="Arial" panose="020B0604020202020204" pitchFamily="34" charset="0"/>
-              </a:rPr>
-              <a:t>output</a:t>
-            </a:r>
-            <a:r>
-              <a:rPr lang="en-GB" sz="2400" dirty="0">
-                <a:solidFill>
-                  <a:schemeClr val="tx1"/>
-                </a:solidFill>
-                <a:latin typeface="Century Gothic" panose="020B0502020202020204" pitchFamily="34" charset="0"/>
-                <a:cs typeface="Arial" panose="020B0604020202020204" pitchFamily="34" charset="0"/>
-              </a:rPr>
-              <a:t> shows the </a:t>
-            </a:r>
-            <a:r>
-              <a:rPr lang="en-GB" sz="2400" b="1" dirty="0">
-                <a:solidFill>
-                  <a:schemeClr val="tx1"/>
-                </a:solidFill>
-                <a:latin typeface="Century Gothic" panose="020B0502020202020204" pitchFamily="34" charset="0"/>
-                <a:cs typeface="Arial" panose="020B0604020202020204" pitchFamily="34" charset="0"/>
-              </a:rPr>
-              <a:t>obtained results </a:t>
-            </a:r>
-            <a:r>
-              <a:rPr lang="en-GB" sz="2400" dirty="0">
-                <a:solidFill>
-                  <a:schemeClr val="tx1"/>
-                </a:solidFill>
-                <a:latin typeface="Century Gothic" panose="020B0502020202020204" pitchFamily="34" charset="0"/>
-                <a:cs typeface="Arial" panose="020B0604020202020204" pitchFamily="34" charset="0"/>
-              </a:rPr>
-              <a:t>running the demoScheduler with </a:t>
-            </a:r>
-            <a:r>
-              <a:rPr lang="en-GB" sz="2400" b="1" dirty="0" err="1">
-                <a:solidFill>
-                  <a:schemeClr val="tx1"/>
-                </a:solidFill>
-                <a:latin typeface="Century Gothic" panose="020B0502020202020204" pitchFamily="34" charset="0"/>
-                <a:cs typeface="Arial" panose="020B0604020202020204" pitchFamily="34" charset="0"/>
-              </a:rPr>
-              <a:t>FreeRTOS</a:t>
-            </a:r>
-            <a:r>
-              <a:rPr lang="en-GB" sz="2400" b="1" dirty="0">
-                <a:solidFill>
-                  <a:schemeClr val="tx1"/>
-                </a:solidFill>
-                <a:latin typeface="Century Gothic" panose="020B0502020202020204" pitchFamily="34" charset="0"/>
-                <a:cs typeface="Arial" panose="020B0604020202020204" pitchFamily="34" charset="0"/>
-              </a:rPr>
-              <a:t> scheduler </a:t>
-            </a:r>
-            <a:r>
-              <a:rPr lang="en-GB" sz="2400" dirty="0">
-                <a:solidFill>
-                  <a:schemeClr val="tx1"/>
-                </a:solidFill>
-                <a:latin typeface="Century Gothic" panose="020B0502020202020204" pitchFamily="34" charset="0"/>
-                <a:cs typeface="Arial" panose="020B0604020202020204" pitchFamily="34" charset="0"/>
-              </a:rPr>
-              <a:t>implemented </a:t>
-            </a:r>
-            <a:r>
-              <a:rPr lang="en-GB" sz="2400" b="1" dirty="0">
-                <a:solidFill>
-                  <a:schemeClr val="tx1"/>
-                </a:solidFill>
-                <a:latin typeface="Century Gothic" panose="020B0502020202020204" pitchFamily="34" charset="0"/>
-                <a:cs typeface="Arial" panose="020B0604020202020204" pitchFamily="34" charset="0"/>
-              </a:rPr>
-              <a:t>with preemption</a:t>
-            </a:r>
-            <a:r>
-              <a:rPr lang="en-GB" sz="2400" dirty="0">
-                <a:solidFill>
-                  <a:schemeClr val="tx1"/>
-                </a:solidFill>
-                <a:latin typeface="Century Gothic" panose="020B0502020202020204" pitchFamily="34" charset="0"/>
-                <a:cs typeface="Arial" panose="020B0604020202020204" pitchFamily="34" charset="0"/>
-              </a:rPr>
-              <a:t>.</a:t>
-            </a:r>
-          </a:p>
-        </p:txBody>
-      </p:sp>
-      <p:pic>
-        <p:nvPicPr>
-          <p:cNvPr id="4" name="Immagine 3" descr="Immagine che contiene testo, Carattere, schermata&#10;&#10;Descrizione generata automaticamente">
-            <a:extLst>
-              <a:ext uri="{FF2B5EF4-FFF2-40B4-BE49-F238E27FC236}">
-                <a16:creationId xmlns:a16="http://schemas.microsoft.com/office/drawing/2014/main" id="{AECA422C-99AF-8155-596B-87CD760237E8}"/>
-              </a:ext>
-            </a:extLst>
-          </p:cNvPr>
-          <p:cNvPicPr>
-            <a:picLocks noChangeAspect="1"/>
-          </p:cNvPicPr>
-          <p:nvPr/>
-        </p:nvPicPr>
-        <p:blipFill>
-          <a:blip r:embed="rId2">
-            <a:extLst>
-              <a:ext uri="{28A0092B-C50C-407E-A947-70E740481C1C}">
-                <a14:useLocalDpi xmlns:a14="http://schemas.microsoft.com/office/drawing/2010/main" val="0"/>
-              </a:ext>
-            </a:extLst>
-          </a:blip>
-          <a:stretch>
-            <a:fillRect/>
-          </a:stretch>
-        </p:blipFill>
-        <p:spPr>
-          <a:xfrm>
-            <a:off x="2443596" y="2253357"/>
-            <a:ext cx="7304807" cy="3994149"/>
-          </a:xfrm>
-          <a:prstGeom prst="rect">
-            <a:avLst/>
-          </a:prstGeom>
-        </p:spPr>
-      </p:pic>
-    </p:spTree>
-    <p:extLst>
-      <p:ext uri="{BB962C8B-B14F-4D97-AF65-F5344CB8AC3E}">
-        <p14:creationId xmlns:p14="http://schemas.microsoft.com/office/powerpoint/2010/main" val="2852506941"/>
-      </p:ext>
-    </p:extLst>
-  </p:cSld>
-  <p:clrMapOvr>
-    <a:masterClrMapping/>
-  </p:clrMapOvr>
-</p:sld>
-</file>
-
 <file path=ppt/slides/slide23.xml><?xml version="1.0" encoding="utf-8"?>
 <p:sld xmlns:a="http://schemas.openxmlformats.org/drawingml/2006/main" xmlns:r="http://schemas.openxmlformats.org/officeDocument/2006/relationships" xmlns:p="http://schemas.openxmlformats.org/presentationml/2006/main">
   <p:cSld>
@@ -10157,6 +10822,364 @@
                 <a:cs typeface="Century Gothic"/>
               </a:rPr>
               <a:t>23</a:t>
+            </a:fld>
+            <a:endParaRPr sz="1100" dirty="0">
+              <a:latin typeface="Century Gothic"/>
+              <a:cs typeface="Century Gothic"/>
+            </a:endParaRPr>
+          </a:p>
+        </p:txBody>
+      </p:sp>
+      <p:sp>
+        <p:nvSpPr>
+          <p:cNvPr id="10" name="object 2">
+            <a:extLst>
+              <a:ext uri="{FF2B5EF4-FFF2-40B4-BE49-F238E27FC236}">
+                <a16:creationId xmlns:a16="http://schemas.microsoft.com/office/drawing/2014/main" id="{B572DE95-7AC1-34A4-D289-2458DF658275}"/>
+              </a:ext>
+            </a:extLst>
+          </p:cNvPr>
+          <p:cNvSpPr txBox="1">
+            <a:spLocks/>
+          </p:cNvSpPr>
+          <p:nvPr/>
+        </p:nvSpPr>
+        <p:spPr>
+          <a:xfrm>
+            <a:off x="304800" y="335395"/>
+            <a:ext cx="8229600" cy="601703"/>
+          </a:xfrm>
+          <a:prstGeom prst="rect">
+            <a:avLst/>
+          </a:prstGeom>
+        </p:spPr>
+        <p:txBody>
+          <a:bodyPr vert="horz" wrap="square" lIns="0" tIns="65405" rIns="0" bIns="0" rtlCol="0">
+            <a:spAutoFit/>
+          </a:bodyPr>
+          <a:lstStyle>
+            <a:lvl1pPr>
+              <a:defRPr sz="3600" b="1" i="0">
+                <a:solidFill>
+                  <a:srgbClr val="003F77"/>
+                </a:solidFill>
+                <a:latin typeface="Century Gothic"/>
+                <a:ea typeface="+mj-ea"/>
+                <a:cs typeface="Century Gothic"/>
+              </a:defRPr>
+            </a:lvl1pPr>
+          </a:lstStyle>
+          <a:p>
+            <a:pPr marL="12700" marR="5080">
+              <a:lnSpc>
+                <a:spcPts val="3979"/>
+              </a:lnSpc>
+              <a:spcBef>
+                <a:spcPts val="515"/>
+              </a:spcBef>
+            </a:pPr>
+            <a:r>
+              <a:rPr lang="it-IT" sz="5400" spc="-10" dirty="0" err="1"/>
+              <a:t>Scheduler</a:t>
+            </a:r>
+            <a:r>
+              <a:rPr lang="it-IT" sz="5400" spc="-10" dirty="0"/>
+              <a:t> - Output</a:t>
+            </a:r>
+          </a:p>
+        </p:txBody>
+      </p:sp>
+      <p:sp>
+        <p:nvSpPr>
+          <p:cNvPr id="2" name="CasellaDiTesto 1">
+            <a:extLst>
+              <a:ext uri="{FF2B5EF4-FFF2-40B4-BE49-F238E27FC236}">
+                <a16:creationId xmlns:a16="http://schemas.microsoft.com/office/drawing/2014/main" id="{3427DE7B-1B1F-FD7D-FC43-A2FD966C36C7}"/>
+              </a:ext>
+            </a:extLst>
+          </p:cNvPr>
+          <p:cNvSpPr txBox="1"/>
+          <p:nvPr/>
+        </p:nvSpPr>
+        <p:spPr>
+          <a:xfrm>
+            <a:off x="304800" y="1295400"/>
+            <a:ext cx="11582400" cy="830997"/>
+          </a:xfrm>
+          <a:prstGeom prst="rect">
+            <a:avLst/>
+          </a:prstGeom>
+          <a:noFill/>
+        </p:spPr>
+        <p:txBody>
+          <a:bodyPr wrap="square">
+            <a:spAutoFit/>
+          </a:bodyPr>
+          <a:lstStyle/>
+          <a:p>
+            <a:pPr algn="l"/>
+            <a:r>
+              <a:rPr lang="en-GB" sz="2400" dirty="0">
+                <a:solidFill>
+                  <a:schemeClr val="tx1"/>
+                </a:solidFill>
+                <a:latin typeface="Century Gothic" panose="020B0502020202020204" pitchFamily="34" charset="0"/>
+                <a:cs typeface="Arial" panose="020B0604020202020204" pitchFamily="34" charset="0"/>
+              </a:rPr>
+              <a:t>The following </a:t>
+            </a:r>
+            <a:r>
+              <a:rPr lang="en-GB" sz="2400" b="1" dirty="0">
+                <a:solidFill>
+                  <a:schemeClr val="tx1"/>
+                </a:solidFill>
+                <a:latin typeface="Century Gothic" panose="020B0502020202020204" pitchFamily="34" charset="0"/>
+                <a:cs typeface="Arial" panose="020B0604020202020204" pitchFamily="34" charset="0"/>
+              </a:rPr>
+              <a:t>output</a:t>
+            </a:r>
+            <a:r>
+              <a:rPr lang="en-GB" sz="2400" dirty="0">
+                <a:solidFill>
+                  <a:schemeClr val="tx1"/>
+                </a:solidFill>
+                <a:latin typeface="Century Gothic" panose="020B0502020202020204" pitchFamily="34" charset="0"/>
+                <a:cs typeface="Arial" panose="020B0604020202020204" pitchFamily="34" charset="0"/>
+              </a:rPr>
+              <a:t> shows the </a:t>
+            </a:r>
+            <a:r>
+              <a:rPr lang="en-GB" sz="2400" b="1" dirty="0">
+                <a:solidFill>
+                  <a:schemeClr val="tx1"/>
+                </a:solidFill>
+                <a:latin typeface="Century Gothic" panose="020B0502020202020204" pitchFamily="34" charset="0"/>
+                <a:cs typeface="Arial" panose="020B0604020202020204" pitchFamily="34" charset="0"/>
+              </a:rPr>
+              <a:t>obtained results </a:t>
+            </a:r>
+            <a:r>
+              <a:rPr lang="en-GB" sz="2400" dirty="0">
+                <a:solidFill>
+                  <a:schemeClr val="tx1"/>
+                </a:solidFill>
+                <a:latin typeface="Century Gothic" panose="020B0502020202020204" pitchFamily="34" charset="0"/>
+                <a:cs typeface="Arial" panose="020B0604020202020204" pitchFamily="34" charset="0"/>
+              </a:rPr>
+              <a:t>running the demoScheduler with </a:t>
+            </a:r>
+            <a:r>
+              <a:rPr lang="en-GB" sz="2400" b="1" dirty="0" err="1">
+                <a:solidFill>
+                  <a:schemeClr val="tx1"/>
+                </a:solidFill>
+                <a:latin typeface="Century Gothic" panose="020B0502020202020204" pitchFamily="34" charset="0"/>
+                <a:cs typeface="Arial" panose="020B0604020202020204" pitchFamily="34" charset="0"/>
+              </a:rPr>
+              <a:t>FreeRTOS</a:t>
+            </a:r>
+            <a:r>
+              <a:rPr lang="en-GB" sz="2400" b="1" dirty="0">
+                <a:solidFill>
+                  <a:schemeClr val="tx1"/>
+                </a:solidFill>
+                <a:latin typeface="Century Gothic" panose="020B0502020202020204" pitchFamily="34" charset="0"/>
+                <a:cs typeface="Arial" panose="020B0604020202020204" pitchFamily="34" charset="0"/>
+              </a:rPr>
+              <a:t> scheduler </a:t>
+            </a:r>
+            <a:r>
+              <a:rPr lang="en-GB" sz="2400" dirty="0">
+                <a:solidFill>
+                  <a:schemeClr val="tx1"/>
+                </a:solidFill>
+                <a:latin typeface="Century Gothic" panose="020B0502020202020204" pitchFamily="34" charset="0"/>
+                <a:cs typeface="Arial" panose="020B0604020202020204" pitchFamily="34" charset="0"/>
+              </a:rPr>
+              <a:t>implemented </a:t>
+            </a:r>
+            <a:r>
+              <a:rPr lang="en-GB" sz="2400" b="1" dirty="0">
+                <a:solidFill>
+                  <a:schemeClr val="tx1"/>
+                </a:solidFill>
+                <a:latin typeface="Century Gothic" panose="020B0502020202020204" pitchFamily="34" charset="0"/>
+                <a:cs typeface="Arial" panose="020B0604020202020204" pitchFamily="34" charset="0"/>
+              </a:rPr>
+              <a:t>with preemption</a:t>
+            </a:r>
+            <a:r>
+              <a:rPr lang="en-GB" sz="2400" dirty="0">
+                <a:solidFill>
+                  <a:schemeClr val="tx1"/>
+                </a:solidFill>
+                <a:latin typeface="Century Gothic" panose="020B0502020202020204" pitchFamily="34" charset="0"/>
+                <a:cs typeface="Arial" panose="020B0604020202020204" pitchFamily="34" charset="0"/>
+              </a:rPr>
+              <a:t>.</a:t>
+            </a:r>
+          </a:p>
+        </p:txBody>
+      </p:sp>
+      <p:pic>
+        <p:nvPicPr>
+          <p:cNvPr id="4" name="Immagine 3" descr="Immagine che contiene testo, Carattere, schermata&#10;&#10;Descrizione generata automaticamente">
+            <a:extLst>
+              <a:ext uri="{FF2B5EF4-FFF2-40B4-BE49-F238E27FC236}">
+                <a16:creationId xmlns:a16="http://schemas.microsoft.com/office/drawing/2014/main" id="{AECA422C-99AF-8155-596B-87CD760237E8}"/>
+              </a:ext>
+            </a:extLst>
+          </p:cNvPr>
+          <p:cNvPicPr>
+            <a:picLocks noChangeAspect="1"/>
+          </p:cNvPicPr>
+          <p:nvPr/>
+        </p:nvPicPr>
+        <p:blipFill rotWithShape="1">
+          <a:blip r:embed="rId2">
+            <a:extLst>
+              <a:ext uri="{28A0092B-C50C-407E-A947-70E740481C1C}">
+                <a14:useLocalDpi xmlns:a14="http://schemas.microsoft.com/office/drawing/2010/main" val="0"/>
+              </a:ext>
+            </a:extLst>
+          </a:blip>
+          <a:srcRect t="10356"/>
+          <a:stretch/>
+        </p:blipFill>
+        <p:spPr>
+          <a:xfrm>
+            <a:off x="2443596" y="2362200"/>
+            <a:ext cx="7304807" cy="3580506"/>
+          </a:xfrm>
+          <a:prstGeom prst="rect">
+            <a:avLst/>
+          </a:prstGeom>
+        </p:spPr>
+      </p:pic>
+    </p:spTree>
+    <p:extLst>
+      <p:ext uri="{BB962C8B-B14F-4D97-AF65-F5344CB8AC3E}">
+        <p14:creationId xmlns:p14="http://schemas.microsoft.com/office/powerpoint/2010/main" val="2852506941"/>
+      </p:ext>
+    </p:extLst>
+  </p:cSld>
+  <p:clrMapOvr>
+    <a:masterClrMapping/>
+  </p:clrMapOvr>
+</p:sld>
+</file>
+
+<file path=ppt/slides/slide24.xml><?xml version="1.0" encoding="utf-8"?>
+<p:sld xmlns:a="http://schemas.openxmlformats.org/drawingml/2006/main" xmlns:r="http://schemas.openxmlformats.org/officeDocument/2006/relationships" xmlns:p="http://schemas.openxmlformats.org/presentationml/2006/main">
+  <p:cSld>
+    <p:spTree>
+      <p:nvGrpSpPr>
+        <p:cNvPr id="1" name=""/>
+        <p:cNvGrpSpPr/>
+        <p:nvPr/>
+      </p:nvGrpSpPr>
+      <p:grpSpPr>
+        <a:xfrm>
+          <a:off x="0" y="0"/>
+          <a:ext cx="0" cy="0"/>
+          <a:chOff x="0" y="0"/>
+          <a:chExt cx="0" cy="0"/>
+        </a:xfrm>
+      </p:grpSpPr>
+      <p:sp>
+        <p:nvSpPr>
+          <p:cNvPr id="33" name="object 33"/>
+          <p:cNvSpPr txBox="1">
+            <a:spLocks noGrp="1"/>
+          </p:cNvSpPr>
+          <p:nvPr>
+            <p:ph type="ftr" sz="quarter" idx="5"/>
+          </p:nvPr>
+        </p:nvSpPr>
+        <p:spPr>
+          <a:xfrm>
+            <a:off x="7562619" y="6374466"/>
+            <a:ext cx="3771779" cy="436658"/>
+          </a:xfrm>
+          <a:prstGeom prst="rect">
+            <a:avLst/>
+          </a:prstGeom>
+        </p:spPr>
+        <p:txBody>
+          <a:bodyPr vert="horz" wrap="square" lIns="0" tIns="13335" rIns="0" bIns="0" rtlCol="0">
+            <a:spAutoFit/>
+          </a:bodyPr>
+          <a:lstStyle/>
+          <a:p>
+            <a:pPr marL="2442210">
+              <a:lnSpc>
+                <a:spcPct val="100000"/>
+              </a:lnSpc>
+              <a:spcBef>
+                <a:spcPts val="105"/>
+              </a:spcBef>
+            </a:pPr>
+            <a:r>
+              <a:rPr lang="it-IT" spc="-20" dirty="0"/>
+              <a:t>          Group No. 09</a:t>
+            </a:r>
+            <a:endParaRPr spc="-20" dirty="0"/>
+          </a:p>
+          <a:p>
+            <a:pPr marL="12700">
+              <a:lnSpc>
+                <a:spcPct val="100000"/>
+              </a:lnSpc>
+              <a:spcBef>
+                <a:spcPts val="894"/>
+              </a:spcBef>
+            </a:pPr>
+            <a:r>
+              <a:rPr lang="it-IT" sz="900" spc="180" dirty="0"/>
+              <a:t>Computer Architectures and Operating Systems</a:t>
+            </a:r>
+            <a:endParaRPr sz="900" dirty="0"/>
+          </a:p>
+        </p:txBody>
+      </p:sp>
+      <p:sp>
+        <p:nvSpPr>
+          <p:cNvPr id="34" name="object 34"/>
+          <p:cNvSpPr txBox="1"/>
+          <p:nvPr/>
+        </p:nvSpPr>
+        <p:spPr>
+          <a:xfrm>
+            <a:off x="11571016" y="6399980"/>
+            <a:ext cx="316184" cy="182742"/>
+          </a:xfrm>
+          <a:prstGeom prst="rect">
+            <a:avLst/>
+          </a:prstGeom>
+        </p:spPr>
+        <p:txBody>
+          <a:bodyPr vert="horz" wrap="square" lIns="0" tIns="13335" rIns="0" bIns="0" rtlCol="0">
+            <a:spAutoFit/>
+          </a:bodyPr>
+          <a:lstStyle/>
+          <a:p>
+            <a:pPr marL="38100">
+              <a:lnSpc>
+                <a:spcPct val="100000"/>
+              </a:lnSpc>
+              <a:spcBef>
+                <a:spcPts val="105"/>
+              </a:spcBef>
+            </a:pPr>
+            <a:fld id="{81D60167-4931-47E6-BA6A-407CBD079E47}" type="slidenum">
+              <a:rPr sz="1100" dirty="0">
+                <a:solidFill>
+                  <a:srgbClr val="FFFFFF"/>
+                </a:solidFill>
+                <a:latin typeface="Century Gothic"/>
+                <a:cs typeface="Century Gothic"/>
+              </a:rPr>
+              <a:t>24</a:t>
             </a:fld>
             <a:endParaRPr sz="1100" dirty="0">
               <a:latin typeface="Century Gothic"/>
@@ -10395,7 +11418,7 @@
 </p:sld>
 </file>
 
-<file path=ppt/slides/slide24.xml><?xml version="1.0" encoding="utf-8"?>
+<file path=ppt/slides/slide25.xml><?xml version="1.0" encoding="utf-8"?>
 <p:sld xmlns:a="http://schemas.openxmlformats.org/drawingml/2006/main" xmlns:r="http://schemas.openxmlformats.org/officeDocument/2006/relationships" xmlns:p="http://schemas.openxmlformats.org/presentationml/2006/main">
   <p:cSld>
     <p:spTree>
@@ -10505,7 +11528,7 @@
                 <a:latin typeface="Century Gothic"/>
                 <a:cs typeface="Century Gothic"/>
               </a:rPr>
-              <a:t>24</a:t>
+              <a:t>25</a:t>
             </a:fld>
             <a:endParaRPr sz="1100" dirty="0">
               <a:latin typeface="Century Gothic"/>
@@ -12956,7 +13979,7 @@
 </p:sld>
 </file>
 
-<file path=ppt/slides/slide25.xml><?xml version="1.0" encoding="utf-8"?>
+<file path=ppt/slides/slide26.xml><?xml version="1.0" encoding="utf-8"?>
 <p:sld xmlns:a="http://schemas.openxmlformats.org/drawingml/2006/main" xmlns:r="http://schemas.openxmlformats.org/officeDocument/2006/relationships" xmlns:p="http://schemas.openxmlformats.org/presentationml/2006/main">
   <p:cSld>
     <p:spTree>
@@ -13493,7 +14516,7 @@
                 <a:latin typeface="Century Gothic"/>
                 <a:cs typeface="Century Gothic"/>
               </a:rPr>
-              <a:t>25</a:t>
+              <a:t>26</a:t>
             </a:fld>
             <a:endParaRPr sz="1100" dirty="0">
               <a:latin typeface="Century Gothic"/>
@@ -14932,7 +15955,7 @@
           </p:cNvPicPr>
           <p:nvPr/>
         </p:nvPicPr>
-        <p:blipFill>
+        <p:blipFill rotWithShape="1">
           <a:blip r:embed="rId2">
             <a:extLst>
               <a:ext uri="{28A0092B-C50C-407E-A947-70E740481C1C}">
@@ -14940,14 +15963,13 @@
               </a:ext>
             </a:extLst>
           </a:blip>
-          <a:stretch>
-            <a:fillRect/>
-          </a:stretch>
+          <a:srcRect t="12716"/>
+          <a:stretch/>
         </p:blipFill>
         <p:spPr>
           <a:xfrm>
-            <a:off x="4233177" y="2237284"/>
-            <a:ext cx="7504209" cy="2780248"/>
+            <a:off x="4233177" y="2414042"/>
+            <a:ext cx="7504209" cy="2426732"/>
           </a:xfrm>
           <a:prstGeom prst="rect">
             <a:avLst/>
@@ -15842,13 +16864,13 @@
               </a:ext>
             </a:extLst>
           </a:blip>
-          <a:srcRect t="2811"/>
+          <a:srcRect t="10450"/>
           <a:stretch/>
         </p:blipFill>
         <p:spPr>
           <a:xfrm>
-            <a:off x="4857020" y="1694661"/>
-            <a:ext cx="7030180" cy="3645426"/>
+            <a:off x="4857020" y="1837930"/>
+            <a:ext cx="7030180" cy="3358887"/>
           </a:xfrm>
           <a:prstGeom prst="rect">
             <a:avLst/>
@@ -16084,7 +17106,7 @@
         </p:nvSpPr>
         <p:spPr>
           <a:xfrm>
-            <a:off x="152398" y="914400"/>
+            <a:off x="222885" y="896049"/>
             <a:ext cx="4876802" cy="5370701"/>
           </a:xfrm>
           <a:prstGeom prst="rect">
@@ -16634,7 +17656,7 @@
           </p:cNvPicPr>
           <p:nvPr/>
         </p:nvPicPr>
-        <p:blipFill>
+        <p:blipFill rotWithShape="1">
           <a:blip r:embed="rId2">
             <a:extLst>
               <a:ext uri="{28A0092B-C50C-407E-A947-70E740481C1C}">
@@ -16642,14 +17664,13 @@
               </a:ext>
             </a:extLst>
           </a:blip>
-          <a:stretch>
-            <a:fillRect/>
-          </a:stretch>
+          <a:srcRect b="2040"/>
+          <a:stretch/>
         </p:blipFill>
         <p:spPr>
           <a:xfrm>
-            <a:off x="5994586" y="1066800"/>
-            <a:ext cx="5892614" cy="5056122"/>
+            <a:off x="6015397" y="1066800"/>
+            <a:ext cx="5892614" cy="4953000"/>
           </a:xfrm>
           <a:prstGeom prst="rect">
             <a:avLst/>

</xml_diff>

<commit_message>
updated typo in ppp
</commit_message>
<xml_diff>
--- a/Documentation/HaclOSsim - Group09.pptx
+++ b/Documentation/HaclOSsim - Group09.pptx
@@ -509,7 +509,7 @@
           <a:p>
             <a:fld id="{1D8BD707-D9CF-40AE-B4C6-C98DA3205C09}" type="datetimeFigureOut">
               <a:rPr lang="en-US"/>
-              <a:t>6/7/24</a:t>
+              <a:t>6/8/2024</a:t>
             </a:fld>
             <a:endParaRPr lang="en-US"/>
           </a:p>
@@ -993,7 +993,7 @@
           <a:p>
             <a:fld id="{1D8BD707-D9CF-40AE-B4C6-C98DA3205C09}" type="datetimeFigureOut">
               <a:rPr lang="en-US"/>
-              <a:t>6/7/24</a:t>
+              <a:t>6/8/2024</a:t>
             </a:fld>
             <a:endParaRPr lang="en-US"/>
           </a:p>
@@ -1514,7 +1514,7 @@
           <a:p>
             <a:fld id="{1D8BD707-D9CF-40AE-B4C6-C98DA3205C09}" type="datetimeFigureOut">
               <a:rPr lang="en-US"/>
-              <a:t>6/7/24</a:t>
+              <a:t>6/8/2024</a:t>
             </a:fld>
             <a:endParaRPr lang="en-US"/>
           </a:p>
@@ -2049,7 +2049,7 @@
           <a:p>
             <a:fld id="{1D8BD707-D9CF-40AE-B4C6-C98DA3205C09}" type="datetimeFigureOut">
               <a:rPr lang="en-US"/>
-              <a:t>6/7/24</a:t>
+              <a:t>6/8/2024</a:t>
             </a:fld>
             <a:endParaRPr lang="en-US"/>
           </a:p>
@@ -2475,7 +2475,7 @@
           <a:p>
             <a:fld id="{1D8BD707-D9CF-40AE-B4C6-C98DA3205C09}" type="datetimeFigureOut">
               <a:rPr lang="en-US"/>
-              <a:t>6/7/24</a:t>
+              <a:t>6/8/2024</a:t>
             </a:fld>
             <a:endParaRPr lang="en-US"/>
           </a:p>
@@ -3079,7 +3079,7 @@
           <a:p>
             <a:fld id="{1D8BD707-D9CF-40AE-B4C6-C98DA3205C09}" type="datetimeFigureOut">
               <a:rPr lang="en-US"/>
-              <a:t>6/7/24</a:t>
+              <a:t>6/8/2024</a:t>
             </a:fld>
             <a:endParaRPr lang="en-US"/>
           </a:p>
@@ -3766,27 +3766,7 @@
                 <a:latin typeface="Century Gothic" panose="020B0502020202020204" pitchFamily="34" charset="0"/>
                 <a:cs typeface="Arial" panose="020B0604020202020204" pitchFamily="34" charset="0"/>
               </a:rPr>
-              <a:t>S331031 – Giovanni de Maria s331618 – Andrea </a:t>
-            </a:r>
-            <a:r>
-              <a:rPr lang="it-IT" sz="2000" b="1" dirty="0" err="1">
-                <a:solidFill>
-                  <a:schemeClr val="bg1"/>
-                </a:solidFill>
-                <a:latin typeface="Century Gothic" panose="020B0502020202020204" pitchFamily="34" charset="0"/>
-                <a:cs typeface="Arial" panose="020B0604020202020204" pitchFamily="34" charset="0"/>
-              </a:rPr>
-              <a:t>Carcagnì</a:t>
-            </a:r>
-            <a:r>
-              <a:rPr lang="it-IT" sz="2000" b="1" dirty="0">
-                <a:solidFill>
-                  <a:schemeClr val="bg1"/>
-                </a:solidFill>
-                <a:latin typeface="Century Gothic" panose="020B0502020202020204" pitchFamily="34" charset="0"/>
-                <a:cs typeface="Arial" panose="020B0604020202020204" pitchFamily="34" charset="0"/>
-              </a:rPr>
-              <a:t> </a:t>
+              <a:t>s331031 – Giovanni de Maria s331618 – Andrea Carcagnì </a:t>
             </a:r>
           </a:p>
         </p:txBody>
@@ -4637,7 +4617,7 @@
         </p:blipFill>
         <p:spPr>
           <a:xfrm>
-            <a:off x="5040584" y="1828800"/>
+            <a:off x="5032438" y="1741119"/>
             <a:ext cx="6770416" cy="3882828"/>
           </a:xfrm>
           <a:prstGeom prst="rect">
@@ -4832,8 +4812,8 @@
         </p:nvSpPr>
         <p:spPr>
           <a:xfrm>
-            <a:off x="152399" y="1351508"/>
-            <a:ext cx="5410201" cy="4154984"/>
+            <a:off x="152399" y="1066800"/>
+            <a:ext cx="5105401" cy="4893647"/>
           </a:xfrm>
           <a:prstGeom prst="rect">
             <a:avLst/>
@@ -4875,7 +4855,20 @@
                 <a:latin typeface="Century Gothic" panose="020B0502020202020204" pitchFamily="34" charset="0"/>
                 <a:cs typeface="Arial" panose="020B0604020202020204" pitchFamily="34" charset="0"/>
               </a:rPr>
-              <a:t> system. The hospital has a </a:t>
+              <a:t> system. </a:t>
+            </a:r>
+          </a:p>
+          <a:p>
+            <a:pPr algn="l"/>
+            <a:r>
+              <a:rPr lang="en-GB" sz="2400" dirty="0">
+                <a:solidFill>
+                  <a:schemeClr val="tx1"/>
+                </a:solidFill>
+                <a:latin typeface="Century Gothic" panose="020B0502020202020204" pitchFamily="34" charset="0"/>
+                <a:cs typeface="Arial" panose="020B0604020202020204" pitchFamily="34" charset="0"/>
+              </a:rPr>
+              <a:t>The hospital has a </a:t>
             </a:r>
             <a:r>
               <a:rPr lang="en-GB" sz="2400" b="1" dirty="0">
@@ -4915,7 +4908,7 @@
                 <a:latin typeface="Century Gothic" panose="020B0502020202020204" pitchFamily="34" charset="0"/>
                 <a:cs typeface="Arial" panose="020B0604020202020204" pitchFamily="34" charset="0"/>
               </a:rPr>
-              <a:t>, with only one patient being operated </a:t>
+              <a:t>, with only </a:t>
             </a:r>
             <a:r>
               <a:rPr lang="en-GB" sz="2400" b="1" dirty="0">
@@ -4925,6 +4918,26 @@
                 <a:latin typeface="Century Gothic" panose="020B0502020202020204" pitchFamily="34" charset="0"/>
                 <a:cs typeface="Arial" panose="020B0604020202020204" pitchFamily="34" charset="0"/>
               </a:rPr>
+              <a:t>one patient </a:t>
+            </a:r>
+            <a:r>
+              <a:rPr lang="en-GB" sz="2400" dirty="0">
+                <a:solidFill>
+                  <a:schemeClr val="tx1"/>
+                </a:solidFill>
+                <a:latin typeface="Century Gothic" panose="020B0502020202020204" pitchFamily="34" charset="0"/>
+                <a:cs typeface="Arial" panose="020B0604020202020204" pitchFamily="34" charset="0"/>
+              </a:rPr>
+              <a:t>being operated </a:t>
+            </a:r>
+            <a:r>
+              <a:rPr lang="en-GB" sz="2400" b="1" dirty="0">
+                <a:solidFill>
+                  <a:schemeClr val="tx1"/>
+                </a:solidFill>
+                <a:latin typeface="Century Gothic" panose="020B0502020202020204" pitchFamily="34" charset="0"/>
+                <a:cs typeface="Arial" panose="020B0604020202020204" pitchFamily="34" charset="0"/>
+              </a:rPr>
               <a:t>on at a time </a:t>
             </a:r>
             <a:r>
@@ -4935,10 +4948,50 @@
                 <a:latin typeface="Century Gothic" panose="020B0502020202020204" pitchFamily="34" charset="0"/>
                 <a:cs typeface="Arial" panose="020B0604020202020204" pitchFamily="34" charset="0"/>
               </a:rPr>
-              <a:t>in each room. Patients are operated on based on a priority system determined by </a:t>
-            </a:r>
-            <a:r>
-              <a:rPr lang="en-GB" sz="2400" b="1" dirty="0" err="1">
+              <a:t>in each room. </a:t>
+            </a:r>
+            <a:r>
+              <a:rPr lang="en-GB" sz="2400" b="1" dirty="0">
+                <a:solidFill>
+                  <a:schemeClr val="tx1"/>
+                </a:solidFill>
+                <a:latin typeface="Century Gothic" panose="020B0502020202020204" pitchFamily="34" charset="0"/>
+                <a:cs typeface="Arial" panose="020B0604020202020204" pitchFamily="34" charset="0"/>
+              </a:rPr>
+              <a:t>Patients</a:t>
+            </a:r>
+            <a:r>
+              <a:rPr lang="en-GB" sz="2400" dirty="0">
+                <a:solidFill>
+                  <a:schemeClr val="tx1"/>
+                </a:solidFill>
+                <a:latin typeface="Century Gothic" panose="020B0502020202020204" pitchFamily="34" charset="0"/>
+                <a:cs typeface="Arial" panose="020B0604020202020204" pitchFamily="34" charset="0"/>
+              </a:rPr>
+              <a:t> are operated on based on a </a:t>
+            </a:r>
+            <a:r>
+              <a:rPr lang="en-GB" sz="2400" b="1" dirty="0">
+                <a:solidFill>
+                  <a:schemeClr val="tx1"/>
+                </a:solidFill>
+                <a:latin typeface="Century Gothic" panose="020B0502020202020204" pitchFamily="34" charset="0"/>
+                <a:cs typeface="Arial" panose="020B0604020202020204" pitchFamily="34" charset="0"/>
+              </a:rPr>
+              <a:t>priority</a:t>
+            </a:r>
+            <a:r>
+              <a:rPr lang="en-GB" sz="2400" dirty="0">
+                <a:solidFill>
+                  <a:schemeClr val="tx1"/>
+                </a:solidFill>
+                <a:latin typeface="Century Gothic" panose="020B0502020202020204" pitchFamily="34" charset="0"/>
+                <a:cs typeface="Arial" panose="020B0604020202020204" pitchFamily="34" charset="0"/>
+              </a:rPr>
+              <a:t> system determined by </a:t>
+            </a:r>
+            <a:r>
+              <a:rPr lang="en-GB" sz="2400" b="1" dirty="0">
                 <a:solidFill>
                   <a:schemeClr val="tx1"/>
                 </a:solidFill>
@@ -4948,6 +5001,16 @@
               <a:t>color</a:t>
             </a:r>
             <a:r>
+              <a:rPr lang="en-GB" sz="2400" dirty="0">
+                <a:solidFill>
+                  <a:schemeClr val="tx1"/>
+                </a:solidFill>
+                <a:latin typeface="Century Gothic" panose="020B0502020202020204" pitchFamily="34" charset="0"/>
+                <a:cs typeface="Arial" panose="020B0604020202020204" pitchFamily="34" charset="0"/>
+              </a:rPr>
+              <a:t> </a:t>
+            </a:r>
+            <a:r>
               <a:rPr lang="en-GB" sz="2400" b="1" dirty="0">
                 <a:solidFill>
                   <a:schemeClr val="tx1"/>
@@ -4955,7 +5018,7 @@
                 <a:latin typeface="Century Gothic" panose="020B0502020202020204" pitchFamily="34" charset="0"/>
                 <a:cs typeface="Arial" panose="020B0604020202020204" pitchFamily="34" charset="0"/>
               </a:rPr>
-              <a:t> codes</a:t>
+              <a:t>codes</a:t>
             </a:r>
             <a:r>
               <a:rPr lang="en-GB" sz="2400" dirty="0">
@@ -4965,7 +5028,67 @@
                 <a:latin typeface="Century Gothic" panose="020B0502020202020204" pitchFamily="34" charset="0"/>
                 <a:cs typeface="Arial" panose="020B0604020202020204" pitchFamily="34" charset="0"/>
               </a:rPr>
-              <a:t>, which define both the priority and the maximum waiting time before the condition worsens.</a:t>
+              <a:t>, which </a:t>
+            </a:r>
+            <a:r>
+              <a:rPr lang="en-GB" sz="2400" b="1" dirty="0">
+                <a:solidFill>
+                  <a:schemeClr val="tx1"/>
+                </a:solidFill>
+                <a:latin typeface="Century Gothic" panose="020B0502020202020204" pitchFamily="34" charset="0"/>
+                <a:cs typeface="Arial" panose="020B0604020202020204" pitchFamily="34" charset="0"/>
+              </a:rPr>
+              <a:t>define</a:t>
+            </a:r>
+            <a:r>
+              <a:rPr lang="en-GB" sz="2400" dirty="0">
+                <a:solidFill>
+                  <a:schemeClr val="tx1"/>
+                </a:solidFill>
+                <a:latin typeface="Century Gothic" panose="020B0502020202020204" pitchFamily="34" charset="0"/>
+                <a:cs typeface="Arial" panose="020B0604020202020204" pitchFamily="34" charset="0"/>
+              </a:rPr>
+              <a:t> both the </a:t>
+            </a:r>
+            <a:r>
+              <a:rPr lang="en-GB" sz="2400" b="1" dirty="0">
+                <a:solidFill>
+                  <a:schemeClr val="tx1"/>
+                </a:solidFill>
+                <a:latin typeface="Century Gothic" panose="020B0502020202020204" pitchFamily="34" charset="0"/>
+                <a:cs typeface="Arial" panose="020B0604020202020204" pitchFamily="34" charset="0"/>
+              </a:rPr>
+              <a:t>priority</a:t>
+            </a:r>
+            <a:r>
+              <a:rPr lang="en-GB" sz="2400" dirty="0">
+                <a:solidFill>
+                  <a:schemeClr val="tx1"/>
+                </a:solidFill>
+                <a:latin typeface="Century Gothic" panose="020B0502020202020204" pitchFamily="34" charset="0"/>
+                <a:cs typeface="Arial" panose="020B0604020202020204" pitchFamily="34" charset="0"/>
+              </a:rPr>
+              <a:t> and the </a:t>
+            </a:r>
+            <a:r>
+              <a:rPr lang="en-GB" sz="2400" b="1" dirty="0">
+                <a:solidFill>
+                  <a:schemeClr val="tx1"/>
+                </a:solidFill>
+                <a:latin typeface="Century Gothic" panose="020B0502020202020204" pitchFamily="34" charset="0"/>
+                <a:cs typeface="Arial" panose="020B0604020202020204" pitchFamily="34" charset="0"/>
+              </a:rPr>
+              <a:t>maximum waiting </a:t>
+            </a:r>
+            <a:r>
+              <a:rPr lang="en-GB" sz="2400" dirty="0">
+                <a:solidFill>
+                  <a:schemeClr val="tx1"/>
+                </a:solidFill>
+                <a:latin typeface="Century Gothic" panose="020B0502020202020204" pitchFamily="34" charset="0"/>
+                <a:cs typeface="Arial" panose="020B0604020202020204" pitchFamily="34" charset="0"/>
+              </a:rPr>
+              <a:t>time before the condition worsens.</a:t>
             </a:r>
           </a:p>
         </p:txBody>
@@ -5089,31 +5212,26 @@
         <p:spPr>
           <a:xfrm>
             <a:off x="417795" y="1143000"/>
-            <a:ext cx="11356408" cy="3970318"/>
+            <a:ext cx="11356408" cy="4339650"/>
           </a:xfrm>
         </p:spPr>
         <p:txBody>
           <a:bodyPr/>
           <a:lstStyle/>
           <a:p>
-            <a:endParaRPr lang="it-IT" dirty="0">
-              <a:effectLst/>
-            </a:endParaRPr>
-          </a:p>
-          <a:p>
             <a:pPr lvl="1"/>
             <a:r>
-              <a:rPr lang="it-IT" b="1" spc="-10" dirty="0" err="1">
+              <a:rPr lang="it-IT" sz="2400" b="1" spc="-10" dirty="0" err="1">
                 <a:solidFill>
                   <a:srgbClr val="003F77"/>
                 </a:solidFill>
-                <a:latin typeface="Century Gothic"/>
+                <a:latin typeface="Century Gothic" panose="020B0502020202020204" pitchFamily="34" charset="0"/>
                 <a:ea typeface="+mj-ea"/>
               </a:rPr>
               <a:t>Queues</a:t>
             </a:r>
             <a:r>
-              <a:rPr lang="it-IT" dirty="0">
+              <a:rPr lang="it-IT" sz="2400" dirty="0">
                 <a:solidFill>
                   <a:schemeClr val="tx1"/>
                 </a:solidFill>
@@ -5123,17 +5241,17 @@
               <a:t>: </a:t>
             </a:r>
             <a:r>
-              <a:rPr lang="it-IT" dirty="0" err="1">
-                <a:solidFill>
-                  <a:schemeClr val="tx1"/>
-                </a:solidFill>
-                <a:latin typeface="Century Gothic" panose="020B0502020202020204" pitchFamily="34" charset="0"/>
-                <a:cs typeface="Arial" panose="020B0604020202020204" pitchFamily="34" charset="0"/>
-              </a:rPr>
-              <a:t>Used</a:t>
-            </a:r>
-            <a:r>
-              <a:rPr lang="it-IT" dirty="0">
+              <a:rPr lang="it-IT" sz="2400" dirty="0" err="1">
+                <a:solidFill>
+                  <a:schemeClr val="tx1"/>
+                </a:solidFill>
+                <a:latin typeface="Century Gothic" panose="020B0502020202020204" pitchFamily="34" charset="0"/>
+                <a:cs typeface="Arial" panose="020B0604020202020204" pitchFamily="34" charset="0"/>
+              </a:rPr>
+              <a:t>used</a:t>
+            </a:r>
+            <a:r>
+              <a:rPr lang="it-IT" sz="2400" dirty="0">
                 <a:solidFill>
                   <a:schemeClr val="tx1"/>
                 </a:solidFill>
@@ -5143,7 +5261,7 @@
               <a:t> to </a:t>
             </a:r>
             <a:r>
-              <a:rPr lang="it-IT" dirty="0" err="1">
+              <a:rPr lang="it-IT" sz="2400" dirty="0" err="1">
                 <a:solidFill>
                   <a:schemeClr val="tx1"/>
                 </a:solidFill>
@@ -5153,7 +5271,7 @@
               <a:t>maintain</a:t>
             </a:r>
             <a:r>
-              <a:rPr lang="it-IT" dirty="0">
+              <a:rPr lang="it-IT" sz="2400" dirty="0">
                 <a:solidFill>
                   <a:schemeClr val="tx1"/>
                 </a:solidFill>
@@ -5163,7 +5281,7 @@
               <a:t> the </a:t>
             </a:r>
             <a:r>
-              <a:rPr lang="it-IT" b="1" dirty="0">
+              <a:rPr lang="it-IT" sz="2400" b="1" dirty="0">
                 <a:solidFill>
                   <a:schemeClr val="tx1"/>
                 </a:solidFill>
@@ -5173,7 +5291,7 @@
               <a:t>list of </a:t>
             </a:r>
             <a:r>
-              <a:rPr lang="it-IT" b="1" dirty="0" err="1">
+              <a:rPr lang="it-IT" sz="2400" b="1" dirty="0" err="1">
                 <a:solidFill>
                   <a:schemeClr val="tx1"/>
                 </a:solidFill>
@@ -5183,17 +5301,17 @@
               <a:t>patients</a:t>
             </a:r>
             <a:r>
-              <a:rPr lang="it-IT" b="1" dirty="0">
-                <a:solidFill>
-                  <a:schemeClr val="tx1"/>
-                </a:solidFill>
-                <a:latin typeface="Century Gothic" panose="020B0502020202020204" pitchFamily="34" charset="0"/>
-                <a:cs typeface="Arial" panose="020B0604020202020204" pitchFamily="34" charset="0"/>
-              </a:rPr>
-              <a:t> </a:t>
-            </a:r>
-            <a:r>
-              <a:rPr lang="it-IT" b="1" dirty="0" err="1">
+              <a:rPr lang="it-IT" sz="2400" b="1" dirty="0">
+                <a:solidFill>
+                  <a:schemeClr val="tx1"/>
+                </a:solidFill>
+                <a:latin typeface="Century Gothic" panose="020B0502020202020204" pitchFamily="34" charset="0"/>
+                <a:cs typeface="Arial" panose="020B0604020202020204" pitchFamily="34" charset="0"/>
+              </a:rPr>
+              <a:t> </a:t>
+            </a:r>
+            <a:r>
+              <a:rPr lang="it-IT" sz="2400" b="1" dirty="0" err="1">
                 <a:solidFill>
                   <a:schemeClr val="tx1"/>
                 </a:solidFill>
@@ -5203,17 +5321,17 @@
               <a:t>waiting</a:t>
             </a:r>
             <a:r>
-              <a:rPr lang="it-IT" b="1" dirty="0">
-                <a:solidFill>
-                  <a:schemeClr val="tx1"/>
-                </a:solidFill>
-                <a:latin typeface="Century Gothic" panose="020B0502020202020204" pitchFamily="34" charset="0"/>
-                <a:cs typeface="Arial" panose="020B0604020202020204" pitchFamily="34" charset="0"/>
-              </a:rPr>
-              <a:t> </a:t>
-            </a:r>
-            <a:r>
-              <a:rPr lang="it-IT" dirty="0">
+              <a:rPr lang="it-IT" sz="2400" b="1" dirty="0">
+                <a:solidFill>
+                  <a:schemeClr val="tx1"/>
+                </a:solidFill>
+                <a:latin typeface="Century Gothic" panose="020B0502020202020204" pitchFamily="34" charset="0"/>
+                <a:cs typeface="Arial" panose="020B0604020202020204" pitchFamily="34" charset="0"/>
+              </a:rPr>
+              <a:t> </a:t>
+            </a:r>
+            <a:r>
+              <a:rPr lang="it-IT" sz="2400" dirty="0">
                 <a:solidFill>
                   <a:schemeClr val="tx1"/>
                 </a:solidFill>
@@ -5222,8 +5340,11 @@
               </a:rPr>
               <a:t>for surgery. </a:t>
             </a:r>
-            <a:r>
-              <a:rPr lang="it-IT" dirty="0" err="1">
+          </a:p>
+          <a:p>
+            <a:pPr lvl="1"/>
+            <a:r>
+              <a:rPr lang="it-IT" sz="2400" dirty="0" err="1">
                 <a:solidFill>
                   <a:schemeClr val="tx1"/>
                 </a:solidFill>
@@ -5233,7 +5354,7 @@
               <a:t>There</a:t>
             </a:r>
             <a:r>
-              <a:rPr lang="it-IT" dirty="0">
+              <a:rPr lang="it-IT" sz="2400" dirty="0">
                 <a:solidFill>
                   <a:schemeClr val="tx1"/>
                 </a:solidFill>
@@ -5243,7 +5364,7 @@
               <a:t> are </a:t>
             </a:r>
             <a:r>
-              <a:rPr lang="it-IT" b="1" dirty="0">
+              <a:rPr lang="it-IT" sz="2400" b="1" dirty="0">
                 <a:solidFill>
                   <a:schemeClr val="tx1"/>
                 </a:solidFill>
@@ -5253,7 +5374,7 @@
               <a:t>separate </a:t>
             </a:r>
             <a:r>
-              <a:rPr lang="it-IT" b="1" dirty="0" err="1">
+              <a:rPr lang="it-IT" sz="2400" b="1" dirty="0" err="1">
                 <a:solidFill>
                   <a:schemeClr val="tx1"/>
                 </a:solidFill>
@@ -5263,7 +5384,7 @@
               <a:t>queues</a:t>
             </a:r>
             <a:r>
-              <a:rPr lang="it-IT" b="1" dirty="0">
+              <a:rPr lang="it-IT" sz="2400" b="1" dirty="0">
                 <a:solidFill>
                   <a:schemeClr val="tx1"/>
                 </a:solidFill>
@@ -5273,7 +5394,7 @@
               <a:t> for code</a:t>
             </a:r>
             <a:r>
-              <a:rPr lang="it-IT" dirty="0">
+              <a:rPr lang="it-IT" sz="2400" dirty="0">
                 <a:solidFill>
                   <a:schemeClr val="tx1"/>
                 </a:solidFill>
@@ -5283,7 +5404,7 @@
               <a:t> red and green </a:t>
             </a:r>
             <a:r>
-              <a:rPr lang="it-IT" dirty="0" err="1">
+              <a:rPr lang="it-IT" sz="2400" dirty="0" err="1">
                 <a:solidFill>
                   <a:schemeClr val="tx1"/>
                 </a:solidFill>
@@ -5293,7 +5414,7 @@
               <a:t>patients</a:t>
             </a:r>
             <a:r>
-              <a:rPr lang="it-IT" dirty="0">
+              <a:rPr lang="it-IT" sz="2400" dirty="0">
                 <a:solidFill>
                   <a:schemeClr val="tx1"/>
                 </a:solidFill>
@@ -5303,7 +5424,7 @@
               <a:t>. Tasks </a:t>
             </a:r>
             <a:r>
-              <a:rPr lang="it-IT" b="1" dirty="0" err="1">
+              <a:rPr lang="it-IT" sz="2400" b="1" dirty="0" err="1">
                 <a:solidFill>
                   <a:schemeClr val="tx1"/>
                 </a:solidFill>
@@ -5313,17 +5434,17 @@
               <a:t>fill</a:t>
             </a:r>
             <a:r>
-              <a:rPr lang="it-IT" b="1" dirty="0">
-                <a:solidFill>
-                  <a:schemeClr val="tx1"/>
-                </a:solidFill>
-                <a:latin typeface="Century Gothic" panose="020B0502020202020204" pitchFamily="34" charset="0"/>
-                <a:cs typeface="Arial" panose="020B0604020202020204" pitchFamily="34" charset="0"/>
-              </a:rPr>
-              <a:t> </a:t>
-            </a:r>
-            <a:r>
-              <a:rPr lang="it-IT" b="1" dirty="0" err="1">
+              <a:rPr lang="it-IT" sz="2400" b="1" dirty="0">
+                <a:solidFill>
+                  <a:schemeClr val="tx1"/>
+                </a:solidFill>
+                <a:latin typeface="Century Gothic" panose="020B0502020202020204" pitchFamily="34" charset="0"/>
+                <a:cs typeface="Arial" panose="020B0604020202020204" pitchFamily="34" charset="0"/>
+              </a:rPr>
+              <a:t> </a:t>
+            </a:r>
+            <a:r>
+              <a:rPr lang="it-IT" sz="2400" b="1" dirty="0" err="1">
                 <a:solidFill>
                   <a:schemeClr val="tx1"/>
                 </a:solidFill>
@@ -5333,17 +5454,17 @@
               <a:t>these</a:t>
             </a:r>
             <a:r>
-              <a:rPr lang="it-IT" b="1" dirty="0">
-                <a:solidFill>
-                  <a:schemeClr val="tx1"/>
-                </a:solidFill>
-                <a:latin typeface="Century Gothic" panose="020B0502020202020204" pitchFamily="34" charset="0"/>
-                <a:cs typeface="Arial" panose="020B0604020202020204" pitchFamily="34" charset="0"/>
-              </a:rPr>
-              <a:t> </a:t>
-            </a:r>
-            <a:r>
-              <a:rPr lang="it-IT" b="1" dirty="0" err="1">
+              <a:rPr lang="it-IT" sz="2400" b="1" dirty="0">
+                <a:solidFill>
+                  <a:schemeClr val="tx1"/>
+                </a:solidFill>
+                <a:latin typeface="Century Gothic" panose="020B0502020202020204" pitchFamily="34" charset="0"/>
+                <a:cs typeface="Arial" panose="020B0604020202020204" pitchFamily="34" charset="0"/>
+              </a:rPr>
+              <a:t> </a:t>
+            </a:r>
+            <a:r>
+              <a:rPr lang="it-IT" sz="2400" b="1" dirty="0" err="1">
                 <a:solidFill>
                   <a:schemeClr val="tx1"/>
                 </a:solidFill>
@@ -5353,7 +5474,7 @@
               <a:t>queues</a:t>
             </a:r>
             <a:r>
-              <a:rPr lang="it-IT" b="1" dirty="0">
+              <a:rPr lang="it-IT" sz="2400" b="1" dirty="0">
                 <a:solidFill>
                   <a:schemeClr val="tx1"/>
                 </a:solidFill>
@@ -5363,7 +5484,7 @@
               <a:t> with </a:t>
             </a:r>
             <a:r>
-              <a:rPr lang="it-IT" b="1" dirty="0" err="1">
+              <a:rPr lang="it-IT" sz="2400" b="1" dirty="0" err="1">
                 <a:solidFill>
                   <a:schemeClr val="tx1"/>
                 </a:solidFill>
@@ -5373,17 +5494,17 @@
               <a:t>patient</a:t>
             </a:r>
             <a:r>
-              <a:rPr lang="it-IT" b="1" dirty="0">
-                <a:solidFill>
-                  <a:schemeClr val="tx1"/>
-                </a:solidFill>
-                <a:latin typeface="Century Gothic" panose="020B0502020202020204" pitchFamily="34" charset="0"/>
-                <a:cs typeface="Arial" panose="020B0604020202020204" pitchFamily="34" charset="0"/>
-              </a:rPr>
-              <a:t> </a:t>
-            </a:r>
-            <a:r>
-              <a:rPr lang="it-IT" b="1" dirty="0" err="1">
+              <a:rPr lang="it-IT" sz="2400" b="1" dirty="0">
+                <a:solidFill>
+                  <a:schemeClr val="tx1"/>
+                </a:solidFill>
+                <a:latin typeface="Century Gothic" panose="020B0502020202020204" pitchFamily="34" charset="0"/>
+                <a:cs typeface="Arial" panose="020B0604020202020204" pitchFamily="34" charset="0"/>
+              </a:rPr>
+              <a:t> </a:t>
+            </a:r>
+            <a:r>
+              <a:rPr lang="it-IT" sz="2400" b="1" dirty="0" err="1">
                 <a:solidFill>
                   <a:schemeClr val="tx1"/>
                 </a:solidFill>
@@ -5393,7 +5514,7 @@
               <a:t>arrival</a:t>
             </a:r>
             <a:r>
-              <a:rPr lang="it-IT" b="1" dirty="0">
+              <a:rPr lang="it-IT" sz="2400" b="1" dirty="0">
                 <a:solidFill>
                   <a:schemeClr val="tx1"/>
                 </a:solidFill>
@@ -5403,7 +5524,7 @@
               <a:t> times</a:t>
             </a:r>
             <a:r>
-              <a:rPr lang="it-IT" dirty="0">
+              <a:rPr lang="it-IT" sz="2400" dirty="0">
                 <a:solidFill>
                   <a:schemeClr val="tx1"/>
                 </a:solidFill>
@@ -5415,7 +5536,7 @@
           </a:p>
           <a:p>
             <a:pPr lvl="1"/>
-            <a:endParaRPr lang="it-IT" dirty="0">
+            <a:endParaRPr lang="it-IT" sz="1400" dirty="0">
               <a:solidFill>
                 <a:schemeClr val="tx1"/>
               </a:solidFill>
@@ -5426,17 +5547,17 @@
           <a:p>
             <a:pPr lvl="1"/>
             <a:r>
-              <a:rPr lang="it-IT" b="1" spc="-10" dirty="0" err="1">
+              <a:rPr lang="it-IT" sz="2400" b="1" spc="-10" dirty="0" err="1">
                 <a:solidFill>
                   <a:srgbClr val="003F77"/>
                 </a:solidFill>
-                <a:latin typeface="Century Gothic"/>
+                <a:latin typeface="Century Gothic" panose="020B0502020202020204" pitchFamily="34" charset="0"/>
                 <a:ea typeface="+mj-ea"/>
               </a:rPr>
               <a:t>Semaphore</a:t>
             </a:r>
             <a:r>
-              <a:rPr lang="it-IT" dirty="0">
+              <a:rPr lang="it-IT" sz="2400" dirty="0">
                 <a:solidFill>
                   <a:schemeClr val="tx1"/>
                 </a:solidFill>
@@ -5446,27 +5567,27 @@
               <a:t>: </a:t>
             </a:r>
             <a:r>
-              <a:rPr lang="it-IT" dirty="0" err="1">
-                <a:solidFill>
-                  <a:schemeClr val="tx1"/>
-                </a:solidFill>
-                <a:latin typeface="Century Gothic" panose="020B0502020202020204" pitchFamily="34" charset="0"/>
-                <a:cs typeface="Arial" panose="020B0604020202020204" pitchFamily="34" charset="0"/>
-              </a:rPr>
-              <a:t>Managing</a:t>
-            </a:r>
-            <a:r>
-              <a:rPr lang="it-IT" dirty="0">
-                <a:solidFill>
-                  <a:schemeClr val="tx1"/>
-                </a:solidFill>
-                <a:latin typeface="Century Gothic" panose="020B0502020202020204" pitchFamily="34" charset="0"/>
-                <a:cs typeface="Arial" panose="020B0604020202020204" pitchFamily="34" charset="0"/>
-              </a:rPr>
-              <a:t> </a:t>
-            </a:r>
-            <a:r>
-              <a:rPr lang="it-IT" b="1" dirty="0" err="1">
+              <a:rPr lang="it-IT" sz="2400" dirty="0" err="1">
+                <a:solidFill>
+                  <a:schemeClr val="tx1"/>
+                </a:solidFill>
+                <a:latin typeface="Century Gothic" panose="020B0502020202020204" pitchFamily="34" charset="0"/>
+                <a:cs typeface="Arial" panose="020B0604020202020204" pitchFamily="34" charset="0"/>
+              </a:rPr>
+              <a:t>managing</a:t>
+            </a:r>
+            <a:r>
+              <a:rPr lang="it-IT" sz="2400" dirty="0">
+                <a:solidFill>
+                  <a:schemeClr val="tx1"/>
+                </a:solidFill>
+                <a:latin typeface="Century Gothic" panose="020B0502020202020204" pitchFamily="34" charset="0"/>
+                <a:cs typeface="Arial" panose="020B0604020202020204" pitchFamily="34" charset="0"/>
+              </a:rPr>
+              <a:t> </a:t>
+            </a:r>
+            <a:r>
+              <a:rPr lang="it-IT" sz="2400" b="1" dirty="0" err="1">
                 <a:solidFill>
                   <a:schemeClr val="tx1"/>
                 </a:solidFill>
@@ -5476,7 +5597,7 @@
               <a:t>concurrent</a:t>
             </a:r>
             <a:r>
-              <a:rPr lang="it-IT" b="1" dirty="0">
+              <a:rPr lang="it-IT" sz="2400" b="1" dirty="0">
                 <a:solidFill>
                   <a:schemeClr val="tx1"/>
                 </a:solidFill>
@@ -5486,7 +5607,7 @@
               <a:t> access </a:t>
             </a:r>
             <a:r>
-              <a:rPr lang="it-IT" dirty="0">
+              <a:rPr lang="it-IT" sz="2400" dirty="0">
                 <a:solidFill>
                   <a:schemeClr val="tx1"/>
                 </a:solidFill>
@@ -5496,7 +5617,7 @@
               <a:t>to </a:t>
             </a:r>
             <a:r>
-              <a:rPr lang="it-IT" dirty="0" err="1">
+              <a:rPr lang="it-IT" sz="2400" dirty="0" err="1">
                 <a:solidFill>
                   <a:schemeClr val="tx1"/>
                 </a:solidFill>
@@ -5506,7 +5627,7 @@
               <a:t>operating</a:t>
             </a:r>
             <a:r>
-              <a:rPr lang="it-IT" dirty="0">
+              <a:rPr lang="it-IT" sz="2400" dirty="0">
                 <a:solidFill>
                   <a:schemeClr val="tx1"/>
                 </a:solidFill>
@@ -5516,7 +5637,7 @@
               <a:t> rooms, </a:t>
             </a:r>
             <a:r>
-              <a:rPr lang="it-IT" dirty="0" err="1">
+              <a:rPr lang="it-IT" sz="2400" dirty="0" err="1">
                 <a:solidFill>
                   <a:schemeClr val="tx1"/>
                 </a:solidFill>
@@ -5526,7 +5647,7 @@
               <a:t>when</a:t>
             </a:r>
             <a:r>
-              <a:rPr lang="it-IT" dirty="0">
+              <a:rPr lang="it-IT" sz="2400" dirty="0">
                 <a:solidFill>
                   <a:schemeClr val="tx1"/>
                 </a:solidFill>
@@ -5536,7 +5657,7 @@
               <a:t> a room </a:t>
             </a:r>
             <a:r>
-              <a:rPr lang="it-IT" dirty="0" err="1">
+              <a:rPr lang="it-IT" sz="2400" dirty="0" err="1">
                 <a:solidFill>
                   <a:schemeClr val="tx1"/>
                 </a:solidFill>
@@ -5546,17 +5667,17 @@
               <a:t>is</a:t>
             </a:r>
             <a:r>
-              <a:rPr lang="it-IT" dirty="0">
-                <a:solidFill>
-                  <a:schemeClr val="tx1"/>
-                </a:solidFill>
-                <a:latin typeface="Century Gothic" panose="020B0502020202020204" pitchFamily="34" charset="0"/>
-                <a:cs typeface="Arial" panose="020B0604020202020204" pitchFamily="34" charset="0"/>
-              </a:rPr>
-              <a:t> </a:t>
-            </a:r>
-            <a:r>
-              <a:rPr lang="it-IT" dirty="0" err="1">
+              <a:rPr lang="it-IT" sz="2400" dirty="0">
+                <a:solidFill>
+                  <a:schemeClr val="tx1"/>
+                </a:solidFill>
+                <a:latin typeface="Century Gothic" panose="020B0502020202020204" pitchFamily="34" charset="0"/>
+                <a:cs typeface="Arial" panose="020B0604020202020204" pitchFamily="34" charset="0"/>
+              </a:rPr>
+              <a:t> </a:t>
+            </a:r>
+            <a:r>
+              <a:rPr lang="it-IT" sz="2400" dirty="0" err="1">
                 <a:solidFill>
                   <a:schemeClr val="tx1"/>
                 </a:solidFill>
@@ -5566,7 +5687,7 @@
               <a:t>available</a:t>
             </a:r>
             <a:r>
-              <a:rPr lang="it-IT" dirty="0">
+              <a:rPr lang="it-IT" sz="2400" dirty="0">
                 <a:solidFill>
                   <a:schemeClr val="tx1"/>
                 </a:solidFill>
@@ -5576,7 +5697,7 @@
               <a:t>, the </a:t>
             </a:r>
             <a:r>
-              <a:rPr lang="it-IT" dirty="0" err="1">
+              <a:rPr lang="it-IT" sz="2400" dirty="0" err="1">
                 <a:solidFill>
                   <a:schemeClr val="tx1"/>
                 </a:solidFill>
@@ -5586,17 +5707,17 @@
               <a:t>semaphore</a:t>
             </a:r>
             <a:r>
-              <a:rPr lang="it-IT" dirty="0">
-                <a:solidFill>
-                  <a:schemeClr val="tx1"/>
-                </a:solidFill>
-                <a:latin typeface="Century Gothic" panose="020B0502020202020204" pitchFamily="34" charset="0"/>
-                <a:cs typeface="Arial" panose="020B0604020202020204" pitchFamily="34" charset="0"/>
-              </a:rPr>
-              <a:t> </a:t>
-            </a:r>
-            <a:r>
-              <a:rPr lang="it-IT" dirty="0" err="1">
+              <a:rPr lang="it-IT" sz="2400" dirty="0">
+                <a:solidFill>
+                  <a:schemeClr val="tx1"/>
+                </a:solidFill>
+                <a:latin typeface="Century Gothic" panose="020B0502020202020204" pitchFamily="34" charset="0"/>
+                <a:cs typeface="Arial" panose="020B0604020202020204" pitchFamily="34" charset="0"/>
+              </a:rPr>
+              <a:t> </a:t>
+            </a:r>
+            <a:r>
+              <a:rPr lang="it-IT" sz="2400" dirty="0" err="1">
                 <a:solidFill>
                   <a:schemeClr val="tx1"/>
                 </a:solidFill>
@@ -5606,17 +5727,17 @@
               <a:t>is</a:t>
             </a:r>
             <a:r>
-              <a:rPr lang="it-IT" dirty="0">
-                <a:solidFill>
-                  <a:schemeClr val="tx1"/>
-                </a:solidFill>
-                <a:latin typeface="Century Gothic" panose="020B0502020202020204" pitchFamily="34" charset="0"/>
-                <a:cs typeface="Arial" panose="020B0604020202020204" pitchFamily="34" charset="0"/>
-              </a:rPr>
-              <a:t> </a:t>
-            </a:r>
-            <a:r>
-              <a:rPr lang="it-IT" dirty="0" err="1">
+              <a:rPr lang="it-IT" sz="2400" dirty="0">
+                <a:solidFill>
+                  <a:schemeClr val="tx1"/>
+                </a:solidFill>
+                <a:latin typeface="Century Gothic" panose="020B0502020202020204" pitchFamily="34" charset="0"/>
+                <a:cs typeface="Arial" panose="020B0604020202020204" pitchFamily="34" charset="0"/>
+              </a:rPr>
+              <a:t> </a:t>
+            </a:r>
+            <a:r>
+              <a:rPr lang="it-IT" sz="2400" dirty="0" err="1">
                 <a:solidFill>
                   <a:schemeClr val="tx1"/>
                 </a:solidFill>
@@ -5626,7 +5747,7 @@
               <a:t>taken</a:t>
             </a:r>
             <a:r>
-              <a:rPr lang="it-IT" dirty="0">
+              <a:rPr lang="it-IT" sz="2400" dirty="0">
                 <a:solidFill>
                   <a:schemeClr val="tx1"/>
                 </a:solidFill>
@@ -5636,7 +5757,7 @@
               <a:t> (</a:t>
             </a:r>
             <a:r>
-              <a:rPr lang="it-IT" i="1" dirty="0" err="1">
+              <a:rPr lang="it-IT" sz="2400" i="1" dirty="0" err="1">
                 <a:solidFill>
                   <a:schemeClr val="tx1"/>
                 </a:solidFill>
@@ -5646,7 +5767,7 @@
               <a:t>xSemaphoreTake</a:t>
             </a:r>
             <a:r>
-              <a:rPr lang="it-IT" dirty="0">
+              <a:rPr lang="it-IT" sz="2400" dirty="0">
                 <a:solidFill>
                   <a:schemeClr val="tx1"/>
                 </a:solidFill>
@@ -5656,7 +5777,7 @@
               <a:t>) and </a:t>
             </a:r>
             <a:r>
-              <a:rPr lang="it-IT" dirty="0" err="1">
+              <a:rPr lang="it-IT" sz="2400" dirty="0" err="1">
                 <a:solidFill>
                   <a:schemeClr val="tx1"/>
                 </a:solidFill>
@@ -5666,17 +5787,17 @@
               <a:t>then</a:t>
             </a:r>
             <a:r>
-              <a:rPr lang="it-IT" dirty="0">
-                <a:solidFill>
-                  <a:schemeClr val="tx1"/>
-                </a:solidFill>
-                <a:latin typeface="Century Gothic" panose="020B0502020202020204" pitchFamily="34" charset="0"/>
-                <a:cs typeface="Arial" panose="020B0604020202020204" pitchFamily="34" charset="0"/>
-              </a:rPr>
-              <a:t> </a:t>
-            </a:r>
-            <a:r>
-              <a:rPr lang="it-IT" dirty="0" err="1">
+              <a:rPr lang="it-IT" sz="2400" dirty="0">
+                <a:solidFill>
+                  <a:schemeClr val="tx1"/>
+                </a:solidFill>
+                <a:latin typeface="Century Gothic" panose="020B0502020202020204" pitchFamily="34" charset="0"/>
+                <a:cs typeface="Arial" panose="020B0604020202020204" pitchFamily="34" charset="0"/>
+              </a:rPr>
+              <a:t> </a:t>
+            </a:r>
+            <a:r>
+              <a:rPr lang="it-IT" sz="2400" dirty="0" err="1">
                 <a:solidFill>
                   <a:schemeClr val="tx1"/>
                 </a:solidFill>
@@ -5686,7 +5807,7 @@
               <a:t>released</a:t>
             </a:r>
             <a:r>
-              <a:rPr lang="it-IT" dirty="0">
+              <a:rPr lang="it-IT" sz="2400" dirty="0">
                 <a:solidFill>
                   <a:schemeClr val="tx1"/>
                 </a:solidFill>
@@ -5696,7 +5817,7 @@
               <a:t> (</a:t>
             </a:r>
             <a:r>
-              <a:rPr lang="it-IT" i="1" dirty="0" err="1">
+              <a:rPr lang="it-IT" sz="2400" i="1" dirty="0" err="1">
                 <a:solidFill>
                   <a:schemeClr val="tx1"/>
                 </a:solidFill>
@@ -5706,7 +5827,7 @@
               <a:t>xSemaphoreGive</a:t>
             </a:r>
             <a:r>
-              <a:rPr lang="it-IT" dirty="0">
+              <a:rPr lang="it-IT" sz="2400" dirty="0">
                 <a:solidFill>
                   <a:schemeClr val="tx1"/>
                 </a:solidFill>
@@ -5716,7 +5837,7 @@
               <a:t>) </a:t>
             </a:r>
             <a:r>
-              <a:rPr lang="it-IT" dirty="0" err="1">
+              <a:rPr lang="it-IT" sz="2400" dirty="0" err="1">
                 <a:solidFill>
                   <a:schemeClr val="tx1"/>
                 </a:solidFill>
@@ -5726,7 +5847,7 @@
               <a:t>when</a:t>
             </a:r>
             <a:r>
-              <a:rPr lang="it-IT" dirty="0">
+              <a:rPr lang="it-IT" sz="2400" dirty="0">
                 <a:solidFill>
                   <a:schemeClr val="tx1"/>
                 </a:solidFill>
@@ -5736,7 +5857,7 @@
               <a:t> the </a:t>
             </a:r>
             <a:r>
-              <a:rPr lang="it-IT" dirty="0" err="1">
+              <a:rPr lang="it-IT" sz="2400" dirty="0" err="1">
                 <a:solidFill>
                   <a:schemeClr val="tx1"/>
                 </a:solidFill>
@@ -5746,17 +5867,17 @@
               <a:t>operation</a:t>
             </a:r>
             <a:r>
-              <a:rPr lang="it-IT" dirty="0">
-                <a:solidFill>
-                  <a:schemeClr val="tx1"/>
-                </a:solidFill>
-                <a:latin typeface="Century Gothic" panose="020B0502020202020204" pitchFamily="34" charset="0"/>
-                <a:cs typeface="Arial" panose="020B0604020202020204" pitchFamily="34" charset="0"/>
-              </a:rPr>
-              <a:t> </a:t>
-            </a:r>
-            <a:r>
-              <a:rPr lang="it-IT" dirty="0" err="1">
+              <a:rPr lang="it-IT" sz="2400" dirty="0">
+                <a:solidFill>
+                  <a:schemeClr val="tx1"/>
+                </a:solidFill>
+                <a:latin typeface="Century Gothic" panose="020B0502020202020204" pitchFamily="34" charset="0"/>
+                <a:cs typeface="Arial" panose="020B0604020202020204" pitchFamily="34" charset="0"/>
+              </a:rPr>
+              <a:t> </a:t>
+            </a:r>
+            <a:r>
+              <a:rPr lang="it-IT" sz="2400" dirty="0" err="1">
                 <a:solidFill>
                   <a:schemeClr val="tx1"/>
                 </a:solidFill>
@@ -5766,17 +5887,17 @@
               <a:t>is</a:t>
             </a:r>
             <a:r>
-              <a:rPr lang="it-IT" dirty="0">
-                <a:solidFill>
-                  <a:schemeClr val="tx1"/>
-                </a:solidFill>
-                <a:latin typeface="Century Gothic" panose="020B0502020202020204" pitchFamily="34" charset="0"/>
-                <a:cs typeface="Arial" panose="020B0604020202020204" pitchFamily="34" charset="0"/>
-              </a:rPr>
-              <a:t> </a:t>
-            </a:r>
-            <a:r>
-              <a:rPr lang="it-IT" dirty="0" err="1">
+              <a:rPr lang="it-IT" sz="2400" dirty="0">
+                <a:solidFill>
+                  <a:schemeClr val="tx1"/>
+                </a:solidFill>
+                <a:latin typeface="Century Gothic" panose="020B0502020202020204" pitchFamily="34" charset="0"/>
+                <a:cs typeface="Arial" panose="020B0604020202020204" pitchFamily="34" charset="0"/>
+              </a:rPr>
+              <a:t> </a:t>
+            </a:r>
+            <a:r>
+              <a:rPr lang="it-IT" sz="2400" dirty="0" err="1">
                 <a:solidFill>
                   <a:schemeClr val="tx1"/>
                 </a:solidFill>
@@ -5786,7 +5907,7 @@
               <a:t>completed</a:t>
             </a:r>
             <a:r>
-              <a:rPr lang="it-IT" dirty="0">
+              <a:rPr lang="it-IT" sz="2400" dirty="0">
                 <a:solidFill>
                   <a:schemeClr val="tx1"/>
                 </a:solidFill>
@@ -5798,7 +5919,7 @@
           </a:p>
           <a:p>
             <a:pPr lvl="1"/>
-            <a:endParaRPr lang="it-IT" dirty="0">
+            <a:endParaRPr lang="it-IT" sz="1400" dirty="0">
               <a:solidFill>
                 <a:schemeClr val="tx1"/>
               </a:solidFill>
@@ -5808,7 +5929,270 @@
           </a:p>
           <a:p>
             <a:pPr lvl="1"/>
-            <a:endParaRPr lang="it-IT" dirty="0">
+            <a:r>
+              <a:rPr lang="it-IT" sz="2400" b="1" spc="-10" dirty="0">
+                <a:solidFill>
+                  <a:srgbClr val="003F77"/>
+                </a:solidFill>
+                <a:latin typeface="Century Gothic" panose="020B0502020202020204" pitchFamily="34" charset="0"/>
+                <a:ea typeface="+mj-ea"/>
+              </a:rPr>
+              <a:t>Multitasking</a:t>
+            </a:r>
+            <a:r>
+              <a:rPr lang="it-IT" sz="2400" dirty="0">
+                <a:solidFill>
+                  <a:schemeClr val="tx1"/>
+                </a:solidFill>
+                <a:latin typeface="Century Gothic" panose="020B0502020202020204" pitchFamily="34" charset="0"/>
+                <a:cs typeface="Arial" panose="020B0604020202020204" pitchFamily="34" charset="0"/>
+              </a:rPr>
+              <a:t>: </a:t>
+            </a:r>
+            <a:r>
+              <a:rPr lang="it-IT" sz="2400" i="1" dirty="0" err="1">
+                <a:solidFill>
+                  <a:schemeClr val="tx1"/>
+                </a:solidFill>
+                <a:latin typeface="Century Gothic" panose="020B0502020202020204" pitchFamily="34" charset="0"/>
+                <a:cs typeface="Arial" panose="020B0604020202020204" pitchFamily="34" charset="0"/>
+              </a:rPr>
+              <a:t>fillQueue</a:t>
+            </a:r>
+            <a:r>
+              <a:rPr lang="it-IT" sz="2400" dirty="0">
+                <a:solidFill>
+                  <a:schemeClr val="tx1"/>
+                </a:solidFill>
+                <a:latin typeface="Century Gothic" panose="020B0502020202020204" pitchFamily="34" charset="0"/>
+                <a:cs typeface="Arial" panose="020B0604020202020204" pitchFamily="34" charset="0"/>
+              </a:rPr>
+              <a:t> and </a:t>
+            </a:r>
+            <a:r>
+              <a:rPr lang="it-IT" sz="2400" i="1" dirty="0" err="1">
+                <a:solidFill>
+                  <a:schemeClr val="tx1"/>
+                </a:solidFill>
+                <a:latin typeface="Century Gothic" panose="020B0502020202020204" pitchFamily="34" charset="0"/>
+                <a:cs typeface="Arial" panose="020B0604020202020204" pitchFamily="34" charset="0"/>
+              </a:rPr>
+              <a:t>operatingRoomTask</a:t>
+            </a:r>
+            <a:r>
+              <a:rPr lang="it-IT" sz="2400" dirty="0">
+                <a:solidFill>
+                  <a:schemeClr val="tx1"/>
+                </a:solidFill>
+                <a:latin typeface="Century Gothic" panose="020B0502020202020204" pitchFamily="34" charset="0"/>
+                <a:cs typeface="Arial" panose="020B0604020202020204" pitchFamily="34" charset="0"/>
+              </a:rPr>
+              <a:t> </a:t>
+            </a:r>
+            <a:r>
+              <a:rPr lang="it-IT" sz="2400" dirty="0" err="1">
+                <a:solidFill>
+                  <a:schemeClr val="tx1"/>
+                </a:solidFill>
+                <a:latin typeface="Century Gothic" panose="020B0502020202020204" pitchFamily="34" charset="0"/>
+                <a:cs typeface="Arial" panose="020B0604020202020204" pitchFamily="34" charset="0"/>
+              </a:rPr>
+              <a:t>manage</a:t>
+            </a:r>
+            <a:r>
+              <a:rPr lang="it-IT" sz="2400" dirty="0">
+                <a:solidFill>
+                  <a:schemeClr val="tx1"/>
+                </a:solidFill>
+                <a:latin typeface="Century Gothic" panose="020B0502020202020204" pitchFamily="34" charset="0"/>
+                <a:cs typeface="Arial" panose="020B0604020202020204" pitchFamily="34" charset="0"/>
+              </a:rPr>
+              <a:t> </a:t>
+            </a:r>
+            <a:r>
+              <a:rPr lang="it-IT" sz="2400" dirty="0" err="1">
+                <a:solidFill>
+                  <a:schemeClr val="tx1"/>
+                </a:solidFill>
+                <a:latin typeface="Century Gothic" panose="020B0502020202020204" pitchFamily="34" charset="0"/>
+                <a:cs typeface="Arial" panose="020B0604020202020204" pitchFamily="34" charset="0"/>
+              </a:rPr>
+              <a:t>patient</a:t>
+            </a:r>
+            <a:r>
+              <a:rPr lang="it-IT" sz="2400" dirty="0">
+                <a:solidFill>
+                  <a:schemeClr val="tx1"/>
+                </a:solidFill>
+                <a:latin typeface="Century Gothic" panose="020B0502020202020204" pitchFamily="34" charset="0"/>
+                <a:cs typeface="Arial" panose="020B0604020202020204" pitchFamily="34" charset="0"/>
+              </a:rPr>
+              <a:t> </a:t>
+            </a:r>
+            <a:r>
+              <a:rPr lang="it-IT" sz="2400" dirty="0" err="1">
+                <a:solidFill>
+                  <a:schemeClr val="tx1"/>
+                </a:solidFill>
+                <a:latin typeface="Century Gothic" panose="020B0502020202020204" pitchFamily="34" charset="0"/>
+                <a:cs typeface="Arial" panose="020B0604020202020204" pitchFamily="34" charset="0"/>
+              </a:rPr>
+              <a:t>arrival</a:t>
+            </a:r>
+            <a:r>
+              <a:rPr lang="it-IT" sz="2400" dirty="0">
+                <a:solidFill>
+                  <a:schemeClr val="tx1"/>
+                </a:solidFill>
+                <a:latin typeface="Century Gothic" panose="020B0502020202020204" pitchFamily="34" charset="0"/>
+                <a:cs typeface="Arial" panose="020B0604020202020204" pitchFamily="34" charset="0"/>
+              </a:rPr>
+              <a:t> and </a:t>
+            </a:r>
+            <a:r>
+              <a:rPr lang="it-IT" sz="2400" dirty="0" err="1">
+                <a:solidFill>
+                  <a:schemeClr val="tx1"/>
+                </a:solidFill>
+                <a:latin typeface="Century Gothic" panose="020B0502020202020204" pitchFamily="34" charset="0"/>
+                <a:cs typeface="Arial" panose="020B0604020202020204" pitchFamily="34" charset="0"/>
+              </a:rPr>
+              <a:t>operation</a:t>
+            </a:r>
+            <a:r>
+              <a:rPr lang="it-IT" sz="2400" dirty="0">
+                <a:solidFill>
+                  <a:schemeClr val="tx1"/>
+                </a:solidFill>
+                <a:latin typeface="Century Gothic" panose="020B0502020202020204" pitchFamily="34" charset="0"/>
+                <a:cs typeface="Arial" panose="020B0604020202020204" pitchFamily="34" charset="0"/>
+              </a:rPr>
+              <a:t> in </a:t>
+            </a:r>
+            <a:r>
+              <a:rPr lang="it-IT" sz="2400" dirty="0" err="1">
+                <a:solidFill>
+                  <a:schemeClr val="tx1"/>
+                </a:solidFill>
+                <a:latin typeface="Century Gothic" panose="020B0502020202020204" pitchFamily="34" charset="0"/>
+                <a:cs typeface="Arial" panose="020B0604020202020204" pitchFamily="34" charset="0"/>
+              </a:rPr>
+              <a:t>operating</a:t>
+            </a:r>
+            <a:r>
+              <a:rPr lang="it-IT" sz="2400" dirty="0">
+                <a:solidFill>
+                  <a:schemeClr val="tx1"/>
+                </a:solidFill>
+                <a:latin typeface="Century Gothic" panose="020B0502020202020204" pitchFamily="34" charset="0"/>
+                <a:cs typeface="Arial" panose="020B0604020202020204" pitchFamily="34" charset="0"/>
+              </a:rPr>
+              <a:t> rooms, working in </a:t>
+            </a:r>
+            <a:r>
+              <a:rPr lang="it-IT" sz="2400" b="1" dirty="0" err="1">
+                <a:solidFill>
+                  <a:schemeClr val="tx1"/>
+                </a:solidFill>
+                <a:latin typeface="Century Gothic" panose="020B0502020202020204" pitchFamily="34" charset="0"/>
+                <a:cs typeface="Arial" panose="020B0604020202020204" pitchFamily="34" charset="0"/>
+              </a:rPr>
+              <a:t>parallel</a:t>
+            </a:r>
+            <a:r>
+              <a:rPr lang="it-IT" sz="2400" dirty="0">
+                <a:solidFill>
+                  <a:schemeClr val="tx1"/>
+                </a:solidFill>
+                <a:latin typeface="Century Gothic" panose="020B0502020202020204" pitchFamily="34" charset="0"/>
+                <a:cs typeface="Arial" panose="020B0604020202020204" pitchFamily="34" charset="0"/>
+              </a:rPr>
+              <a:t>, </a:t>
+            </a:r>
+            <a:r>
+              <a:rPr lang="it-IT" sz="2400" dirty="0" err="1">
+                <a:solidFill>
+                  <a:schemeClr val="tx1"/>
+                </a:solidFill>
+                <a:latin typeface="Century Gothic" panose="020B0502020202020204" pitchFamily="34" charset="0"/>
+                <a:cs typeface="Arial" panose="020B0604020202020204" pitchFamily="34" charset="0"/>
+              </a:rPr>
+              <a:t>allowing</a:t>
+            </a:r>
+            <a:r>
+              <a:rPr lang="it-IT" sz="2400" dirty="0">
+                <a:solidFill>
+                  <a:schemeClr val="tx1"/>
+                </a:solidFill>
+                <a:latin typeface="Century Gothic" panose="020B0502020202020204" pitchFamily="34" charset="0"/>
+                <a:cs typeface="Arial" panose="020B0604020202020204" pitchFamily="34" charset="0"/>
+              </a:rPr>
+              <a:t> </a:t>
+            </a:r>
+            <a:r>
+              <a:rPr lang="it-IT" sz="2400" b="1" dirty="0" err="1">
+                <a:solidFill>
+                  <a:schemeClr val="tx1"/>
+                </a:solidFill>
+                <a:latin typeface="Century Gothic" panose="020B0502020202020204" pitchFamily="34" charset="0"/>
+                <a:cs typeface="Arial" panose="020B0604020202020204" pitchFamily="34" charset="0"/>
+              </a:rPr>
+              <a:t>realistic</a:t>
+            </a:r>
+            <a:r>
+              <a:rPr lang="it-IT" sz="2400" dirty="0">
+                <a:solidFill>
+                  <a:schemeClr val="tx1"/>
+                </a:solidFill>
+                <a:latin typeface="Century Gothic" panose="020B0502020202020204" pitchFamily="34" charset="0"/>
+                <a:cs typeface="Arial" panose="020B0604020202020204" pitchFamily="34" charset="0"/>
+              </a:rPr>
+              <a:t> </a:t>
+            </a:r>
+            <a:r>
+              <a:rPr lang="it-IT" sz="2400" dirty="0" err="1">
+                <a:solidFill>
+                  <a:schemeClr val="tx1"/>
+                </a:solidFill>
+                <a:latin typeface="Century Gothic" panose="020B0502020202020204" pitchFamily="34" charset="0"/>
+                <a:cs typeface="Arial" panose="020B0604020202020204" pitchFamily="34" charset="0"/>
+              </a:rPr>
+              <a:t>simulation</a:t>
+            </a:r>
+            <a:r>
+              <a:rPr lang="it-IT" sz="2400" dirty="0">
+                <a:solidFill>
+                  <a:schemeClr val="tx1"/>
+                </a:solidFill>
+                <a:latin typeface="Century Gothic" panose="020B0502020202020204" pitchFamily="34" charset="0"/>
+                <a:cs typeface="Arial" panose="020B0604020202020204" pitchFamily="34" charset="0"/>
+              </a:rPr>
+              <a:t> of the hospital </a:t>
+            </a:r>
+            <a:r>
+              <a:rPr lang="it-IT" sz="2400" dirty="0" err="1">
+                <a:solidFill>
+                  <a:schemeClr val="tx1"/>
+                </a:solidFill>
+                <a:latin typeface="Century Gothic" panose="020B0502020202020204" pitchFamily="34" charset="0"/>
+                <a:cs typeface="Arial" panose="020B0604020202020204" pitchFamily="34" charset="0"/>
+              </a:rPr>
+              <a:t>environment</a:t>
+            </a:r>
+            <a:r>
+              <a:rPr lang="it-IT" sz="2400" dirty="0">
+                <a:solidFill>
+                  <a:schemeClr val="tx1"/>
+                </a:solidFill>
+                <a:latin typeface="Century Gothic" panose="020B0502020202020204" pitchFamily="34" charset="0"/>
+                <a:cs typeface="Arial" panose="020B0604020202020204" pitchFamily="34" charset="0"/>
+              </a:rPr>
+              <a:t>.</a:t>
+            </a:r>
+          </a:p>
+          <a:p>
+            <a:pPr lvl="1"/>
+            <a:endParaRPr lang="it-IT" sz="1400" dirty="0">
               <a:solidFill>
                 <a:schemeClr val="tx1"/>
               </a:solidFill>
@@ -5819,17 +6203,17 @@
           <a:p>
             <a:pPr lvl="1"/>
             <a:r>
-              <a:rPr lang="it-IT" b="1" spc="-10" dirty="0">
+              <a:rPr lang="it-IT" sz="2400" b="1" spc="-10" dirty="0">
                 <a:solidFill>
                   <a:srgbClr val="003F77"/>
                 </a:solidFill>
-                <a:latin typeface="Century Gothic"/>
+                <a:latin typeface="Century Gothic" panose="020B0502020202020204" pitchFamily="34" charset="0"/>
                 <a:ea typeface="+mj-ea"/>
               </a:rPr>
-              <a:t>Multitasking</a:t>
-            </a:r>
-            <a:r>
-              <a:rPr lang="it-IT" dirty="0">
+              <a:t>Timer</a:t>
+            </a:r>
+            <a:r>
+              <a:rPr lang="it-IT" sz="2400" dirty="0">
                 <a:solidFill>
                   <a:schemeClr val="tx1"/>
                 </a:solidFill>
@@ -5839,47 +6223,27 @@
               <a:t>: </a:t>
             </a:r>
             <a:r>
-              <a:rPr lang="it-IT" i="1" dirty="0" err="1">
-                <a:solidFill>
-                  <a:schemeClr val="tx1"/>
-                </a:solidFill>
-                <a:latin typeface="Century Gothic" panose="020B0502020202020204" pitchFamily="34" charset="0"/>
-                <a:cs typeface="Arial" panose="020B0604020202020204" pitchFamily="34" charset="0"/>
-              </a:rPr>
-              <a:t>fillQueue</a:t>
-            </a:r>
-            <a:r>
-              <a:rPr lang="it-IT" dirty="0">
-                <a:solidFill>
-                  <a:schemeClr val="tx1"/>
-                </a:solidFill>
-                <a:latin typeface="Century Gothic" panose="020B0502020202020204" pitchFamily="34" charset="0"/>
-                <a:cs typeface="Arial" panose="020B0604020202020204" pitchFamily="34" charset="0"/>
-              </a:rPr>
-              <a:t> and </a:t>
-            </a:r>
-            <a:r>
-              <a:rPr lang="it-IT" i="1" dirty="0" err="1">
-                <a:solidFill>
-                  <a:schemeClr val="tx1"/>
-                </a:solidFill>
-                <a:latin typeface="Century Gothic" panose="020B0502020202020204" pitchFamily="34" charset="0"/>
-                <a:cs typeface="Arial" panose="020B0604020202020204" pitchFamily="34" charset="0"/>
-              </a:rPr>
-              <a:t>operatingRoomTask</a:t>
-            </a:r>
-            <a:r>
-              <a:rPr lang="it-IT" dirty="0">
-                <a:solidFill>
-                  <a:schemeClr val="tx1"/>
-                </a:solidFill>
-                <a:latin typeface="Century Gothic" panose="020B0502020202020204" pitchFamily="34" charset="0"/>
-                <a:cs typeface="Arial" panose="020B0604020202020204" pitchFamily="34" charset="0"/>
-              </a:rPr>
-              <a:t> </a:t>
-            </a:r>
-            <a:r>
-              <a:rPr lang="it-IT" dirty="0" err="1">
+              <a:rPr lang="it-IT" sz="2400" dirty="0" err="1">
+                <a:solidFill>
+                  <a:schemeClr val="tx1"/>
+                </a:solidFill>
+                <a:latin typeface="Century Gothic" panose="020B0502020202020204" pitchFamily="34" charset="0"/>
+                <a:cs typeface="Arial" panose="020B0604020202020204" pitchFamily="34" charset="0"/>
+              </a:rPr>
+              <a:t>they</a:t>
+            </a:r>
+            <a:r>
+              <a:rPr lang="it-IT" sz="2400" dirty="0">
+                <a:solidFill>
+                  <a:schemeClr val="tx1"/>
+                </a:solidFill>
+                <a:latin typeface="Century Gothic" panose="020B0502020202020204" pitchFamily="34" charset="0"/>
+                <a:cs typeface="Arial" panose="020B0604020202020204" pitchFamily="34" charset="0"/>
+              </a:rPr>
+              <a:t> </a:t>
+            </a:r>
+            <a:r>
+              <a:rPr lang="it-IT" sz="2400" dirty="0" err="1">
                 <a:solidFill>
                   <a:schemeClr val="tx1"/>
                 </a:solidFill>
@@ -5889,67 +6253,47 @@
               <a:t>manage</a:t>
             </a:r>
             <a:r>
-              <a:rPr lang="it-IT" dirty="0">
-                <a:solidFill>
-                  <a:schemeClr val="tx1"/>
-                </a:solidFill>
-                <a:latin typeface="Century Gothic" panose="020B0502020202020204" pitchFamily="34" charset="0"/>
-                <a:cs typeface="Arial" panose="020B0604020202020204" pitchFamily="34" charset="0"/>
-              </a:rPr>
-              <a:t> </a:t>
-            </a:r>
-            <a:r>
-              <a:rPr lang="it-IT" dirty="0" err="1">
-                <a:solidFill>
-                  <a:schemeClr val="tx1"/>
-                </a:solidFill>
-                <a:latin typeface="Century Gothic" panose="020B0502020202020204" pitchFamily="34" charset="0"/>
-                <a:cs typeface="Arial" panose="020B0604020202020204" pitchFamily="34" charset="0"/>
-              </a:rPr>
-              <a:t>patient</a:t>
-            </a:r>
-            <a:r>
-              <a:rPr lang="it-IT" dirty="0">
-                <a:solidFill>
-                  <a:schemeClr val="tx1"/>
-                </a:solidFill>
-                <a:latin typeface="Century Gothic" panose="020B0502020202020204" pitchFamily="34" charset="0"/>
-                <a:cs typeface="Arial" panose="020B0604020202020204" pitchFamily="34" charset="0"/>
-              </a:rPr>
-              <a:t> </a:t>
-            </a:r>
-            <a:r>
-              <a:rPr lang="it-IT" dirty="0" err="1">
-                <a:solidFill>
-                  <a:schemeClr val="tx1"/>
-                </a:solidFill>
-                <a:latin typeface="Century Gothic" panose="020B0502020202020204" pitchFamily="34" charset="0"/>
-                <a:cs typeface="Arial" panose="020B0604020202020204" pitchFamily="34" charset="0"/>
-              </a:rPr>
-              <a:t>arrival</a:t>
-            </a:r>
-            <a:r>
-              <a:rPr lang="it-IT" dirty="0">
-                <a:solidFill>
-                  <a:schemeClr val="tx1"/>
-                </a:solidFill>
-                <a:latin typeface="Century Gothic" panose="020B0502020202020204" pitchFamily="34" charset="0"/>
-                <a:cs typeface="Arial" panose="020B0604020202020204" pitchFamily="34" charset="0"/>
-              </a:rPr>
-              <a:t> and </a:t>
-            </a:r>
-            <a:r>
-              <a:rPr lang="it-IT" dirty="0" err="1">
-                <a:solidFill>
-                  <a:schemeClr val="tx1"/>
-                </a:solidFill>
-                <a:latin typeface="Century Gothic" panose="020B0502020202020204" pitchFamily="34" charset="0"/>
-                <a:cs typeface="Arial" panose="020B0604020202020204" pitchFamily="34" charset="0"/>
-              </a:rPr>
-              <a:t>operation</a:t>
-            </a:r>
-            <a:r>
-              <a:rPr lang="it-IT" dirty="0">
+              <a:rPr lang="it-IT" sz="2400" dirty="0">
+                <a:solidFill>
+                  <a:schemeClr val="tx1"/>
+                </a:solidFill>
+                <a:latin typeface="Century Gothic" panose="020B0502020202020204" pitchFamily="34" charset="0"/>
+                <a:cs typeface="Arial" panose="020B0604020202020204" pitchFamily="34" charset="0"/>
+              </a:rPr>
+              <a:t> the </a:t>
+            </a:r>
+            <a:r>
+              <a:rPr lang="it-IT" sz="2400" b="1" dirty="0">
+                <a:solidFill>
+                  <a:schemeClr val="tx1"/>
+                </a:solidFill>
+                <a:latin typeface="Century Gothic" panose="020B0502020202020204" pitchFamily="34" charset="0"/>
+                <a:cs typeface="Arial" panose="020B0604020202020204" pitchFamily="34" charset="0"/>
+              </a:rPr>
+              <a:t>duration</a:t>
+            </a:r>
+            <a:r>
+              <a:rPr lang="it-IT" sz="2400" dirty="0">
+                <a:solidFill>
+                  <a:schemeClr val="tx1"/>
+                </a:solidFill>
+                <a:latin typeface="Century Gothic" panose="020B0502020202020204" pitchFamily="34" charset="0"/>
+                <a:cs typeface="Arial" panose="020B0604020202020204" pitchFamily="34" charset="0"/>
+              </a:rPr>
+              <a:t> of </a:t>
+            </a:r>
+            <a:r>
+              <a:rPr lang="it-IT" sz="2400" dirty="0" err="1">
+                <a:solidFill>
+                  <a:schemeClr val="tx1"/>
+                </a:solidFill>
+                <a:latin typeface="Century Gothic" panose="020B0502020202020204" pitchFamily="34" charset="0"/>
+                <a:cs typeface="Arial" panose="020B0604020202020204" pitchFamily="34" charset="0"/>
+              </a:rPr>
+              <a:t>operations</a:t>
+            </a:r>
+            <a:r>
+              <a:rPr lang="it-IT" sz="2400" dirty="0">
                 <a:solidFill>
                   <a:schemeClr val="tx1"/>
                 </a:solidFill>
@@ -5959,7 +6303,27 @@
               <a:t> in </a:t>
             </a:r>
             <a:r>
-              <a:rPr lang="it-IT" dirty="0" err="1">
+              <a:rPr lang="it-IT" sz="2400" dirty="0" err="1">
+                <a:solidFill>
+                  <a:schemeClr val="tx1"/>
+                </a:solidFill>
+                <a:latin typeface="Century Gothic" panose="020B0502020202020204" pitchFamily="34" charset="0"/>
+                <a:cs typeface="Arial" panose="020B0604020202020204" pitchFamily="34" charset="0"/>
+              </a:rPr>
+              <a:t>each</a:t>
+            </a:r>
+            <a:r>
+              <a:rPr lang="it-IT" sz="2400" dirty="0">
+                <a:solidFill>
+                  <a:schemeClr val="tx1"/>
+                </a:solidFill>
+                <a:latin typeface="Century Gothic" panose="020B0502020202020204" pitchFamily="34" charset="0"/>
+                <a:cs typeface="Arial" panose="020B0604020202020204" pitchFamily="34" charset="0"/>
+              </a:rPr>
+              <a:t> </a:t>
+            </a:r>
+            <a:r>
+              <a:rPr lang="it-IT" sz="2400" dirty="0" err="1">
                 <a:solidFill>
                   <a:schemeClr val="tx1"/>
                 </a:solidFill>
@@ -5969,281 +6333,18 @@
               <a:t>operating</a:t>
             </a:r>
             <a:r>
-              <a:rPr lang="it-IT" dirty="0">
-                <a:solidFill>
-                  <a:schemeClr val="tx1"/>
-                </a:solidFill>
-                <a:latin typeface="Century Gothic" panose="020B0502020202020204" pitchFamily="34" charset="0"/>
-                <a:cs typeface="Arial" panose="020B0604020202020204" pitchFamily="34" charset="0"/>
-              </a:rPr>
-              <a:t> rooms, working in </a:t>
-            </a:r>
-            <a:r>
-              <a:rPr lang="it-IT" b="1" dirty="0" err="1">
-                <a:solidFill>
-                  <a:schemeClr val="tx1"/>
-                </a:solidFill>
-                <a:latin typeface="Century Gothic" panose="020B0502020202020204" pitchFamily="34" charset="0"/>
-                <a:cs typeface="Arial" panose="020B0604020202020204" pitchFamily="34" charset="0"/>
-              </a:rPr>
-              <a:t>parallel</a:t>
-            </a:r>
-            <a:r>
-              <a:rPr lang="it-IT" dirty="0">
-                <a:solidFill>
-                  <a:schemeClr val="tx1"/>
-                </a:solidFill>
-                <a:latin typeface="Century Gothic" panose="020B0502020202020204" pitchFamily="34" charset="0"/>
-                <a:cs typeface="Arial" panose="020B0604020202020204" pitchFamily="34" charset="0"/>
-              </a:rPr>
-              <a:t>, </a:t>
-            </a:r>
-            <a:r>
-              <a:rPr lang="it-IT" dirty="0" err="1">
-                <a:solidFill>
-                  <a:schemeClr val="tx1"/>
-                </a:solidFill>
-                <a:latin typeface="Century Gothic" panose="020B0502020202020204" pitchFamily="34" charset="0"/>
-                <a:cs typeface="Arial" panose="020B0604020202020204" pitchFamily="34" charset="0"/>
-              </a:rPr>
-              <a:t>allowing</a:t>
-            </a:r>
-            <a:r>
-              <a:rPr lang="it-IT" dirty="0">
-                <a:solidFill>
-                  <a:schemeClr val="tx1"/>
-                </a:solidFill>
-                <a:latin typeface="Century Gothic" panose="020B0502020202020204" pitchFamily="34" charset="0"/>
-                <a:cs typeface="Arial" panose="020B0604020202020204" pitchFamily="34" charset="0"/>
-              </a:rPr>
-              <a:t> </a:t>
-            </a:r>
-            <a:r>
-              <a:rPr lang="it-IT" b="1" dirty="0" err="1">
-                <a:solidFill>
-                  <a:schemeClr val="tx1"/>
-                </a:solidFill>
-                <a:latin typeface="Century Gothic" panose="020B0502020202020204" pitchFamily="34" charset="0"/>
-                <a:cs typeface="Arial" panose="020B0604020202020204" pitchFamily="34" charset="0"/>
-              </a:rPr>
-              <a:t>realistic</a:t>
-            </a:r>
-            <a:r>
-              <a:rPr lang="it-IT" dirty="0">
-                <a:solidFill>
-                  <a:schemeClr val="tx1"/>
-                </a:solidFill>
-                <a:latin typeface="Century Gothic" panose="020B0502020202020204" pitchFamily="34" charset="0"/>
-                <a:cs typeface="Arial" panose="020B0604020202020204" pitchFamily="34" charset="0"/>
-              </a:rPr>
-              <a:t> </a:t>
-            </a:r>
-            <a:r>
-              <a:rPr lang="it-IT" dirty="0" err="1">
-                <a:solidFill>
-                  <a:schemeClr val="tx1"/>
-                </a:solidFill>
-                <a:latin typeface="Century Gothic" panose="020B0502020202020204" pitchFamily="34" charset="0"/>
-                <a:cs typeface="Arial" panose="020B0604020202020204" pitchFamily="34" charset="0"/>
-              </a:rPr>
-              <a:t>simulation</a:t>
-            </a:r>
-            <a:r>
-              <a:rPr lang="it-IT" dirty="0">
-                <a:solidFill>
-                  <a:schemeClr val="tx1"/>
-                </a:solidFill>
-                <a:latin typeface="Century Gothic" panose="020B0502020202020204" pitchFamily="34" charset="0"/>
-                <a:cs typeface="Arial" panose="020B0604020202020204" pitchFamily="34" charset="0"/>
-              </a:rPr>
-              <a:t> of the hospital </a:t>
-            </a:r>
-            <a:r>
-              <a:rPr lang="it-IT" dirty="0" err="1">
-                <a:solidFill>
-                  <a:schemeClr val="tx1"/>
-                </a:solidFill>
-                <a:latin typeface="Century Gothic" panose="020B0502020202020204" pitchFamily="34" charset="0"/>
-                <a:cs typeface="Arial" panose="020B0604020202020204" pitchFamily="34" charset="0"/>
-              </a:rPr>
-              <a:t>environment</a:t>
-            </a:r>
-            <a:r>
-              <a:rPr lang="it-IT" dirty="0">
-                <a:solidFill>
-                  <a:schemeClr val="tx1"/>
-                </a:solidFill>
-                <a:latin typeface="Century Gothic" panose="020B0502020202020204" pitchFamily="34" charset="0"/>
-                <a:cs typeface="Arial" panose="020B0604020202020204" pitchFamily="34" charset="0"/>
-              </a:rPr>
-              <a:t>.</a:t>
-            </a:r>
-          </a:p>
-          <a:p>
-            <a:pPr lvl="1"/>
-            <a:endParaRPr lang="it-IT" dirty="0">
-              <a:solidFill>
-                <a:schemeClr val="tx1"/>
-              </a:solidFill>
+              <a:rPr lang="it-IT" sz="2400" dirty="0">
+                <a:solidFill>
+                  <a:schemeClr val="tx1"/>
+                </a:solidFill>
+                <a:latin typeface="Century Gothic" panose="020B0502020202020204" pitchFamily="34" charset="0"/>
+                <a:cs typeface="Arial" panose="020B0604020202020204" pitchFamily="34" charset="0"/>
+              </a:rPr>
+              <a:t> room.</a:t>
+            </a:r>
+            <a:endParaRPr lang="it-IT" sz="2400" dirty="0">
+              <a:effectLst/>
               <a:latin typeface="Century Gothic" panose="020B0502020202020204" pitchFamily="34" charset="0"/>
-              <a:cs typeface="Arial" panose="020B0604020202020204" pitchFamily="34" charset="0"/>
-            </a:endParaRPr>
-          </a:p>
-          <a:p>
-            <a:pPr lvl="1"/>
-            <a:r>
-              <a:rPr lang="it-IT" b="1" spc="-10" dirty="0">
-                <a:solidFill>
-                  <a:srgbClr val="003F77"/>
-                </a:solidFill>
-                <a:latin typeface="Century Gothic"/>
-                <a:ea typeface="+mj-ea"/>
-              </a:rPr>
-              <a:t>Timer</a:t>
-            </a:r>
-            <a:r>
-              <a:rPr lang="it-IT" dirty="0">
-                <a:solidFill>
-                  <a:schemeClr val="tx1"/>
-                </a:solidFill>
-                <a:latin typeface="Century Gothic" panose="020B0502020202020204" pitchFamily="34" charset="0"/>
-                <a:cs typeface="Arial" panose="020B0604020202020204" pitchFamily="34" charset="0"/>
-              </a:rPr>
-              <a:t>: </a:t>
-            </a:r>
-            <a:r>
-              <a:rPr lang="it-IT" dirty="0" err="1">
-                <a:solidFill>
-                  <a:schemeClr val="tx1"/>
-                </a:solidFill>
-                <a:latin typeface="Century Gothic" panose="020B0502020202020204" pitchFamily="34" charset="0"/>
-                <a:cs typeface="Arial" panose="020B0604020202020204" pitchFamily="34" charset="0"/>
-              </a:rPr>
-              <a:t>They</a:t>
-            </a:r>
-            <a:r>
-              <a:rPr lang="it-IT" dirty="0">
-                <a:solidFill>
-                  <a:schemeClr val="tx1"/>
-                </a:solidFill>
-                <a:latin typeface="Century Gothic" panose="020B0502020202020204" pitchFamily="34" charset="0"/>
-                <a:cs typeface="Arial" panose="020B0604020202020204" pitchFamily="34" charset="0"/>
-              </a:rPr>
-              <a:t> </a:t>
-            </a:r>
-            <a:r>
-              <a:rPr lang="it-IT" dirty="0" err="1">
-                <a:solidFill>
-                  <a:schemeClr val="tx1"/>
-                </a:solidFill>
-                <a:latin typeface="Century Gothic" panose="020B0502020202020204" pitchFamily="34" charset="0"/>
-                <a:cs typeface="Arial" panose="020B0604020202020204" pitchFamily="34" charset="0"/>
-              </a:rPr>
-              <a:t>manage</a:t>
-            </a:r>
-            <a:r>
-              <a:rPr lang="it-IT" dirty="0">
-                <a:solidFill>
-                  <a:schemeClr val="tx1"/>
-                </a:solidFill>
-                <a:latin typeface="Century Gothic" panose="020B0502020202020204" pitchFamily="34" charset="0"/>
-                <a:cs typeface="Arial" panose="020B0604020202020204" pitchFamily="34" charset="0"/>
-              </a:rPr>
-              <a:t> the </a:t>
-            </a:r>
-            <a:r>
-              <a:rPr lang="it-IT" b="1" dirty="0">
-                <a:solidFill>
-                  <a:schemeClr val="tx1"/>
-                </a:solidFill>
-                <a:latin typeface="Century Gothic" panose="020B0502020202020204" pitchFamily="34" charset="0"/>
-                <a:cs typeface="Arial" panose="020B0604020202020204" pitchFamily="34" charset="0"/>
-              </a:rPr>
-              <a:t>duration</a:t>
-            </a:r>
-            <a:r>
-              <a:rPr lang="it-IT" dirty="0">
-                <a:solidFill>
-                  <a:schemeClr val="tx1"/>
-                </a:solidFill>
-                <a:latin typeface="Century Gothic" panose="020B0502020202020204" pitchFamily="34" charset="0"/>
-                <a:cs typeface="Arial" panose="020B0604020202020204" pitchFamily="34" charset="0"/>
-              </a:rPr>
-              <a:t> of </a:t>
-            </a:r>
-            <a:r>
-              <a:rPr lang="it-IT" dirty="0" err="1">
-                <a:solidFill>
-                  <a:schemeClr val="tx1"/>
-                </a:solidFill>
-                <a:latin typeface="Century Gothic" panose="020B0502020202020204" pitchFamily="34" charset="0"/>
-                <a:cs typeface="Arial" panose="020B0604020202020204" pitchFamily="34" charset="0"/>
-              </a:rPr>
-              <a:t>operations</a:t>
-            </a:r>
-            <a:r>
-              <a:rPr lang="it-IT" dirty="0">
-                <a:solidFill>
-                  <a:schemeClr val="tx1"/>
-                </a:solidFill>
-                <a:latin typeface="Century Gothic" panose="020B0502020202020204" pitchFamily="34" charset="0"/>
-                <a:cs typeface="Arial" panose="020B0604020202020204" pitchFamily="34" charset="0"/>
-              </a:rPr>
-              <a:t> in </a:t>
-            </a:r>
-            <a:r>
-              <a:rPr lang="it-IT" dirty="0" err="1">
-                <a:solidFill>
-                  <a:schemeClr val="tx1"/>
-                </a:solidFill>
-                <a:latin typeface="Century Gothic" panose="020B0502020202020204" pitchFamily="34" charset="0"/>
-                <a:cs typeface="Arial" panose="020B0604020202020204" pitchFamily="34" charset="0"/>
-              </a:rPr>
-              <a:t>each</a:t>
-            </a:r>
-            <a:r>
-              <a:rPr lang="it-IT" dirty="0">
-                <a:solidFill>
-                  <a:schemeClr val="tx1"/>
-                </a:solidFill>
-                <a:latin typeface="Century Gothic" panose="020B0502020202020204" pitchFamily="34" charset="0"/>
-                <a:cs typeface="Arial" panose="020B0604020202020204" pitchFamily="34" charset="0"/>
-              </a:rPr>
-              <a:t> </a:t>
-            </a:r>
-            <a:r>
-              <a:rPr lang="it-IT" dirty="0" err="1">
-                <a:solidFill>
-                  <a:schemeClr val="tx1"/>
-                </a:solidFill>
-                <a:latin typeface="Century Gothic" panose="020B0502020202020204" pitchFamily="34" charset="0"/>
-                <a:cs typeface="Arial" panose="020B0604020202020204" pitchFamily="34" charset="0"/>
-              </a:rPr>
-              <a:t>operating</a:t>
-            </a:r>
-            <a:r>
-              <a:rPr lang="it-IT" dirty="0">
-                <a:solidFill>
-                  <a:schemeClr val="tx1"/>
-                </a:solidFill>
-                <a:latin typeface="Century Gothic" panose="020B0502020202020204" pitchFamily="34" charset="0"/>
-                <a:cs typeface="Arial" panose="020B0604020202020204" pitchFamily="34" charset="0"/>
-              </a:rPr>
-              <a:t> room.</a:t>
-            </a:r>
-            <a:endParaRPr lang="it-IT" dirty="0">
-              <a:effectLst/>
-              <a:latin typeface="Times"/>
-            </a:endParaRPr>
-          </a:p>
-          <a:p>
-            <a:pPr lvl="1"/>
-            <a:endParaRPr lang="it-IT" dirty="0">
-              <a:solidFill>
-                <a:schemeClr val="tx1"/>
-              </a:solidFill>
-              <a:latin typeface="Century Gothic" panose="020B0502020202020204" pitchFamily="34" charset="0"/>
-              <a:cs typeface="Arial" panose="020B0604020202020204" pitchFamily="34" charset="0"/>
             </a:endParaRPr>
           </a:p>
         </p:txBody>
@@ -6804,8 +6905,8 @@
         </p:nvSpPr>
         <p:spPr>
           <a:xfrm>
-            <a:off x="152399" y="1407616"/>
-            <a:ext cx="5410201" cy="4893647"/>
+            <a:off x="152399" y="990600"/>
+            <a:ext cx="5257802" cy="5262979"/>
           </a:xfrm>
           <a:prstGeom prst="rect">
             <a:avLst/>
@@ -6847,7 +6948,7 @@
                 <a:latin typeface="Century Gothic" panose="020B0502020202020204" pitchFamily="34" charset="0"/>
                 <a:cs typeface="Arial" panose="020B0604020202020204" pitchFamily="34" charset="0"/>
               </a:rPr>
-              <a:t> over the previous hospital management system, with new functionalities and </a:t>
+              <a:t> over the previous hospital management system, with </a:t>
             </a:r>
             <a:r>
               <a:rPr lang="en-GB" sz="2400" b="1" dirty="0">
@@ -6857,6 +6958,26 @@
                 <a:latin typeface="Century Gothic" panose="020B0502020202020204" pitchFamily="34" charset="0"/>
                 <a:cs typeface="Arial" panose="020B0604020202020204" pitchFamily="34" charset="0"/>
               </a:rPr>
+              <a:t>new functionalities </a:t>
+            </a:r>
+            <a:r>
+              <a:rPr lang="en-GB" sz="2400" dirty="0">
+                <a:solidFill>
+                  <a:schemeClr val="tx1"/>
+                </a:solidFill>
+                <a:latin typeface="Century Gothic" panose="020B0502020202020204" pitchFamily="34" charset="0"/>
+                <a:cs typeface="Arial" panose="020B0604020202020204" pitchFamily="34" charset="0"/>
+              </a:rPr>
+              <a:t>and </a:t>
+            </a:r>
+            <a:r>
+              <a:rPr lang="en-GB" sz="2400" b="1" dirty="0">
+                <a:solidFill>
+                  <a:schemeClr val="tx1"/>
+                </a:solidFill>
+                <a:latin typeface="Century Gothic" panose="020B0502020202020204" pitchFamily="34" charset="0"/>
+                <a:cs typeface="Arial" panose="020B0604020202020204" pitchFamily="34" charset="0"/>
+              </a:rPr>
               <a:t>optimizations</a:t>
             </a:r>
             <a:r>
@@ -6867,7 +6988,120 @@
                 <a:latin typeface="Century Gothic" panose="020B0502020202020204" pitchFamily="34" charset="0"/>
                 <a:cs typeface="Arial" panose="020B0604020202020204" pitchFamily="34" charset="0"/>
               </a:rPr>
-              <a:t> to better manage patient operations based on priorities. The additional functionalities include managing patient priorities, removing patients from the list in case of death, and enhancing operation management using </a:t>
+              <a:t> to better manage patient operations based on priorities. </a:t>
+            </a:r>
+          </a:p>
+          <a:p>
+            <a:pPr algn="l"/>
+            <a:r>
+              <a:rPr lang="en-GB" sz="2400" dirty="0">
+                <a:solidFill>
+                  <a:schemeClr val="tx1"/>
+                </a:solidFill>
+                <a:latin typeface="Century Gothic" panose="020B0502020202020204" pitchFamily="34" charset="0"/>
+                <a:cs typeface="Arial" panose="020B0604020202020204" pitchFamily="34" charset="0"/>
+              </a:rPr>
+              <a:t>The </a:t>
+            </a:r>
+            <a:r>
+              <a:rPr lang="en-GB" sz="2400" b="1" dirty="0">
+                <a:solidFill>
+                  <a:schemeClr val="tx1"/>
+                </a:solidFill>
+                <a:latin typeface="Century Gothic" panose="020B0502020202020204" pitchFamily="34" charset="0"/>
+                <a:cs typeface="Arial" panose="020B0604020202020204" pitchFamily="34" charset="0"/>
+              </a:rPr>
+              <a:t>additional functionalities </a:t>
+            </a:r>
+            <a:r>
+              <a:rPr lang="en-GB" sz="2400" dirty="0">
+                <a:solidFill>
+                  <a:schemeClr val="tx1"/>
+                </a:solidFill>
+                <a:latin typeface="Century Gothic" panose="020B0502020202020204" pitchFamily="34" charset="0"/>
+                <a:cs typeface="Arial" panose="020B0604020202020204" pitchFamily="34" charset="0"/>
+              </a:rPr>
+              <a:t>include </a:t>
+            </a:r>
+            <a:r>
+              <a:rPr lang="en-GB" sz="2400" b="1" dirty="0">
+                <a:solidFill>
+                  <a:schemeClr val="tx1"/>
+                </a:solidFill>
+                <a:latin typeface="Century Gothic" panose="020B0502020202020204" pitchFamily="34" charset="0"/>
+                <a:cs typeface="Arial" panose="020B0604020202020204" pitchFamily="34" charset="0"/>
+              </a:rPr>
+              <a:t>managing </a:t>
+            </a:r>
+            <a:r>
+              <a:rPr lang="en-GB" sz="2400" dirty="0">
+                <a:solidFill>
+                  <a:schemeClr val="tx1"/>
+                </a:solidFill>
+                <a:latin typeface="Century Gothic" panose="020B0502020202020204" pitchFamily="34" charset="0"/>
+                <a:cs typeface="Arial" panose="020B0604020202020204" pitchFamily="34" charset="0"/>
+              </a:rPr>
+              <a:t>patient </a:t>
+            </a:r>
+            <a:r>
+              <a:rPr lang="en-GB" sz="2400" b="1" dirty="0">
+                <a:solidFill>
+                  <a:schemeClr val="tx1"/>
+                </a:solidFill>
+                <a:latin typeface="Century Gothic" panose="020B0502020202020204" pitchFamily="34" charset="0"/>
+                <a:cs typeface="Arial" panose="020B0604020202020204" pitchFamily="34" charset="0"/>
+              </a:rPr>
+              <a:t>priorities</a:t>
+            </a:r>
+            <a:r>
+              <a:rPr lang="en-GB" sz="2400" dirty="0">
+                <a:solidFill>
+                  <a:schemeClr val="tx1"/>
+                </a:solidFill>
+                <a:latin typeface="Century Gothic" panose="020B0502020202020204" pitchFamily="34" charset="0"/>
+                <a:cs typeface="Arial" panose="020B0604020202020204" pitchFamily="34" charset="0"/>
+              </a:rPr>
+              <a:t>, </a:t>
+            </a:r>
+            <a:r>
+              <a:rPr lang="en-GB" sz="2400" b="1" dirty="0">
+                <a:solidFill>
+                  <a:schemeClr val="tx1"/>
+                </a:solidFill>
+                <a:latin typeface="Century Gothic" panose="020B0502020202020204" pitchFamily="34" charset="0"/>
+                <a:cs typeface="Arial" panose="020B0604020202020204" pitchFamily="34" charset="0"/>
+              </a:rPr>
+              <a:t>removing patients </a:t>
+            </a:r>
+            <a:r>
+              <a:rPr lang="en-GB" sz="2400" dirty="0">
+                <a:solidFill>
+                  <a:schemeClr val="tx1"/>
+                </a:solidFill>
+                <a:latin typeface="Century Gothic" panose="020B0502020202020204" pitchFamily="34" charset="0"/>
+                <a:cs typeface="Arial" panose="020B0604020202020204" pitchFamily="34" charset="0"/>
+              </a:rPr>
+              <a:t>from the list in case of death, and </a:t>
+            </a:r>
+            <a:r>
+              <a:rPr lang="en-GB" sz="2400" b="1" dirty="0">
+                <a:solidFill>
+                  <a:schemeClr val="tx1"/>
+                </a:solidFill>
+                <a:latin typeface="Century Gothic" panose="020B0502020202020204" pitchFamily="34" charset="0"/>
+                <a:cs typeface="Arial" panose="020B0604020202020204" pitchFamily="34" charset="0"/>
+              </a:rPr>
+              <a:t>enhancing operation </a:t>
+            </a:r>
+            <a:r>
+              <a:rPr lang="en-GB" sz="2400" dirty="0">
+                <a:solidFill>
+                  <a:schemeClr val="tx1"/>
+                </a:solidFill>
+                <a:latin typeface="Century Gothic" panose="020B0502020202020204" pitchFamily="34" charset="0"/>
+                <a:cs typeface="Arial" panose="020B0604020202020204" pitchFamily="34" charset="0"/>
+              </a:rPr>
+              <a:t>management using </a:t>
             </a:r>
             <a:r>
               <a:rPr lang="en-GB" sz="2400" b="1" dirty="0">
@@ -8122,8 +8356,8 @@
         </p:nvSpPr>
         <p:spPr>
           <a:xfrm>
-            <a:off x="228600" y="1190685"/>
-            <a:ext cx="4343400" cy="4524315"/>
+            <a:off x="228600" y="1126153"/>
+            <a:ext cx="4343400" cy="4893647"/>
           </a:xfrm>
           <a:prstGeom prst="rect">
             <a:avLst/>
@@ -8225,18 +8459,8 @@
                 <a:latin typeface="Century Gothic" panose="020B0502020202020204" pitchFamily="34" charset="0"/>
                 <a:cs typeface="Arial" panose="020B0604020202020204" pitchFamily="34" charset="0"/>
               </a:rPr>
-              <a:t>.</a:t>
-            </a:r>
-          </a:p>
-          <a:p>
-            <a:pPr algn="l"/>
-            <a:endParaRPr lang="en-GB" sz="2400" dirty="0">
-              <a:solidFill>
-                <a:schemeClr val="tx1"/>
-              </a:solidFill>
-              <a:latin typeface="Century Gothic" panose="020B0502020202020204" pitchFamily="34" charset="0"/>
-              <a:cs typeface="Arial" panose="020B0604020202020204" pitchFamily="34" charset="0"/>
-            </a:endParaRPr>
+              <a:t>, to show an actual implementation of an hospital.</a:t>
+            </a:r>
           </a:p>
           <a:p>
             <a:pPr algn="l"/>
@@ -8421,7 +8645,7 @@
         </p:blipFill>
         <p:spPr>
           <a:xfrm>
-            <a:off x="4798695" y="1828800"/>
+            <a:off x="4798695" y="1838131"/>
             <a:ext cx="7164705" cy="3038669"/>
           </a:xfrm>
           <a:prstGeom prst="rect">

</xml_diff>